<commit_message>
add sessions 9 and 10 presentation drafts
</commit_message>
<xml_diff>
--- a/presentations/session-4-intro-to-ai.pptx
+++ b/presentations/session-4-intro-to-ai.pptx
@@ -233,7 +233,7 @@
           <a:p>
             <a:fld id="{74B0C4F4-A186-4C13-8E85-1B7149B65718}" type="datetimeFigureOut">
               <a:rPr lang="en-US" smtClean="0"/>
-              <a:t>10/22/18</a:t>
+              <a:t>10/23/18</a:t>
             </a:fld>
             <a:endParaRPr lang="en-US"/>
           </a:p>
@@ -9202,7 +9202,7 @@
                 </a:solidFill>
                 <a:latin typeface="Cambria" panose="02040503050406030204" pitchFamily="18" charset="0"/>
               </a:rPr>
-              <a:t>THE RACE FOR AI</a:t>
+              <a:t>MAIN DIMENSIONS OF PUBLIC POLICIES</a:t>
             </a:r>
           </a:p>
         </p:txBody>
@@ -9222,7 +9222,7 @@
         <p:spPr>
           <a:xfrm>
             <a:off x="1275701" y="2333156"/>
-            <a:ext cx="9909364" cy="3046988"/>
+            <a:ext cx="9909364" cy="1569660"/>
           </a:xfrm>
           <a:prstGeom prst="rect">
             <a:avLst/>
@@ -9246,65 +9246,7 @@
                 </a:solidFill>
                 <a:latin typeface="Cambria" panose="02040503050406030204" pitchFamily="18" charset="0"/>
               </a:rPr>
-              <a:t>A WORLD TOUR OF RECENT PUBLIC AI STRATEGIES/POLICIES</a:t>
-            </a:r>
-            <a:br>
-              <a:rPr lang="en-US" sz="2400" b="1" dirty="0">
-                <a:solidFill>
-                  <a:schemeClr val="accent1"/>
-                </a:solidFill>
-                <a:latin typeface="Cambria" panose="02040503050406030204" pitchFamily="18" charset="0"/>
-              </a:rPr>
-            </a:br>
-            <a:endParaRPr lang="en-US" sz="2400" b="1" dirty="0">
-              <a:solidFill>
-                <a:schemeClr val="accent1"/>
-              </a:solidFill>
-              <a:latin typeface="Cambria" panose="02040503050406030204" pitchFamily="18" charset="0"/>
-            </a:endParaRPr>
-          </a:p>
-          <a:p>
-            <a:pPr marL="342900" indent="-342900">
-              <a:buFont typeface="Arial"/>
-              <a:buChar char="•"/>
-            </a:pPr>
-            <a:r>
-              <a:rPr lang="en-US" sz="2400" b="1" dirty="0">
-                <a:solidFill>
-                  <a:schemeClr val="accent1"/>
-                </a:solidFill>
-                <a:latin typeface="Cambria" panose="02040503050406030204" pitchFamily="18" charset="0"/>
-              </a:rPr>
-              <a:t>ON WHICH ASPECTS?</a:t>
-            </a:r>
-            <a:br>
-              <a:rPr lang="en-US" sz="2400" b="1" dirty="0">
-                <a:solidFill>
-                  <a:schemeClr val="accent1"/>
-                </a:solidFill>
-                <a:latin typeface="Cambria" panose="02040503050406030204" pitchFamily="18" charset="0"/>
-              </a:rPr>
-            </a:br>
-            <a:endParaRPr lang="en-US" sz="2400" b="1" dirty="0">
-              <a:solidFill>
-                <a:schemeClr val="accent1"/>
-              </a:solidFill>
-              <a:latin typeface="Cambria" panose="02040503050406030204" pitchFamily="18" charset="0"/>
-            </a:endParaRPr>
-          </a:p>
-          <a:p>
-            <a:pPr marL="342900" indent="-342900">
-              <a:buFont typeface="Arial"/>
-              <a:buChar char="•"/>
-            </a:pPr>
-            <a:r>
-              <a:rPr lang="en-US" sz="2400" b="1" dirty="0">
-                <a:solidFill>
-                  <a:schemeClr val="accent1"/>
-                </a:solidFill>
-                <a:latin typeface="Cambria" panose="02040503050406030204" pitchFamily="18" charset="0"/>
-              </a:rPr>
-              <a:t>US vs. CHINA vs. ALL</a:t>
+              <a:t>TO BE CONTINUED</a:t>
             </a:r>
             <a:br>
               <a:rPr lang="en-US" sz="2400" b="1" dirty="0">

</xml_diff>

<commit_message>
slides deciphering AI jargon
</commit_message>
<xml_diff>
--- a/presentations/session-4-intro-to-ai.pptx
+++ b/presentations/session-4-intro-to-ai.pptx
@@ -5,7 +5,7 @@
     <p:sldMasterId id="2147483648" r:id="rId1"/>
   </p:sldMasterIdLst>
   <p:notesMasterIdLst>
-    <p:notesMasterId r:id="rId28"/>
+    <p:notesMasterId r:id="rId31"/>
   </p:notesMasterIdLst>
   <p:sldIdLst>
     <p:sldId id="263" r:id="rId2"/>
@@ -30,10 +30,13 @@
     <p:sldId id="561" r:id="rId21"/>
     <p:sldId id="562" r:id="rId22"/>
     <p:sldId id="563" r:id="rId23"/>
-    <p:sldId id="564" r:id="rId24"/>
-    <p:sldId id="565" r:id="rId25"/>
-    <p:sldId id="566" r:id="rId26"/>
-    <p:sldId id="567" r:id="rId27"/>
+    <p:sldId id="568" r:id="rId24"/>
+    <p:sldId id="569" r:id="rId25"/>
+    <p:sldId id="570" r:id="rId26"/>
+    <p:sldId id="564" r:id="rId27"/>
+    <p:sldId id="565" r:id="rId28"/>
+    <p:sldId id="566" r:id="rId29"/>
+    <p:sldId id="567" r:id="rId30"/>
   </p:sldIdLst>
   <p:sldSz cx="12192000" cy="6858000"/>
   <p:notesSz cx="6797675" cy="9874250"/>
@@ -233,7 +236,7 @@
           <a:p>
             <a:fld id="{74B0C4F4-A186-4C13-8E85-1B7149B65718}" type="datetimeFigureOut">
               <a:rPr lang="en-US" smtClean="0"/>
-              <a:t>10/23/18</a:t>
+              <a:t>11/5/18</a:t>
             </a:fld>
             <a:endParaRPr lang="en-US"/>
           </a:p>
@@ -1764,7 +1767,18 @@
           <a:bodyPr/>
           <a:lstStyle/>
           <a:p>
-            <a:endParaRPr lang="en-US" dirty="0"/>
+            <a:r>
+              <a:rPr lang="en-US" dirty="0"/>
+              <a:t>https://</a:t>
+            </a:r>
+            <a:r>
+              <a:rPr lang="en-US" dirty="0" err="1"/>
+              <a:t>www.quora.com</a:t>
+            </a:r>
+            <a:r>
+              <a:rPr lang="en-US" dirty="0"/>
+              <a:t>/What-is-the-difference-between-supervised-and-unsupervised-learning-algorithms</a:t>
+            </a:r>
           </a:p>
         </p:txBody>
       </p:sp>
@@ -1794,7 +1808,7 @@
     </p:spTree>
     <p:extLst>
       <p:ext uri="{BB962C8B-B14F-4D97-AF65-F5344CB8AC3E}">
-        <p14:creationId xmlns:p14="http://schemas.microsoft.com/office/powerpoint/2010/main" val="2416708033"/>
+        <p14:creationId xmlns:p14="http://schemas.microsoft.com/office/powerpoint/2010/main" val="2323008596"/>
       </p:ext>
     </p:extLst>
   </p:cSld>
@@ -1848,7 +1862,18 @@
           <a:bodyPr/>
           <a:lstStyle/>
           <a:p>
-            <a:endParaRPr lang="en-US" dirty="0"/>
+            <a:r>
+              <a:rPr lang="en-US" dirty="0"/>
+              <a:t>https://</a:t>
+            </a:r>
+            <a:r>
+              <a:rPr lang="en-US" dirty="0" err="1"/>
+              <a:t>www.quora.com</a:t>
+            </a:r>
+            <a:r>
+              <a:rPr lang="en-US" dirty="0"/>
+              <a:t>/What-is-the-difference-between-supervised-and-unsupervised-learning-algorithms</a:t>
+            </a:r>
           </a:p>
         </p:txBody>
       </p:sp>
@@ -1878,7 +1903,7 @@
     </p:spTree>
     <p:extLst>
       <p:ext uri="{BB962C8B-B14F-4D97-AF65-F5344CB8AC3E}">
-        <p14:creationId xmlns:p14="http://schemas.microsoft.com/office/powerpoint/2010/main" val="3730690748"/>
+        <p14:creationId xmlns:p14="http://schemas.microsoft.com/office/powerpoint/2010/main" val="293807188"/>
       </p:ext>
     </p:extLst>
   </p:cSld>
@@ -1932,7 +1957,18 @@
           <a:bodyPr/>
           <a:lstStyle/>
           <a:p>
-            <a:endParaRPr lang="en-US" dirty="0"/>
+            <a:r>
+              <a:rPr lang="en-US" dirty="0"/>
+              <a:t>https://</a:t>
+            </a:r>
+            <a:r>
+              <a:rPr lang="en-US" dirty="0" err="1"/>
+              <a:t>www.quora.com</a:t>
+            </a:r>
+            <a:r>
+              <a:rPr lang="en-US" dirty="0"/>
+              <a:t>/What-is-the-difference-between-supervised-and-unsupervised-learning-algorithms</a:t>
+            </a:r>
           </a:p>
         </p:txBody>
       </p:sp>
@@ -1962,7 +1998,7 @@
     </p:spTree>
     <p:extLst>
       <p:ext uri="{BB962C8B-B14F-4D97-AF65-F5344CB8AC3E}">
-        <p14:creationId xmlns:p14="http://schemas.microsoft.com/office/powerpoint/2010/main" val="4225118360"/>
+        <p14:creationId xmlns:p14="http://schemas.microsoft.com/office/powerpoint/2010/main" val="4143092579"/>
       </p:ext>
     </p:extLst>
   </p:cSld>
@@ -2038,6 +2074,258 @@
             <a:fld id="{2F6F93F9-6E01-423B-ABB3-8FB3B0651941}" type="slidenum">
               <a:rPr lang="en-US" smtClean="0"/>
               <a:t>26</a:t>
+            </a:fld>
+            <a:endParaRPr lang="en-US"/>
+          </a:p>
+        </p:txBody>
+      </p:sp>
+    </p:spTree>
+    <p:extLst>
+      <p:ext uri="{BB962C8B-B14F-4D97-AF65-F5344CB8AC3E}">
+        <p14:creationId xmlns:p14="http://schemas.microsoft.com/office/powerpoint/2010/main" val="2416708033"/>
+      </p:ext>
+    </p:extLst>
+  </p:cSld>
+  <p:clrMapOvr>
+    <a:masterClrMapping/>
+  </p:clrMapOvr>
+</p:notes>
+</file>
+
+<file path=ppt/notesSlides/notesSlide26.xml><?xml version="1.0" encoding="utf-8"?>
+<p:notes xmlns:a="http://schemas.openxmlformats.org/drawingml/2006/main" xmlns:r="http://schemas.openxmlformats.org/officeDocument/2006/relationships" xmlns:p="http://schemas.openxmlformats.org/presentationml/2006/main">
+  <p:cSld>
+    <p:spTree>
+      <p:nvGrpSpPr>
+        <p:cNvPr id="1" name=""/>
+        <p:cNvGrpSpPr/>
+        <p:nvPr/>
+      </p:nvGrpSpPr>
+      <p:grpSpPr>
+        <a:xfrm>
+          <a:off x="0" y="0"/>
+          <a:ext cx="0" cy="0"/>
+          <a:chOff x="0" y="0"/>
+          <a:chExt cx="0" cy="0"/>
+        </a:xfrm>
+      </p:grpSpPr>
+      <p:sp>
+        <p:nvSpPr>
+          <p:cNvPr id="2" name="Slide Image Placeholder 1"/>
+          <p:cNvSpPr>
+            <a:spLocks noGrp="1" noRot="1" noChangeAspect="1"/>
+          </p:cNvSpPr>
+          <p:nvPr>
+            <p:ph type="sldImg"/>
+          </p:nvPr>
+        </p:nvSpPr>
+        <p:spPr/>
+      </p:sp>
+      <p:sp>
+        <p:nvSpPr>
+          <p:cNvPr id="3" name="Notes Placeholder 2"/>
+          <p:cNvSpPr>
+            <a:spLocks noGrp="1"/>
+          </p:cNvSpPr>
+          <p:nvPr>
+            <p:ph type="body" idx="1"/>
+          </p:nvPr>
+        </p:nvSpPr>
+        <p:spPr/>
+        <p:txBody>
+          <a:bodyPr/>
+          <a:lstStyle/>
+          <a:p>
+            <a:endParaRPr lang="en-US" dirty="0"/>
+          </a:p>
+        </p:txBody>
+      </p:sp>
+      <p:sp>
+        <p:nvSpPr>
+          <p:cNvPr id="4" name="Slide Number Placeholder 3"/>
+          <p:cNvSpPr>
+            <a:spLocks noGrp="1"/>
+          </p:cNvSpPr>
+          <p:nvPr>
+            <p:ph type="sldNum" sz="quarter" idx="10"/>
+          </p:nvPr>
+        </p:nvSpPr>
+        <p:spPr/>
+        <p:txBody>
+          <a:bodyPr/>
+          <a:lstStyle/>
+          <a:p>
+            <a:fld id="{2F6F93F9-6E01-423B-ABB3-8FB3B0651941}" type="slidenum">
+              <a:rPr lang="en-US" smtClean="0"/>
+              <a:t>27</a:t>
+            </a:fld>
+            <a:endParaRPr lang="en-US"/>
+          </a:p>
+        </p:txBody>
+      </p:sp>
+    </p:spTree>
+    <p:extLst>
+      <p:ext uri="{BB962C8B-B14F-4D97-AF65-F5344CB8AC3E}">
+        <p14:creationId xmlns:p14="http://schemas.microsoft.com/office/powerpoint/2010/main" val="3730690748"/>
+      </p:ext>
+    </p:extLst>
+  </p:cSld>
+  <p:clrMapOvr>
+    <a:masterClrMapping/>
+  </p:clrMapOvr>
+</p:notes>
+</file>
+
+<file path=ppt/notesSlides/notesSlide27.xml><?xml version="1.0" encoding="utf-8"?>
+<p:notes xmlns:a="http://schemas.openxmlformats.org/drawingml/2006/main" xmlns:r="http://schemas.openxmlformats.org/officeDocument/2006/relationships" xmlns:p="http://schemas.openxmlformats.org/presentationml/2006/main">
+  <p:cSld>
+    <p:spTree>
+      <p:nvGrpSpPr>
+        <p:cNvPr id="1" name=""/>
+        <p:cNvGrpSpPr/>
+        <p:nvPr/>
+      </p:nvGrpSpPr>
+      <p:grpSpPr>
+        <a:xfrm>
+          <a:off x="0" y="0"/>
+          <a:ext cx="0" cy="0"/>
+          <a:chOff x="0" y="0"/>
+          <a:chExt cx="0" cy="0"/>
+        </a:xfrm>
+      </p:grpSpPr>
+      <p:sp>
+        <p:nvSpPr>
+          <p:cNvPr id="2" name="Slide Image Placeholder 1"/>
+          <p:cNvSpPr>
+            <a:spLocks noGrp="1" noRot="1" noChangeAspect="1"/>
+          </p:cNvSpPr>
+          <p:nvPr>
+            <p:ph type="sldImg"/>
+          </p:nvPr>
+        </p:nvSpPr>
+        <p:spPr/>
+      </p:sp>
+      <p:sp>
+        <p:nvSpPr>
+          <p:cNvPr id="3" name="Notes Placeholder 2"/>
+          <p:cNvSpPr>
+            <a:spLocks noGrp="1"/>
+          </p:cNvSpPr>
+          <p:nvPr>
+            <p:ph type="body" idx="1"/>
+          </p:nvPr>
+        </p:nvSpPr>
+        <p:spPr/>
+        <p:txBody>
+          <a:bodyPr/>
+          <a:lstStyle/>
+          <a:p>
+            <a:endParaRPr lang="en-US" dirty="0"/>
+          </a:p>
+        </p:txBody>
+      </p:sp>
+      <p:sp>
+        <p:nvSpPr>
+          <p:cNvPr id="4" name="Slide Number Placeholder 3"/>
+          <p:cNvSpPr>
+            <a:spLocks noGrp="1"/>
+          </p:cNvSpPr>
+          <p:nvPr>
+            <p:ph type="sldNum" sz="quarter" idx="10"/>
+          </p:nvPr>
+        </p:nvSpPr>
+        <p:spPr/>
+        <p:txBody>
+          <a:bodyPr/>
+          <a:lstStyle/>
+          <a:p>
+            <a:fld id="{2F6F93F9-6E01-423B-ABB3-8FB3B0651941}" type="slidenum">
+              <a:rPr lang="en-US" smtClean="0"/>
+              <a:t>28</a:t>
+            </a:fld>
+            <a:endParaRPr lang="en-US"/>
+          </a:p>
+        </p:txBody>
+      </p:sp>
+    </p:spTree>
+    <p:extLst>
+      <p:ext uri="{BB962C8B-B14F-4D97-AF65-F5344CB8AC3E}">
+        <p14:creationId xmlns:p14="http://schemas.microsoft.com/office/powerpoint/2010/main" val="4225118360"/>
+      </p:ext>
+    </p:extLst>
+  </p:cSld>
+  <p:clrMapOvr>
+    <a:masterClrMapping/>
+  </p:clrMapOvr>
+</p:notes>
+</file>
+
+<file path=ppt/notesSlides/notesSlide28.xml><?xml version="1.0" encoding="utf-8"?>
+<p:notes xmlns:a="http://schemas.openxmlformats.org/drawingml/2006/main" xmlns:r="http://schemas.openxmlformats.org/officeDocument/2006/relationships" xmlns:p="http://schemas.openxmlformats.org/presentationml/2006/main">
+  <p:cSld>
+    <p:spTree>
+      <p:nvGrpSpPr>
+        <p:cNvPr id="1" name=""/>
+        <p:cNvGrpSpPr/>
+        <p:nvPr/>
+      </p:nvGrpSpPr>
+      <p:grpSpPr>
+        <a:xfrm>
+          <a:off x="0" y="0"/>
+          <a:ext cx="0" cy="0"/>
+          <a:chOff x="0" y="0"/>
+          <a:chExt cx="0" cy="0"/>
+        </a:xfrm>
+      </p:grpSpPr>
+      <p:sp>
+        <p:nvSpPr>
+          <p:cNvPr id="2" name="Slide Image Placeholder 1"/>
+          <p:cNvSpPr>
+            <a:spLocks noGrp="1" noRot="1" noChangeAspect="1"/>
+          </p:cNvSpPr>
+          <p:nvPr>
+            <p:ph type="sldImg"/>
+          </p:nvPr>
+        </p:nvSpPr>
+        <p:spPr/>
+      </p:sp>
+      <p:sp>
+        <p:nvSpPr>
+          <p:cNvPr id="3" name="Notes Placeholder 2"/>
+          <p:cNvSpPr>
+            <a:spLocks noGrp="1"/>
+          </p:cNvSpPr>
+          <p:nvPr>
+            <p:ph type="body" idx="1"/>
+          </p:nvPr>
+        </p:nvSpPr>
+        <p:spPr/>
+        <p:txBody>
+          <a:bodyPr/>
+          <a:lstStyle/>
+          <a:p>
+            <a:endParaRPr lang="en-US" dirty="0"/>
+          </a:p>
+        </p:txBody>
+      </p:sp>
+      <p:sp>
+        <p:nvSpPr>
+          <p:cNvPr id="4" name="Slide Number Placeholder 3"/>
+          <p:cNvSpPr>
+            <a:spLocks noGrp="1"/>
+          </p:cNvSpPr>
+          <p:nvPr>
+            <p:ph type="sldNum" sz="quarter" idx="10"/>
+          </p:nvPr>
+        </p:nvSpPr>
+        <p:spPr/>
+        <p:txBody>
+          <a:bodyPr/>
+          <a:lstStyle/>
+          <a:p>
+            <a:fld id="{2F6F93F9-6E01-423B-ABB3-8FB3B0651941}" type="slidenum">
+              <a:rPr lang="en-US" smtClean="0"/>
+              <a:t>29</a:t>
             </a:fld>
             <a:endParaRPr lang="en-US"/>
           </a:p>
@@ -5438,7 +5726,7 @@
         <p:spPr>
           <a:xfrm>
             <a:off x="1271768" y="1116000"/>
-            <a:ext cx="8126232" cy="553998"/>
+            <a:ext cx="8126232" cy="1631216"/>
           </a:xfrm>
           <a:prstGeom prst="rect">
             <a:avLst/>
@@ -5452,7 +5740,7 @@
           <a:lstStyle/>
           <a:p>
             <a:r>
-              <a:rPr lang="en-US" sz="3000" b="1" dirty="0">
+              <a:rPr lang="en-US" sz="5000" b="1" dirty="0">
                 <a:solidFill>
                   <a:schemeClr val="accent1"/>
                 </a:solidFill>
@@ -5471,7 +5759,7 @@
         </p:nvSpPr>
         <p:spPr>
           <a:xfrm>
-            <a:off x="1321533" y="1645974"/>
+            <a:off x="1271768" y="2804214"/>
             <a:ext cx="7350609" cy="400110"/>
           </a:xfrm>
           <a:prstGeom prst="rect">
@@ -5810,7 +6098,7 @@
         <p:spPr>
           <a:xfrm>
             <a:off x="1271768" y="1116000"/>
-            <a:ext cx="8126232" cy="553998"/>
+            <a:ext cx="10661152" cy="861774"/>
           </a:xfrm>
           <a:prstGeom prst="rect">
             <a:avLst/>
@@ -5824,7 +6112,7 @@
           <a:lstStyle/>
           <a:p>
             <a:r>
-              <a:rPr lang="en-US" sz="3000" b="1" dirty="0">
+              <a:rPr lang="en-US" sz="5000" b="1" dirty="0">
                 <a:solidFill>
                   <a:schemeClr val="accent1"/>
                 </a:solidFill>
@@ -5843,7 +6131,7 @@
         </p:nvSpPr>
         <p:spPr>
           <a:xfrm>
-            <a:off x="1271768" y="1669998"/>
+            <a:off x="1271768" y="1815819"/>
             <a:ext cx="7350609" cy="400110"/>
           </a:xfrm>
           <a:prstGeom prst="rect">
@@ -5891,8 +6179,8 @@
         </p:blipFill>
         <p:spPr>
           <a:xfrm>
-            <a:off x="1364128" y="2260940"/>
-            <a:ext cx="4804064" cy="3589946"/>
+            <a:off x="1371600" y="2704312"/>
+            <a:ext cx="3966012" cy="2963693"/>
           </a:xfrm>
           <a:prstGeom prst="rect">
             <a:avLst/>
@@ -7854,7 +8142,7 @@
                 </a:solidFill>
                 <a:latin typeface="Cambria" panose="02040503050406030204" pitchFamily="18" charset="0"/>
               </a:rPr>
-              <a:t>MORE DATA &amp;</a:t>
+              <a:t>MORE DATA</a:t>
             </a:r>
             <a:br>
               <a:rPr lang="en-US" sz="2400" b="1" dirty="0">
@@ -8554,7 +8842,7 @@
         <p:spPr>
           <a:xfrm>
             <a:off x="1271768" y="1115051"/>
-            <a:ext cx="9196386" cy="553998"/>
+            <a:ext cx="9196386" cy="861774"/>
           </a:xfrm>
           <a:prstGeom prst="rect">
             <a:avLst/>
@@ -8568,13 +8856,13 @@
           <a:lstStyle/>
           <a:p>
             <a:r>
-              <a:rPr lang="en-US" sz="3000" b="1" dirty="0">
-                <a:solidFill>
-                  <a:schemeClr val="accent1"/>
-                </a:solidFill>
-                <a:latin typeface="Cambria" panose="02040503050406030204" pitchFamily="18" charset="0"/>
-              </a:rPr>
-              <a:t>CLARIFYING THE TERMINOLOGY</a:t>
+              <a:rPr lang="en-US" sz="5000" b="1" dirty="0">
+                <a:solidFill>
+                  <a:schemeClr val="accent1"/>
+                </a:solidFill>
+                <a:latin typeface="Cambria" panose="02040503050406030204" pitchFamily="18" charset="0"/>
+              </a:rPr>
+              <a:t>DECYPHERING AI JARGON</a:t>
             </a:r>
           </a:p>
         </p:txBody>
@@ -8601,8 +8889,8 @@
         </p:blipFill>
         <p:spPr>
           <a:xfrm>
-            <a:off x="1115896" y="1939637"/>
-            <a:ext cx="5932604" cy="4379516"/>
+            <a:off x="1140968" y="2415539"/>
+            <a:ext cx="4227986" cy="3121147"/>
           </a:xfrm>
           <a:prstGeom prst="rect">
             <a:avLst/>
@@ -8698,7 +8986,7 @@
         <p:spPr>
           <a:xfrm>
             <a:off x="1271768" y="1115051"/>
-            <a:ext cx="9617212" cy="2400657"/>
+            <a:ext cx="9196386" cy="553998"/>
           </a:xfrm>
           <a:prstGeom prst="rect">
             <a:avLst/>
@@ -8711,10 +8999,6 @@
           </a:bodyPr>
           <a:lstStyle/>
           <a:p>
-            <a:pPr marL="514350" indent="-514350">
-              <a:buFont typeface="+mj-lt"/>
-              <a:buAutoNum type="arabicPeriod"/>
-            </a:pPr>
             <a:r>
               <a:rPr lang="en-US" sz="3000" b="1" dirty="0">
                 <a:solidFill>
@@ -8722,60 +9006,874 @@
                 </a:solidFill>
                 <a:latin typeface="Cambria" panose="02040503050406030204" pitchFamily="18" charset="0"/>
               </a:rPr>
-              <a:t>WHAT ARE AI KEY ENABLERS?</a:t>
-            </a:r>
-            <a:br>
-              <a:rPr lang="en-US" sz="3000" b="1" dirty="0">
-                <a:solidFill>
-                  <a:schemeClr val="accent1"/>
-                </a:solidFill>
-                <a:latin typeface="Cambria" panose="02040503050406030204" pitchFamily="18" charset="0"/>
-              </a:rPr>
-            </a:br>
-            <a:br>
-              <a:rPr lang="en-US" sz="3000" b="1" dirty="0">
-                <a:solidFill>
-                  <a:schemeClr val="accent1"/>
-                </a:solidFill>
-                <a:latin typeface="Cambria" panose="02040503050406030204" pitchFamily="18" charset="0"/>
-              </a:rPr>
-            </a:br>
-            <a:endParaRPr lang="en-US" sz="3000" b="1" dirty="0">
-              <a:solidFill>
-                <a:schemeClr val="accent1"/>
-              </a:solidFill>
-              <a:latin typeface="Cambria" panose="02040503050406030204" pitchFamily="18" charset="0"/>
-            </a:endParaRPr>
-          </a:p>
-          <a:p>
-            <a:pPr marL="514350" indent="-514350">
-              <a:buFont typeface="+mj-lt"/>
-              <a:buAutoNum type="arabicPeriod"/>
-            </a:pPr>
-            <a:r>
-              <a:rPr lang="en-US" sz="3000" b="1" dirty="0">
-                <a:solidFill>
-                  <a:schemeClr val="accent1"/>
-                </a:solidFill>
-                <a:latin typeface="Cambria" panose="02040503050406030204" pitchFamily="18" charset="0"/>
-              </a:rPr>
-              <a:t>HOW DOES IOT FIT INTO THE OVERALL PICTURE?</a:t>
-            </a:r>
-          </a:p>
-          <a:p>
-            <a:endParaRPr lang="en-US" sz="3000" b="1" dirty="0">
-              <a:solidFill>
-                <a:schemeClr val="accent1"/>
-              </a:solidFill>
-              <a:latin typeface="Cambria" panose="02040503050406030204" pitchFamily="18" charset="0"/>
-            </a:endParaRPr>
-          </a:p>
-        </p:txBody>
-      </p:sp>
+              <a:t>SUPERVISED LEARNING</a:t>
+            </a:r>
+          </a:p>
+        </p:txBody>
+      </p:sp>
+      <p:pic>
+        <p:nvPicPr>
+          <p:cNvPr id="4" name="Graphic 3" descr="Cat">
+            <a:extLst>
+              <a:ext uri="{FF2B5EF4-FFF2-40B4-BE49-F238E27FC236}">
+                <a16:creationId xmlns:a16="http://schemas.microsoft.com/office/drawing/2014/main" id="{B1606297-9C3D-614A-8FF4-35EC8104A34A}"/>
+              </a:ext>
+            </a:extLst>
+          </p:cNvPr>
+          <p:cNvPicPr>
+            <a:picLocks noChangeAspect="1"/>
+          </p:cNvPicPr>
+          <p:nvPr/>
+        </p:nvPicPr>
+        <p:blipFill>
+          <a:blip r:embed="rId3">
+            <a:extLst>
+              <a:ext uri="{28A0092B-C50C-407E-A947-70E740481C1C}">
+                <a14:useLocalDpi xmlns:a14="http://schemas.microsoft.com/office/drawing/2010/main" val="0"/>
+              </a:ext>
+              <a:ext uri="{96DAC541-7B7A-43D3-8B79-37D633B846F1}">
+                <asvg:svgBlip xmlns:asvg="http://schemas.microsoft.com/office/drawing/2016/SVG/main" r:embed="rId4"/>
+              </a:ext>
+            </a:extLst>
+          </a:blip>
+          <a:stretch>
+            <a:fillRect/>
+          </a:stretch>
+        </p:blipFill>
+        <p:spPr>
+          <a:xfrm>
+            <a:off x="1855475" y="2283903"/>
+            <a:ext cx="643855" cy="643855"/>
+          </a:xfrm>
+          <a:prstGeom prst="rect">
+            <a:avLst/>
+          </a:prstGeom>
+        </p:spPr>
+      </p:pic>
+      <p:pic>
+        <p:nvPicPr>
+          <p:cNvPr id="7" name="Graphic 6" descr="Cat">
+            <a:extLst>
+              <a:ext uri="{FF2B5EF4-FFF2-40B4-BE49-F238E27FC236}">
+                <a16:creationId xmlns:a16="http://schemas.microsoft.com/office/drawing/2014/main" id="{6C43DDEE-8F1F-8A49-A0BD-08BA07C327AD}"/>
+              </a:ext>
+            </a:extLst>
+          </p:cNvPr>
+          <p:cNvPicPr>
+            <a:picLocks noChangeAspect="1"/>
+          </p:cNvPicPr>
+          <p:nvPr/>
+        </p:nvPicPr>
+        <p:blipFill>
+          <a:blip r:embed="rId3">
+            <a:extLst>
+              <a:ext uri="{28A0092B-C50C-407E-A947-70E740481C1C}">
+                <a14:useLocalDpi xmlns:a14="http://schemas.microsoft.com/office/drawing/2010/main" val="0"/>
+              </a:ext>
+              <a:ext uri="{96DAC541-7B7A-43D3-8B79-37D633B846F1}">
+                <asvg:svgBlip xmlns:asvg="http://schemas.microsoft.com/office/drawing/2016/SVG/main" r:embed="rId4"/>
+              </a:ext>
+            </a:extLst>
+          </a:blip>
+          <a:stretch>
+            <a:fillRect/>
+          </a:stretch>
+        </p:blipFill>
+        <p:spPr>
+          <a:xfrm>
+            <a:off x="2385380" y="2283903"/>
+            <a:ext cx="643855" cy="643855"/>
+          </a:xfrm>
+          <a:prstGeom prst="rect">
+            <a:avLst/>
+          </a:prstGeom>
+        </p:spPr>
+      </p:pic>
+      <p:pic>
+        <p:nvPicPr>
+          <p:cNvPr id="9" name="Graphic 8" descr="Cat">
+            <a:extLst>
+              <a:ext uri="{FF2B5EF4-FFF2-40B4-BE49-F238E27FC236}">
+                <a16:creationId xmlns:a16="http://schemas.microsoft.com/office/drawing/2014/main" id="{E87FB87B-6302-384E-8CE1-7AFD78B55EF0}"/>
+              </a:ext>
+            </a:extLst>
+          </p:cNvPr>
+          <p:cNvPicPr>
+            <a:picLocks noChangeAspect="1"/>
+          </p:cNvPicPr>
+          <p:nvPr/>
+        </p:nvPicPr>
+        <p:blipFill>
+          <a:blip r:embed="rId3">
+            <a:extLst>
+              <a:ext uri="{28A0092B-C50C-407E-A947-70E740481C1C}">
+                <a14:useLocalDpi xmlns:a14="http://schemas.microsoft.com/office/drawing/2010/main" val="0"/>
+              </a:ext>
+              <a:ext uri="{96DAC541-7B7A-43D3-8B79-37D633B846F1}">
+                <asvg:svgBlip xmlns:asvg="http://schemas.microsoft.com/office/drawing/2016/SVG/main" r:embed="rId4"/>
+              </a:ext>
+            </a:extLst>
+          </a:blip>
+          <a:stretch>
+            <a:fillRect/>
+          </a:stretch>
+        </p:blipFill>
+        <p:spPr>
+          <a:xfrm>
+            <a:off x="2063452" y="2923924"/>
+            <a:ext cx="643855" cy="643855"/>
+          </a:xfrm>
+          <a:prstGeom prst="rect">
+            <a:avLst/>
+          </a:prstGeom>
+        </p:spPr>
+      </p:pic>
+      <p:sp>
+        <p:nvSpPr>
+          <p:cNvPr id="5" name="TextBox 4">
+            <a:extLst>
+              <a:ext uri="{FF2B5EF4-FFF2-40B4-BE49-F238E27FC236}">
+                <a16:creationId xmlns:a16="http://schemas.microsoft.com/office/drawing/2014/main" id="{F1576821-FF5A-3840-8745-9101FB1C1201}"/>
+              </a:ext>
+            </a:extLst>
+          </p:cNvPr>
+          <p:cNvSpPr txBox="1"/>
+          <p:nvPr/>
+        </p:nvSpPr>
+        <p:spPr>
+          <a:xfrm>
+            <a:off x="1576041" y="4941826"/>
+            <a:ext cx="2333396" cy="477054"/>
+          </a:xfrm>
+          <a:prstGeom prst="rect">
+            <a:avLst/>
+          </a:prstGeom>
+          <a:noFill/>
+        </p:spPr>
+        <p:txBody>
+          <a:bodyPr wrap="none" rtlCol="0">
+            <a:spAutoFit/>
+          </a:bodyPr>
+          <a:lstStyle/>
+          <a:p>
+            <a:r>
+              <a:rPr lang="fr-FR" sz="2500" b="1" dirty="0"/>
+              <a:t>THESE ARE CATS</a:t>
+            </a:r>
+          </a:p>
+        </p:txBody>
+      </p:sp>
+      <p:pic>
+        <p:nvPicPr>
+          <p:cNvPr id="10" name="Graphic 9" descr="Cat">
+            <a:extLst>
+              <a:ext uri="{FF2B5EF4-FFF2-40B4-BE49-F238E27FC236}">
+                <a16:creationId xmlns:a16="http://schemas.microsoft.com/office/drawing/2014/main" id="{4FF3B2DE-B7F9-8343-ACC3-CA72C4F91958}"/>
+              </a:ext>
+            </a:extLst>
+          </p:cNvPr>
+          <p:cNvPicPr>
+            <a:picLocks noChangeAspect="1"/>
+          </p:cNvPicPr>
+          <p:nvPr/>
+        </p:nvPicPr>
+        <p:blipFill>
+          <a:blip r:embed="rId3">
+            <a:extLst>
+              <a:ext uri="{28A0092B-C50C-407E-A947-70E740481C1C}">
+                <a14:useLocalDpi xmlns:a14="http://schemas.microsoft.com/office/drawing/2010/main" val="0"/>
+              </a:ext>
+              <a:ext uri="{96DAC541-7B7A-43D3-8B79-37D633B846F1}">
+                <asvg:svgBlip xmlns:asvg="http://schemas.microsoft.com/office/drawing/2016/SVG/main" r:embed="rId4"/>
+              </a:ext>
+            </a:extLst>
+          </a:blip>
+          <a:stretch>
+            <a:fillRect/>
+          </a:stretch>
+        </p:blipFill>
+        <p:spPr>
+          <a:xfrm>
+            <a:off x="5293453" y="4748673"/>
+            <a:ext cx="643855" cy="643855"/>
+          </a:xfrm>
+          <a:prstGeom prst="rect">
+            <a:avLst/>
+          </a:prstGeom>
+        </p:spPr>
+      </p:pic>
+      <p:pic>
+        <p:nvPicPr>
+          <p:cNvPr id="12" name="Graphic 11" descr="Dog">
+            <a:extLst>
+              <a:ext uri="{FF2B5EF4-FFF2-40B4-BE49-F238E27FC236}">
+                <a16:creationId xmlns:a16="http://schemas.microsoft.com/office/drawing/2014/main" id="{114D866F-A11F-7D4F-8881-00152ACABB6A}"/>
+              </a:ext>
+            </a:extLst>
+          </p:cNvPr>
+          <p:cNvPicPr>
+            <a:picLocks noChangeAspect="1"/>
+          </p:cNvPicPr>
+          <p:nvPr/>
+        </p:nvPicPr>
+        <p:blipFill>
+          <a:blip r:embed="rId5">
+            <a:extLst>
+              <a:ext uri="{28A0092B-C50C-407E-A947-70E740481C1C}">
+                <a14:useLocalDpi xmlns:a14="http://schemas.microsoft.com/office/drawing/2010/main" val="0"/>
+              </a:ext>
+              <a:ext uri="{96DAC541-7B7A-43D3-8B79-37D633B846F1}">
+                <asvg:svgBlip xmlns:asvg="http://schemas.microsoft.com/office/drawing/2016/SVG/main" r:embed="rId6"/>
+              </a:ext>
+            </a:extLst>
+          </a:blip>
+          <a:stretch>
+            <a:fillRect/>
+          </a:stretch>
+        </p:blipFill>
+        <p:spPr>
+          <a:xfrm>
+            <a:off x="6064191" y="4613400"/>
+            <a:ext cx="914400" cy="914400"/>
+          </a:xfrm>
+          <a:prstGeom prst="rect">
+            <a:avLst/>
+          </a:prstGeom>
+        </p:spPr>
+      </p:pic>
+      <p:pic>
+        <p:nvPicPr>
+          <p:cNvPr id="14" name="Graphic 13" descr="Computer">
+            <a:extLst>
+              <a:ext uri="{FF2B5EF4-FFF2-40B4-BE49-F238E27FC236}">
+                <a16:creationId xmlns:a16="http://schemas.microsoft.com/office/drawing/2014/main" id="{04551B75-AFD8-B94A-809C-27B9E674CCDF}"/>
+              </a:ext>
+            </a:extLst>
+          </p:cNvPr>
+          <p:cNvPicPr>
+            <a:picLocks noChangeAspect="1"/>
+          </p:cNvPicPr>
+          <p:nvPr/>
+        </p:nvPicPr>
+        <p:blipFill>
+          <a:blip r:embed="rId7">
+            <a:extLst>
+              <a:ext uri="{28A0092B-C50C-407E-A947-70E740481C1C}">
+                <a14:useLocalDpi xmlns:a14="http://schemas.microsoft.com/office/drawing/2010/main" val="0"/>
+              </a:ext>
+              <a:ext uri="{96DAC541-7B7A-43D3-8B79-37D633B846F1}">
+                <asvg:svgBlip xmlns:asvg="http://schemas.microsoft.com/office/drawing/2016/SVG/main" r:embed="rId8"/>
+              </a:ext>
+            </a:extLst>
+          </a:blip>
+          <a:stretch>
+            <a:fillRect/>
+          </a:stretch>
+        </p:blipFill>
+        <p:spPr>
+          <a:xfrm>
+            <a:off x="5627990" y="2160354"/>
+            <a:ext cx="1507921" cy="1507921"/>
+          </a:xfrm>
+          <a:prstGeom prst="rect">
+            <a:avLst/>
+          </a:prstGeom>
+        </p:spPr>
+      </p:pic>
+      <p:pic>
+        <p:nvPicPr>
+          <p:cNvPr id="16" name="Graphic 15" descr="Thought bubble">
+            <a:extLst>
+              <a:ext uri="{FF2B5EF4-FFF2-40B4-BE49-F238E27FC236}">
+                <a16:creationId xmlns:a16="http://schemas.microsoft.com/office/drawing/2014/main" id="{078A6290-4F11-FB46-968A-A77259C861FF}"/>
+              </a:ext>
+            </a:extLst>
+          </p:cNvPr>
+          <p:cNvPicPr>
+            <a:picLocks noChangeAspect="1"/>
+          </p:cNvPicPr>
+          <p:nvPr/>
+        </p:nvPicPr>
+        <p:blipFill>
+          <a:blip r:embed="rId9">
+            <a:extLst>
+              <a:ext uri="{28A0092B-C50C-407E-A947-70E740481C1C}">
+                <a14:useLocalDpi xmlns:a14="http://schemas.microsoft.com/office/drawing/2010/main" val="0"/>
+              </a:ext>
+              <a:ext uri="{96DAC541-7B7A-43D3-8B79-37D633B846F1}">
+                <asvg:svgBlip xmlns:asvg="http://schemas.microsoft.com/office/drawing/2016/SVG/main" r:embed="rId10"/>
+              </a:ext>
+            </a:extLst>
+          </a:blip>
+          <a:stretch>
+            <a:fillRect/>
+          </a:stretch>
+        </p:blipFill>
+        <p:spPr>
+          <a:xfrm>
+            <a:off x="8277290" y="1973465"/>
+            <a:ext cx="1764332" cy="1764332"/>
+          </a:xfrm>
+          <a:prstGeom prst="rect">
+            <a:avLst/>
+          </a:prstGeom>
+        </p:spPr>
+      </p:pic>
+      <p:sp>
+        <p:nvSpPr>
+          <p:cNvPr id="17" name="Rounded Rectangle 16">
+            <a:extLst>
+              <a:ext uri="{FF2B5EF4-FFF2-40B4-BE49-F238E27FC236}">
+                <a16:creationId xmlns:a16="http://schemas.microsoft.com/office/drawing/2014/main" id="{E2488A7C-975E-7941-852D-5D531557D976}"/>
+              </a:ext>
+            </a:extLst>
+          </p:cNvPr>
+          <p:cNvSpPr/>
+          <p:nvPr/>
+        </p:nvSpPr>
+        <p:spPr>
+          <a:xfrm>
+            <a:off x="1456719" y="1988190"/>
+            <a:ext cx="2007934" cy="1837189"/>
+          </a:xfrm>
+          <a:prstGeom prst="roundRect">
+            <a:avLst/>
+          </a:prstGeom>
+          <a:noFill/>
+          <a:ln w="41275">
+            <a:solidFill>
+              <a:schemeClr val="tx1">
+                <a:lumMod val="75000"/>
+                <a:lumOff val="25000"/>
+              </a:schemeClr>
+            </a:solidFill>
+          </a:ln>
+        </p:spPr>
+        <p:style>
+          <a:lnRef idx="2">
+            <a:schemeClr val="accent1">
+              <a:shade val="50000"/>
+            </a:schemeClr>
+          </a:lnRef>
+          <a:fillRef idx="1">
+            <a:schemeClr val="accent1"/>
+          </a:fillRef>
+          <a:effectRef idx="0">
+            <a:schemeClr val="accent1"/>
+          </a:effectRef>
+          <a:fontRef idx="minor">
+            <a:schemeClr val="lt1"/>
+          </a:fontRef>
+        </p:style>
+        <p:txBody>
+          <a:bodyPr rtlCol="0" anchor="ctr"/>
+          <a:lstStyle/>
+          <a:p>
+            <a:pPr algn="ctr"/>
+            <a:endParaRPr lang="fr-FR" dirty="0"/>
+          </a:p>
+        </p:txBody>
+      </p:sp>
+      <p:sp>
+        <p:nvSpPr>
+          <p:cNvPr id="18" name="TextBox 17">
+            <a:extLst>
+              <a:ext uri="{FF2B5EF4-FFF2-40B4-BE49-F238E27FC236}">
+                <a16:creationId xmlns:a16="http://schemas.microsoft.com/office/drawing/2014/main" id="{B4AAE357-DC04-7B41-ABE0-FF41B34720D4}"/>
+              </a:ext>
+            </a:extLst>
+          </p:cNvPr>
+          <p:cNvSpPr txBox="1"/>
+          <p:nvPr/>
+        </p:nvSpPr>
+        <p:spPr>
+          <a:xfrm>
+            <a:off x="1855475" y="3869246"/>
+            <a:ext cx="1230530" cy="307777"/>
+          </a:xfrm>
+          <a:prstGeom prst="rect">
+            <a:avLst/>
+          </a:prstGeom>
+          <a:noFill/>
+        </p:spPr>
+        <p:txBody>
+          <a:bodyPr wrap="none" rtlCol="0">
+            <a:spAutoFit/>
+          </a:bodyPr>
+          <a:lstStyle/>
+          <a:p>
+            <a:r>
+              <a:rPr lang="fr-FR" sz="1400" b="1" dirty="0"/>
+              <a:t>KNOWN DATA</a:t>
+            </a:r>
+          </a:p>
+        </p:txBody>
+      </p:sp>
+      <p:sp>
+        <p:nvSpPr>
+          <p:cNvPr id="19" name="TextBox 18">
+            <a:extLst>
+              <a:ext uri="{FF2B5EF4-FFF2-40B4-BE49-F238E27FC236}">
+                <a16:creationId xmlns:a16="http://schemas.microsoft.com/office/drawing/2014/main" id="{09FED00B-5D12-3442-BE4C-1793307EF8BF}"/>
+              </a:ext>
+            </a:extLst>
+          </p:cNvPr>
+          <p:cNvSpPr txBox="1"/>
+          <p:nvPr/>
+        </p:nvSpPr>
+        <p:spPr>
+          <a:xfrm>
+            <a:off x="1843775" y="5525974"/>
+            <a:ext cx="1625060" cy="307777"/>
+          </a:xfrm>
+          <a:prstGeom prst="rect">
+            <a:avLst/>
+          </a:prstGeom>
+          <a:noFill/>
+        </p:spPr>
+        <p:txBody>
+          <a:bodyPr wrap="none" rtlCol="0">
+            <a:spAutoFit/>
+          </a:bodyPr>
+          <a:lstStyle/>
+          <a:p>
+            <a:r>
+              <a:rPr lang="fr-FR" sz="1400" b="1" dirty="0"/>
+              <a:t>KNOWN RESPONSE</a:t>
+            </a:r>
+          </a:p>
+        </p:txBody>
+      </p:sp>
+      <p:sp>
+        <p:nvSpPr>
+          <p:cNvPr id="20" name="Rounded Rectangle 19">
+            <a:extLst>
+              <a:ext uri="{FF2B5EF4-FFF2-40B4-BE49-F238E27FC236}">
+                <a16:creationId xmlns:a16="http://schemas.microsoft.com/office/drawing/2014/main" id="{55E25CC0-7A4C-2047-AD4B-9CFD479A465D}"/>
+              </a:ext>
+            </a:extLst>
+          </p:cNvPr>
+          <p:cNvSpPr/>
+          <p:nvPr/>
+        </p:nvSpPr>
+        <p:spPr>
+          <a:xfrm>
+            <a:off x="1455866" y="4850570"/>
+            <a:ext cx="2580305" cy="675404"/>
+          </a:xfrm>
+          <a:prstGeom prst="roundRect">
+            <a:avLst/>
+          </a:prstGeom>
+          <a:noFill/>
+          <a:ln w="41275">
+            <a:solidFill>
+              <a:schemeClr val="tx1">
+                <a:lumMod val="75000"/>
+                <a:lumOff val="25000"/>
+              </a:schemeClr>
+            </a:solidFill>
+          </a:ln>
+        </p:spPr>
+        <p:style>
+          <a:lnRef idx="2">
+            <a:schemeClr val="accent1">
+              <a:shade val="50000"/>
+            </a:schemeClr>
+          </a:lnRef>
+          <a:fillRef idx="1">
+            <a:schemeClr val="accent1"/>
+          </a:fillRef>
+          <a:effectRef idx="0">
+            <a:schemeClr val="accent1"/>
+          </a:effectRef>
+          <a:fontRef idx="minor">
+            <a:schemeClr val="lt1"/>
+          </a:fontRef>
+        </p:style>
+        <p:txBody>
+          <a:bodyPr rtlCol="0" anchor="ctr"/>
+          <a:lstStyle/>
+          <a:p>
+            <a:pPr algn="ctr"/>
+            <a:endParaRPr lang="fr-FR" dirty="0"/>
+          </a:p>
+        </p:txBody>
+      </p:sp>
+      <p:sp>
+        <p:nvSpPr>
+          <p:cNvPr id="21" name="TextBox 20">
+            <a:extLst>
+              <a:ext uri="{FF2B5EF4-FFF2-40B4-BE49-F238E27FC236}">
+                <a16:creationId xmlns:a16="http://schemas.microsoft.com/office/drawing/2014/main" id="{9813CFB4-4CA6-9C40-81C7-9B383452ABF2}"/>
+              </a:ext>
+            </a:extLst>
+          </p:cNvPr>
+          <p:cNvSpPr txBox="1"/>
+          <p:nvPr/>
+        </p:nvSpPr>
+        <p:spPr>
+          <a:xfrm>
+            <a:off x="8397260" y="3706530"/>
+            <a:ext cx="1377172" cy="307777"/>
+          </a:xfrm>
+          <a:prstGeom prst="rect">
+            <a:avLst/>
+          </a:prstGeom>
+          <a:noFill/>
+        </p:spPr>
+        <p:txBody>
+          <a:bodyPr wrap="none" rtlCol="0">
+            <a:spAutoFit/>
+          </a:bodyPr>
+          <a:lstStyle/>
+          <a:p>
+            <a:r>
+              <a:rPr lang="fr-FR" sz="1400" b="1" dirty="0"/>
+              <a:t>NEW RESPONSE</a:t>
+            </a:r>
+          </a:p>
+        </p:txBody>
+      </p:sp>
+      <p:sp>
+        <p:nvSpPr>
+          <p:cNvPr id="22" name="TextBox 21">
+            <a:extLst>
+              <a:ext uri="{FF2B5EF4-FFF2-40B4-BE49-F238E27FC236}">
+                <a16:creationId xmlns:a16="http://schemas.microsoft.com/office/drawing/2014/main" id="{B2DBD813-61FF-294D-BAF3-F9D345AB59EA}"/>
+              </a:ext>
+            </a:extLst>
+          </p:cNvPr>
+          <p:cNvSpPr txBox="1"/>
+          <p:nvPr/>
+        </p:nvSpPr>
+        <p:spPr>
+          <a:xfrm>
+            <a:off x="5389358" y="5510753"/>
+            <a:ext cx="982641" cy="307777"/>
+          </a:xfrm>
+          <a:prstGeom prst="rect">
+            <a:avLst/>
+          </a:prstGeom>
+          <a:noFill/>
+        </p:spPr>
+        <p:txBody>
+          <a:bodyPr wrap="none" rtlCol="0">
+            <a:spAutoFit/>
+          </a:bodyPr>
+          <a:lstStyle/>
+          <a:p>
+            <a:r>
+              <a:rPr lang="fr-FR" sz="1400" b="1" dirty="0"/>
+              <a:t>NEW DATA</a:t>
+            </a:r>
+          </a:p>
+        </p:txBody>
+      </p:sp>
+      <p:cxnSp>
+        <p:nvCxnSpPr>
+          <p:cNvPr id="24" name="Straight Arrow Connector 23">
+            <a:extLst>
+              <a:ext uri="{FF2B5EF4-FFF2-40B4-BE49-F238E27FC236}">
+                <a16:creationId xmlns:a16="http://schemas.microsoft.com/office/drawing/2014/main" id="{D6485910-0C7A-9D4E-B557-CCBDE6DE228D}"/>
+              </a:ext>
+            </a:extLst>
+          </p:cNvPr>
+          <p:cNvCxnSpPr/>
+          <p:nvPr/>
+        </p:nvCxnSpPr>
+        <p:spPr>
+          <a:xfrm>
+            <a:off x="3724712" y="2923924"/>
+            <a:ext cx="1568741" cy="0"/>
+          </a:xfrm>
+          <a:prstGeom prst="straightConnector1">
+            <a:avLst/>
+          </a:prstGeom>
+          <a:ln w="41275">
+            <a:solidFill>
+              <a:schemeClr val="tx1">
+                <a:lumMod val="75000"/>
+                <a:lumOff val="25000"/>
+              </a:schemeClr>
+            </a:solidFill>
+            <a:tailEnd type="triangle"/>
+          </a:ln>
+        </p:spPr>
+        <p:style>
+          <a:lnRef idx="1">
+            <a:schemeClr val="accent1"/>
+          </a:lnRef>
+          <a:fillRef idx="0">
+            <a:schemeClr val="accent1"/>
+          </a:fillRef>
+          <a:effectRef idx="0">
+            <a:schemeClr val="accent1"/>
+          </a:effectRef>
+          <a:fontRef idx="minor">
+            <a:schemeClr val="tx1"/>
+          </a:fontRef>
+        </p:style>
+      </p:cxnSp>
+      <p:cxnSp>
+        <p:nvCxnSpPr>
+          <p:cNvPr id="25" name="Straight Arrow Connector 24">
+            <a:extLst>
+              <a:ext uri="{FF2B5EF4-FFF2-40B4-BE49-F238E27FC236}">
+                <a16:creationId xmlns:a16="http://schemas.microsoft.com/office/drawing/2014/main" id="{10521483-E927-6445-ADEF-B97C39ACE532}"/>
+              </a:ext>
+            </a:extLst>
+          </p:cNvPr>
+          <p:cNvCxnSpPr>
+            <a:cxnSpLocks/>
+          </p:cNvCxnSpPr>
+          <p:nvPr/>
+        </p:nvCxnSpPr>
+        <p:spPr>
+          <a:xfrm flipV="1">
+            <a:off x="4036171" y="3422708"/>
+            <a:ext cx="1257282" cy="1174978"/>
+          </a:xfrm>
+          <a:prstGeom prst="straightConnector1">
+            <a:avLst/>
+          </a:prstGeom>
+          <a:ln w="41275">
+            <a:solidFill>
+              <a:schemeClr val="tx1">
+                <a:lumMod val="75000"/>
+                <a:lumOff val="25000"/>
+              </a:schemeClr>
+            </a:solidFill>
+            <a:tailEnd type="triangle"/>
+          </a:ln>
+        </p:spPr>
+        <p:style>
+          <a:lnRef idx="1">
+            <a:schemeClr val="accent1"/>
+          </a:lnRef>
+          <a:fillRef idx="0">
+            <a:schemeClr val="accent1"/>
+          </a:fillRef>
+          <a:effectRef idx="0">
+            <a:schemeClr val="accent1"/>
+          </a:effectRef>
+          <a:fontRef idx="minor">
+            <a:schemeClr val="tx1"/>
+          </a:fontRef>
+        </p:style>
+      </p:cxnSp>
+      <p:pic>
+        <p:nvPicPr>
+          <p:cNvPr id="29" name="Graphic 28" descr="Brain">
+            <a:extLst>
+              <a:ext uri="{FF2B5EF4-FFF2-40B4-BE49-F238E27FC236}">
+                <a16:creationId xmlns:a16="http://schemas.microsoft.com/office/drawing/2014/main" id="{7E90D8CE-89DF-4845-A6F7-426B37A56E49}"/>
+              </a:ext>
+            </a:extLst>
+          </p:cNvPr>
+          <p:cNvPicPr>
+            <a:picLocks noChangeAspect="1"/>
+          </p:cNvPicPr>
+          <p:nvPr/>
+        </p:nvPicPr>
+        <p:blipFill>
+          <a:blip r:embed="rId11">
+            <a:extLst>
+              <a:ext uri="{28A0092B-C50C-407E-A947-70E740481C1C}">
+                <a14:useLocalDpi xmlns:a14="http://schemas.microsoft.com/office/drawing/2010/main" val="0"/>
+              </a:ext>
+              <a:ext uri="{96DAC541-7B7A-43D3-8B79-37D633B846F1}">
+                <asvg:svgBlip xmlns:asvg="http://schemas.microsoft.com/office/drawing/2016/SVG/main" r:embed="rId12"/>
+              </a:ext>
+            </a:extLst>
+          </a:blip>
+          <a:stretch>
+            <a:fillRect/>
+          </a:stretch>
+        </p:blipFill>
+        <p:spPr>
+          <a:xfrm>
+            <a:off x="5869961" y="2599176"/>
+            <a:ext cx="467686" cy="467686"/>
+          </a:xfrm>
+          <a:prstGeom prst="rect">
+            <a:avLst/>
+          </a:prstGeom>
+        </p:spPr>
+      </p:pic>
+      <p:cxnSp>
+        <p:nvCxnSpPr>
+          <p:cNvPr id="30" name="Straight Arrow Connector 29">
+            <a:extLst>
+              <a:ext uri="{FF2B5EF4-FFF2-40B4-BE49-F238E27FC236}">
+                <a16:creationId xmlns:a16="http://schemas.microsoft.com/office/drawing/2014/main" id="{BF802C83-6F5E-5D4E-8E00-C61ACAE34014}"/>
+              </a:ext>
+            </a:extLst>
+          </p:cNvPr>
+          <p:cNvCxnSpPr>
+            <a:cxnSpLocks/>
+          </p:cNvCxnSpPr>
+          <p:nvPr/>
+        </p:nvCxnSpPr>
+        <p:spPr>
+          <a:xfrm>
+            <a:off x="7313128" y="2833019"/>
+            <a:ext cx="897050" cy="0"/>
+          </a:xfrm>
+          <a:prstGeom prst="straightConnector1">
+            <a:avLst/>
+          </a:prstGeom>
+          <a:ln w="41275">
+            <a:solidFill>
+              <a:schemeClr val="tx1">
+                <a:lumMod val="75000"/>
+                <a:lumOff val="25000"/>
+              </a:schemeClr>
+            </a:solidFill>
+            <a:tailEnd type="triangle"/>
+          </a:ln>
+        </p:spPr>
+        <p:style>
+          <a:lnRef idx="1">
+            <a:schemeClr val="accent1"/>
+          </a:lnRef>
+          <a:fillRef idx="0">
+            <a:schemeClr val="accent1"/>
+          </a:fillRef>
+          <a:effectRef idx="0">
+            <a:schemeClr val="accent1"/>
+          </a:effectRef>
+          <a:fontRef idx="minor">
+            <a:schemeClr val="tx1"/>
+          </a:fontRef>
+        </p:style>
+      </p:cxnSp>
+      <p:sp>
+        <p:nvSpPr>
+          <p:cNvPr id="32" name="TextBox 31">
+            <a:extLst>
+              <a:ext uri="{FF2B5EF4-FFF2-40B4-BE49-F238E27FC236}">
+                <a16:creationId xmlns:a16="http://schemas.microsoft.com/office/drawing/2014/main" id="{E38D79E8-F45C-C64C-BC39-3F049619CAEF}"/>
+              </a:ext>
+            </a:extLst>
+          </p:cNvPr>
+          <p:cNvSpPr txBox="1"/>
+          <p:nvPr/>
+        </p:nvSpPr>
+        <p:spPr>
+          <a:xfrm>
+            <a:off x="7120917" y="4647329"/>
+            <a:ext cx="612397" cy="784830"/>
+          </a:xfrm>
+          <a:prstGeom prst="rect">
+            <a:avLst/>
+          </a:prstGeom>
+          <a:noFill/>
+        </p:spPr>
+        <p:txBody>
+          <a:bodyPr wrap="square" rtlCol="0">
+            <a:spAutoFit/>
+          </a:bodyPr>
+          <a:lstStyle/>
+          <a:p>
+            <a:r>
+              <a:rPr lang="fr-FR" sz="4500" dirty="0">
+                <a:latin typeface="Arial Rounded MT Bold" panose="020F0704030504030204" pitchFamily="34" charset="77"/>
+              </a:rPr>
+              <a:t>?</a:t>
+            </a:r>
+          </a:p>
+        </p:txBody>
+      </p:sp>
+      <p:sp>
+        <p:nvSpPr>
+          <p:cNvPr id="33" name="TextBox 32">
+            <a:extLst>
+              <a:ext uri="{FF2B5EF4-FFF2-40B4-BE49-F238E27FC236}">
+                <a16:creationId xmlns:a16="http://schemas.microsoft.com/office/drawing/2014/main" id="{AB276893-A9B5-114F-9BE6-689C57A4A111}"/>
+              </a:ext>
+            </a:extLst>
+          </p:cNvPr>
+          <p:cNvSpPr txBox="1"/>
+          <p:nvPr/>
+        </p:nvSpPr>
+        <p:spPr>
+          <a:xfrm>
+            <a:off x="5733994" y="3418597"/>
+            <a:ext cx="740908" cy="307777"/>
+          </a:xfrm>
+          <a:prstGeom prst="rect">
+            <a:avLst/>
+          </a:prstGeom>
+          <a:noFill/>
+        </p:spPr>
+        <p:txBody>
+          <a:bodyPr wrap="none" rtlCol="0">
+            <a:spAutoFit/>
+          </a:bodyPr>
+          <a:lstStyle/>
+          <a:p>
+            <a:r>
+              <a:rPr lang="fr-FR" sz="1400" b="1" dirty="0">
+                <a:solidFill>
+                  <a:schemeClr val="accent6"/>
+                </a:solidFill>
+              </a:rPr>
+              <a:t>MODEL</a:t>
+            </a:r>
+          </a:p>
+        </p:txBody>
+      </p:sp>
+      <p:cxnSp>
+        <p:nvCxnSpPr>
+          <p:cNvPr id="34" name="Straight Arrow Connector 33">
+            <a:extLst>
+              <a:ext uri="{FF2B5EF4-FFF2-40B4-BE49-F238E27FC236}">
+                <a16:creationId xmlns:a16="http://schemas.microsoft.com/office/drawing/2014/main" id="{837F10BE-7AB3-3548-971A-24CB7ACB9AB0}"/>
+              </a:ext>
+            </a:extLst>
+          </p:cNvPr>
+          <p:cNvCxnSpPr>
+            <a:cxnSpLocks/>
+          </p:cNvCxnSpPr>
+          <p:nvPr/>
+        </p:nvCxnSpPr>
+        <p:spPr>
+          <a:xfrm flipV="1">
+            <a:off x="6398728" y="3851487"/>
+            <a:ext cx="0" cy="713207"/>
+          </a:xfrm>
+          <a:prstGeom prst="straightConnector1">
+            <a:avLst/>
+          </a:prstGeom>
+          <a:ln w="41275">
+            <a:solidFill>
+              <a:schemeClr val="tx1">
+                <a:lumMod val="75000"/>
+                <a:lumOff val="25000"/>
+              </a:schemeClr>
+            </a:solidFill>
+            <a:tailEnd type="triangle"/>
+          </a:ln>
+        </p:spPr>
+        <p:style>
+          <a:lnRef idx="1">
+            <a:schemeClr val="accent1"/>
+          </a:lnRef>
+          <a:fillRef idx="0">
+            <a:schemeClr val="accent1"/>
+          </a:fillRef>
+          <a:effectRef idx="0">
+            <a:schemeClr val="accent1"/>
+          </a:effectRef>
+          <a:fontRef idx="minor">
+            <a:schemeClr val="tx1"/>
+          </a:fontRef>
+        </p:style>
+      </p:cxnSp>
     </p:spTree>
     <p:extLst>
       <p:ext uri="{BB962C8B-B14F-4D97-AF65-F5344CB8AC3E}">
-        <p14:creationId xmlns:p14="http://schemas.microsoft.com/office/powerpoint/2010/main" val="3427956302"/>
+        <p14:creationId xmlns:p14="http://schemas.microsoft.com/office/powerpoint/2010/main" val="2115883796"/>
       </p:ext>
     </p:extLst>
   </p:cSld>
@@ -8843,17 +9941,212 @@
                 </a:solidFill>
                 <a:latin typeface="Cambria" panose="02040503050406030204" pitchFamily="18" charset="0"/>
               </a:rPr>
-              <a:t>THE RACE FOR AI</a:t>
-            </a:r>
-          </a:p>
-        </p:txBody>
-      </p:sp>
-      <p:sp>
-        <p:nvSpPr>
-          <p:cNvPr id="6" name="TextBox 5">
+              <a:t>UNSUPERVISED LEARNING</a:t>
+            </a:r>
+          </a:p>
+        </p:txBody>
+      </p:sp>
+      <p:pic>
+        <p:nvPicPr>
+          <p:cNvPr id="4" name="Graphic 3" descr="Cat">
             <a:extLst>
               <a:ext uri="{FF2B5EF4-FFF2-40B4-BE49-F238E27FC236}">
-                <a16:creationId xmlns:a16="http://schemas.microsoft.com/office/drawing/2014/main" id="{80CDDE41-8C09-D54C-917C-9FB77CE4824D}"/>
+                <a16:creationId xmlns:a16="http://schemas.microsoft.com/office/drawing/2014/main" id="{B1606297-9C3D-614A-8FF4-35EC8104A34A}"/>
+              </a:ext>
+            </a:extLst>
+          </p:cNvPr>
+          <p:cNvPicPr>
+            <a:picLocks noChangeAspect="1"/>
+          </p:cNvPicPr>
+          <p:nvPr/>
+        </p:nvPicPr>
+        <p:blipFill>
+          <a:blip r:embed="rId3">
+            <a:extLst>
+              <a:ext uri="{28A0092B-C50C-407E-A947-70E740481C1C}">
+                <a14:useLocalDpi xmlns:a14="http://schemas.microsoft.com/office/drawing/2010/main" val="0"/>
+              </a:ext>
+              <a:ext uri="{96DAC541-7B7A-43D3-8B79-37D633B846F1}">
+                <asvg:svgBlip xmlns:asvg="http://schemas.microsoft.com/office/drawing/2016/SVG/main" r:embed="rId4"/>
+              </a:ext>
+            </a:extLst>
+          </a:blip>
+          <a:stretch>
+            <a:fillRect/>
+          </a:stretch>
+        </p:blipFill>
+        <p:spPr>
+          <a:xfrm>
+            <a:off x="1533547" y="2277248"/>
+            <a:ext cx="643855" cy="643855"/>
+          </a:xfrm>
+          <a:prstGeom prst="rect">
+            <a:avLst/>
+          </a:prstGeom>
+        </p:spPr>
+      </p:pic>
+      <p:pic>
+        <p:nvPicPr>
+          <p:cNvPr id="7" name="Graphic 6" descr="Cat">
+            <a:extLst>
+              <a:ext uri="{FF2B5EF4-FFF2-40B4-BE49-F238E27FC236}">
+                <a16:creationId xmlns:a16="http://schemas.microsoft.com/office/drawing/2014/main" id="{6C43DDEE-8F1F-8A49-A0BD-08BA07C327AD}"/>
+              </a:ext>
+            </a:extLst>
+          </p:cNvPr>
+          <p:cNvPicPr>
+            <a:picLocks noChangeAspect="1"/>
+          </p:cNvPicPr>
+          <p:nvPr/>
+        </p:nvPicPr>
+        <p:blipFill>
+          <a:blip r:embed="rId3">
+            <a:extLst>
+              <a:ext uri="{28A0092B-C50C-407E-A947-70E740481C1C}">
+                <a14:useLocalDpi xmlns:a14="http://schemas.microsoft.com/office/drawing/2010/main" val="0"/>
+              </a:ext>
+              <a:ext uri="{96DAC541-7B7A-43D3-8B79-37D633B846F1}">
+                <asvg:svgBlip xmlns:asvg="http://schemas.microsoft.com/office/drawing/2016/SVG/main" r:embed="rId4"/>
+              </a:ext>
+            </a:extLst>
+          </a:blip>
+          <a:stretch>
+            <a:fillRect/>
+          </a:stretch>
+        </p:blipFill>
+        <p:spPr>
+          <a:xfrm>
+            <a:off x="1448559" y="3793326"/>
+            <a:ext cx="643855" cy="643855"/>
+          </a:xfrm>
+          <a:prstGeom prst="rect">
+            <a:avLst/>
+          </a:prstGeom>
+        </p:spPr>
+      </p:pic>
+      <p:pic>
+        <p:nvPicPr>
+          <p:cNvPr id="9" name="Graphic 8" descr="Cat">
+            <a:extLst>
+              <a:ext uri="{FF2B5EF4-FFF2-40B4-BE49-F238E27FC236}">
+                <a16:creationId xmlns:a16="http://schemas.microsoft.com/office/drawing/2014/main" id="{E87FB87B-6302-384E-8CE1-7AFD78B55EF0}"/>
+              </a:ext>
+            </a:extLst>
+          </p:cNvPr>
+          <p:cNvPicPr>
+            <a:picLocks noChangeAspect="1"/>
+          </p:cNvPicPr>
+          <p:nvPr/>
+        </p:nvPicPr>
+        <p:blipFill>
+          <a:blip r:embed="rId3">
+            <a:extLst>
+              <a:ext uri="{28A0092B-C50C-407E-A947-70E740481C1C}">
+                <a14:useLocalDpi xmlns:a14="http://schemas.microsoft.com/office/drawing/2010/main" val="0"/>
+              </a:ext>
+              <a:ext uri="{96DAC541-7B7A-43D3-8B79-37D633B846F1}">
+                <asvg:svgBlip xmlns:asvg="http://schemas.microsoft.com/office/drawing/2016/SVG/main" r:embed="rId4"/>
+              </a:ext>
+            </a:extLst>
+          </a:blip>
+          <a:stretch>
+            <a:fillRect/>
+          </a:stretch>
+        </p:blipFill>
+        <p:spPr>
+          <a:xfrm>
+            <a:off x="2374361" y="3078706"/>
+            <a:ext cx="643855" cy="643855"/>
+          </a:xfrm>
+          <a:prstGeom prst="rect">
+            <a:avLst/>
+          </a:prstGeom>
+        </p:spPr>
+      </p:pic>
+      <p:pic>
+        <p:nvPicPr>
+          <p:cNvPr id="12" name="Graphic 11" descr="Dog">
+            <a:extLst>
+              <a:ext uri="{FF2B5EF4-FFF2-40B4-BE49-F238E27FC236}">
+                <a16:creationId xmlns:a16="http://schemas.microsoft.com/office/drawing/2014/main" id="{114D866F-A11F-7D4F-8881-00152ACABB6A}"/>
+              </a:ext>
+            </a:extLst>
+          </p:cNvPr>
+          <p:cNvPicPr>
+            <a:picLocks noChangeAspect="1"/>
+          </p:cNvPicPr>
+          <p:nvPr/>
+        </p:nvPicPr>
+        <p:blipFill>
+          <a:blip r:embed="rId5">
+            <a:extLst>
+              <a:ext uri="{28A0092B-C50C-407E-A947-70E740481C1C}">
+                <a14:useLocalDpi xmlns:a14="http://schemas.microsoft.com/office/drawing/2010/main" val="0"/>
+              </a:ext>
+              <a:ext uri="{96DAC541-7B7A-43D3-8B79-37D633B846F1}">
+                <asvg:svgBlip xmlns:asvg="http://schemas.microsoft.com/office/drawing/2016/SVG/main" r:embed="rId6"/>
+              </a:ext>
+            </a:extLst>
+          </a:blip>
+          <a:stretch>
+            <a:fillRect/>
+          </a:stretch>
+        </p:blipFill>
+        <p:spPr>
+          <a:xfrm>
+            <a:off x="2239089" y="2137276"/>
+            <a:ext cx="914400" cy="914400"/>
+          </a:xfrm>
+          <a:prstGeom prst="rect">
+            <a:avLst/>
+          </a:prstGeom>
+        </p:spPr>
+      </p:pic>
+      <p:pic>
+        <p:nvPicPr>
+          <p:cNvPr id="14" name="Graphic 13" descr="Computer">
+            <a:extLst>
+              <a:ext uri="{FF2B5EF4-FFF2-40B4-BE49-F238E27FC236}">
+                <a16:creationId xmlns:a16="http://schemas.microsoft.com/office/drawing/2014/main" id="{04551B75-AFD8-B94A-809C-27B9E674CCDF}"/>
+              </a:ext>
+            </a:extLst>
+          </p:cNvPr>
+          <p:cNvPicPr>
+            <a:picLocks noChangeAspect="1"/>
+          </p:cNvPicPr>
+          <p:nvPr/>
+        </p:nvPicPr>
+        <p:blipFill>
+          <a:blip r:embed="rId7">
+            <a:extLst>
+              <a:ext uri="{28A0092B-C50C-407E-A947-70E740481C1C}">
+                <a14:useLocalDpi xmlns:a14="http://schemas.microsoft.com/office/drawing/2010/main" val="0"/>
+              </a:ext>
+              <a:ext uri="{96DAC541-7B7A-43D3-8B79-37D633B846F1}">
+                <asvg:svgBlip xmlns:asvg="http://schemas.microsoft.com/office/drawing/2016/SVG/main" r:embed="rId8"/>
+              </a:ext>
+            </a:extLst>
+          </a:blip>
+          <a:stretch>
+            <a:fillRect/>
+          </a:stretch>
+        </p:blipFill>
+        <p:spPr>
+          <a:xfrm>
+            <a:off x="5250486" y="2349423"/>
+            <a:ext cx="1507921" cy="1507921"/>
+          </a:xfrm>
+          <a:prstGeom prst="rect">
+            <a:avLst/>
+          </a:prstGeom>
+        </p:spPr>
+      </p:pic>
+      <p:sp>
+        <p:nvSpPr>
+          <p:cNvPr id="18" name="TextBox 17">
+            <a:extLst>
+              <a:ext uri="{FF2B5EF4-FFF2-40B4-BE49-F238E27FC236}">
+                <a16:creationId xmlns:a16="http://schemas.microsoft.com/office/drawing/2014/main" id="{B4AAE357-DC04-7B41-ABE0-FF41B34720D4}"/>
               </a:ext>
             </a:extLst>
           </p:cNvPr>
@@ -8862,8 +10155,8 @@
         </p:nvSpPr>
         <p:spPr>
           <a:xfrm>
-            <a:off x="1275701" y="2333156"/>
-            <a:ext cx="9909364" cy="3046988"/>
+            <a:off x="1555700" y="4635500"/>
+            <a:ext cx="1462516" cy="400110"/>
           </a:xfrm>
           <a:prstGeom prst="rect">
             <a:avLst/>
@@ -8871,127 +10164,672 @@
           <a:noFill/>
         </p:spPr>
         <p:txBody>
-          <a:bodyPr wrap="square" rtlCol="0">
+          <a:bodyPr wrap="none" rtlCol="0">
             <a:spAutoFit/>
           </a:bodyPr>
           <a:lstStyle/>
           <a:p>
-            <a:pPr marL="342900" indent="-342900">
-              <a:buFont typeface="Arial"/>
-              <a:buChar char="•"/>
-            </a:pPr>
-            <a:r>
-              <a:rPr lang="en-US" sz="2400" b="1" dirty="0">
-                <a:solidFill>
-                  <a:schemeClr val="accent1"/>
-                </a:solidFill>
-                <a:latin typeface="Cambria" panose="02040503050406030204" pitchFamily="18" charset="0"/>
-              </a:rPr>
-              <a:t>A WORLD TOUR OF RECENT PUBLIC AI STRATEGIES/POLICIES</a:t>
-            </a:r>
-            <a:br>
-              <a:rPr lang="en-US" sz="2400" b="1" dirty="0">
-                <a:solidFill>
-                  <a:schemeClr val="accent1"/>
-                </a:solidFill>
-                <a:latin typeface="Cambria" panose="02040503050406030204" pitchFamily="18" charset="0"/>
-              </a:rPr>
-            </a:br>
-            <a:endParaRPr lang="en-US" sz="2400" b="1" dirty="0">
-              <a:solidFill>
-                <a:schemeClr val="accent1"/>
-              </a:solidFill>
-              <a:latin typeface="Cambria" panose="02040503050406030204" pitchFamily="18" charset="0"/>
-            </a:endParaRPr>
-          </a:p>
-          <a:p>
-            <a:pPr marL="342900" indent="-342900">
-              <a:buFont typeface="Arial"/>
-              <a:buChar char="•"/>
-            </a:pPr>
-            <a:r>
-              <a:rPr lang="en-US" sz="2400" b="1" dirty="0">
-                <a:solidFill>
-                  <a:schemeClr val="accent1"/>
-                </a:solidFill>
-                <a:latin typeface="Cambria" panose="02040503050406030204" pitchFamily="18" charset="0"/>
-              </a:rPr>
-              <a:t>ON WHICH ASPECTS?</a:t>
-            </a:r>
-            <a:br>
-              <a:rPr lang="en-US" sz="2400" b="1" dirty="0">
-                <a:solidFill>
-                  <a:schemeClr val="accent1"/>
-                </a:solidFill>
-                <a:latin typeface="Cambria" panose="02040503050406030204" pitchFamily="18" charset="0"/>
-              </a:rPr>
-            </a:br>
-            <a:endParaRPr lang="en-US" sz="2400" b="1" dirty="0">
-              <a:solidFill>
-                <a:schemeClr val="accent1"/>
-              </a:solidFill>
-              <a:latin typeface="Cambria" panose="02040503050406030204" pitchFamily="18" charset="0"/>
-            </a:endParaRPr>
-          </a:p>
-          <a:p>
-            <a:pPr marL="342900" indent="-342900">
-              <a:buFont typeface="Arial"/>
-              <a:buChar char="•"/>
-            </a:pPr>
-            <a:r>
-              <a:rPr lang="en-US" sz="2400" b="1" dirty="0">
-                <a:solidFill>
-                  <a:schemeClr val="accent1"/>
-                </a:solidFill>
-                <a:latin typeface="Cambria" panose="02040503050406030204" pitchFamily="18" charset="0"/>
-              </a:rPr>
-              <a:t>US vs. CHINA vs. ALL</a:t>
-            </a:r>
-            <a:br>
-              <a:rPr lang="en-US" sz="2400" b="1" dirty="0">
-                <a:solidFill>
-                  <a:schemeClr val="accent1"/>
-                </a:solidFill>
-                <a:latin typeface="Cambria" panose="02040503050406030204" pitchFamily="18" charset="0"/>
-              </a:rPr>
-            </a:br>
-            <a:endParaRPr lang="en-US" sz="2400" b="1" dirty="0">
-              <a:solidFill>
-                <a:schemeClr val="accent1"/>
-              </a:solidFill>
-              <a:latin typeface="Cambria" panose="02040503050406030204" pitchFamily="18" charset="0"/>
-            </a:endParaRPr>
-          </a:p>
-          <a:p>
-            <a:pPr marL="342900" indent="-342900">
-              <a:buFont typeface="Arial"/>
-              <a:buChar char="•"/>
-            </a:pPr>
-            <a:endParaRPr lang="en-US" sz="2400" b="1" dirty="0">
-              <a:solidFill>
-                <a:schemeClr val="accent1"/>
-              </a:solidFill>
-              <a:latin typeface="Cambria" panose="02040503050406030204" pitchFamily="18" charset="0"/>
-            </a:endParaRPr>
-          </a:p>
-          <a:p>
-            <a:pPr marL="342900" indent="-342900">
-              <a:buFont typeface="Arial"/>
-              <a:buChar char="•"/>
-            </a:pPr>
-            <a:endParaRPr lang="en-US" sz="2400" b="1" dirty="0">
-              <a:solidFill>
-                <a:schemeClr val="accent1"/>
-              </a:solidFill>
-              <a:latin typeface="Cambria" panose="02040503050406030204" pitchFamily="18" charset="0"/>
-            </a:endParaRPr>
-          </a:p>
-        </p:txBody>
-      </p:sp>
+            <a:r>
+              <a:rPr lang="fr-FR" sz="2000" b="1" dirty="0"/>
+              <a:t>INPUT DATA</a:t>
+            </a:r>
+          </a:p>
+        </p:txBody>
+      </p:sp>
+      <p:cxnSp>
+        <p:nvCxnSpPr>
+          <p:cNvPr id="24" name="Straight Arrow Connector 23">
+            <a:extLst>
+              <a:ext uri="{FF2B5EF4-FFF2-40B4-BE49-F238E27FC236}">
+                <a16:creationId xmlns:a16="http://schemas.microsoft.com/office/drawing/2014/main" id="{D6485910-0C7A-9D4E-B557-CCBDE6DE228D}"/>
+              </a:ext>
+            </a:extLst>
+          </p:cNvPr>
+          <p:cNvCxnSpPr/>
+          <p:nvPr/>
+        </p:nvCxnSpPr>
+        <p:spPr>
+          <a:xfrm>
+            <a:off x="3422708" y="3276261"/>
+            <a:ext cx="1568741" cy="0"/>
+          </a:xfrm>
+          <a:prstGeom prst="straightConnector1">
+            <a:avLst/>
+          </a:prstGeom>
+          <a:ln w="41275">
+            <a:solidFill>
+              <a:schemeClr val="tx1">
+                <a:lumMod val="75000"/>
+                <a:lumOff val="25000"/>
+              </a:schemeClr>
+            </a:solidFill>
+            <a:tailEnd type="triangle"/>
+          </a:ln>
+        </p:spPr>
+        <p:style>
+          <a:lnRef idx="1">
+            <a:schemeClr val="accent1"/>
+          </a:lnRef>
+          <a:fillRef idx="0">
+            <a:schemeClr val="accent1"/>
+          </a:fillRef>
+          <a:effectRef idx="0">
+            <a:schemeClr val="accent1"/>
+          </a:effectRef>
+          <a:fontRef idx="minor">
+            <a:schemeClr val="tx1"/>
+          </a:fontRef>
+        </p:style>
+      </p:cxnSp>
+      <p:pic>
+        <p:nvPicPr>
+          <p:cNvPr id="29" name="Graphic 28" descr="Brain">
+            <a:extLst>
+              <a:ext uri="{FF2B5EF4-FFF2-40B4-BE49-F238E27FC236}">
+                <a16:creationId xmlns:a16="http://schemas.microsoft.com/office/drawing/2014/main" id="{7E90D8CE-89DF-4845-A6F7-426B37A56E49}"/>
+              </a:ext>
+            </a:extLst>
+          </p:cNvPr>
+          <p:cNvPicPr>
+            <a:picLocks noChangeAspect="1"/>
+          </p:cNvPicPr>
+          <p:nvPr/>
+        </p:nvPicPr>
+        <p:blipFill>
+          <a:blip r:embed="rId9">
+            <a:extLst>
+              <a:ext uri="{28A0092B-C50C-407E-A947-70E740481C1C}">
+                <a14:useLocalDpi xmlns:a14="http://schemas.microsoft.com/office/drawing/2010/main" val="0"/>
+              </a:ext>
+              <a:ext uri="{96DAC541-7B7A-43D3-8B79-37D633B846F1}">
+                <asvg:svgBlip xmlns:asvg="http://schemas.microsoft.com/office/drawing/2016/SVG/main" r:embed="rId10"/>
+              </a:ext>
+            </a:extLst>
+          </a:blip>
+          <a:stretch>
+            <a:fillRect/>
+          </a:stretch>
+        </p:blipFill>
+        <p:spPr>
+          <a:xfrm>
+            <a:off x="5492457" y="2788245"/>
+            <a:ext cx="467686" cy="467686"/>
+          </a:xfrm>
+          <a:prstGeom prst="rect">
+            <a:avLst/>
+          </a:prstGeom>
+        </p:spPr>
+      </p:pic>
+      <p:cxnSp>
+        <p:nvCxnSpPr>
+          <p:cNvPr id="30" name="Straight Arrow Connector 29">
+            <a:extLst>
+              <a:ext uri="{FF2B5EF4-FFF2-40B4-BE49-F238E27FC236}">
+                <a16:creationId xmlns:a16="http://schemas.microsoft.com/office/drawing/2014/main" id="{BF802C83-6F5E-5D4E-8E00-C61ACAE34014}"/>
+              </a:ext>
+            </a:extLst>
+          </p:cNvPr>
+          <p:cNvCxnSpPr>
+            <a:cxnSpLocks/>
+          </p:cNvCxnSpPr>
+          <p:nvPr/>
+        </p:nvCxnSpPr>
+        <p:spPr>
+          <a:xfrm flipV="1">
+            <a:off x="6910456" y="2410552"/>
+            <a:ext cx="1000362" cy="510551"/>
+          </a:xfrm>
+          <a:prstGeom prst="straightConnector1">
+            <a:avLst/>
+          </a:prstGeom>
+          <a:ln w="41275">
+            <a:solidFill>
+              <a:schemeClr val="tx1">
+                <a:lumMod val="75000"/>
+                <a:lumOff val="25000"/>
+              </a:schemeClr>
+            </a:solidFill>
+            <a:tailEnd type="triangle"/>
+          </a:ln>
+        </p:spPr>
+        <p:style>
+          <a:lnRef idx="1">
+            <a:schemeClr val="accent1"/>
+          </a:lnRef>
+          <a:fillRef idx="0">
+            <a:schemeClr val="accent1"/>
+          </a:fillRef>
+          <a:effectRef idx="0">
+            <a:schemeClr val="accent1"/>
+          </a:effectRef>
+          <a:fontRef idx="minor">
+            <a:schemeClr val="tx1"/>
+          </a:fontRef>
+        </p:style>
+      </p:cxnSp>
+      <p:sp>
+        <p:nvSpPr>
+          <p:cNvPr id="33" name="TextBox 32">
+            <a:extLst>
+              <a:ext uri="{FF2B5EF4-FFF2-40B4-BE49-F238E27FC236}">
+                <a16:creationId xmlns:a16="http://schemas.microsoft.com/office/drawing/2014/main" id="{AB276893-A9B5-114F-9BE6-689C57A4A111}"/>
+              </a:ext>
+            </a:extLst>
+          </p:cNvPr>
+          <p:cNvSpPr txBox="1"/>
+          <p:nvPr/>
+        </p:nvSpPr>
+        <p:spPr>
+          <a:xfrm>
+            <a:off x="5392306" y="3683183"/>
+            <a:ext cx="740908" cy="307777"/>
+          </a:xfrm>
+          <a:prstGeom prst="rect">
+            <a:avLst/>
+          </a:prstGeom>
+          <a:noFill/>
+        </p:spPr>
+        <p:txBody>
+          <a:bodyPr wrap="none" rtlCol="0">
+            <a:spAutoFit/>
+          </a:bodyPr>
+          <a:lstStyle/>
+          <a:p>
+            <a:r>
+              <a:rPr lang="fr-FR" sz="1400" b="1" dirty="0">
+                <a:solidFill>
+                  <a:schemeClr val="accent6"/>
+                </a:solidFill>
+              </a:rPr>
+              <a:t>MODEL</a:t>
+            </a:r>
+          </a:p>
+        </p:txBody>
+      </p:sp>
+      <p:pic>
+        <p:nvPicPr>
+          <p:cNvPr id="3" name="Graphic 2" descr="Turtle">
+            <a:extLst>
+              <a:ext uri="{FF2B5EF4-FFF2-40B4-BE49-F238E27FC236}">
+                <a16:creationId xmlns:a16="http://schemas.microsoft.com/office/drawing/2014/main" id="{0C011372-E3A3-F34E-BEB4-AEB25143FF10}"/>
+              </a:ext>
+            </a:extLst>
+          </p:cNvPr>
+          <p:cNvPicPr>
+            <a:picLocks noChangeAspect="1"/>
+          </p:cNvPicPr>
+          <p:nvPr/>
+        </p:nvPicPr>
+        <p:blipFill>
+          <a:blip r:embed="rId11">
+            <a:extLst>
+              <a:ext uri="{28A0092B-C50C-407E-A947-70E740481C1C}">
+                <a14:useLocalDpi xmlns:a14="http://schemas.microsoft.com/office/drawing/2010/main" val="0"/>
+              </a:ext>
+              <a:ext uri="{96DAC541-7B7A-43D3-8B79-37D633B846F1}">
+                <asvg:svgBlip xmlns:asvg="http://schemas.microsoft.com/office/drawing/2016/SVG/main" r:embed="rId12"/>
+              </a:ext>
+            </a:extLst>
+          </a:blip>
+          <a:stretch>
+            <a:fillRect/>
+          </a:stretch>
+        </p:blipFill>
+        <p:spPr>
+          <a:xfrm>
+            <a:off x="1448559" y="3066862"/>
+            <a:ext cx="790482" cy="790482"/>
+          </a:xfrm>
+          <a:prstGeom prst="rect">
+            <a:avLst/>
+          </a:prstGeom>
+        </p:spPr>
+      </p:pic>
+      <p:pic>
+        <p:nvPicPr>
+          <p:cNvPr id="26" name="Graphic 25" descr="Dog">
+            <a:extLst>
+              <a:ext uri="{FF2B5EF4-FFF2-40B4-BE49-F238E27FC236}">
+                <a16:creationId xmlns:a16="http://schemas.microsoft.com/office/drawing/2014/main" id="{0E5397AA-213F-7442-859A-461EDF6C8493}"/>
+              </a:ext>
+            </a:extLst>
+          </p:cNvPr>
+          <p:cNvPicPr>
+            <a:picLocks noChangeAspect="1"/>
+          </p:cNvPicPr>
+          <p:nvPr/>
+        </p:nvPicPr>
+        <p:blipFill>
+          <a:blip r:embed="rId5">
+            <a:extLst>
+              <a:ext uri="{28A0092B-C50C-407E-A947-70E740481C1C}">
+                <a14:useLocalDpi xmlns:a14="http://schemas.microsoft.com/office/drawing/2010/main" val="0"/>
+              </a:ext>
+              <a:ext uri="{96DAC541-7B7A-43D3-8B79-37D633B846F1}">
+                <asvg:svgBlip xmlns:asvg="http://schemas.microsoft.com/office/drawing/2016/SVG/main" r:embed="rId6"/>
+              </a:ext>
+            </a:extLst>
+          </a:blip>
+          <a:stretch>
+            <a:fillRect/>
+          </a:stretch>
+        </p:blipFill>
+        <p:spPr>
+          <a:xfrm>
+            <a:off x="2245636" y="3721100"/>
+            <a:ext cx="914400" cy="914400"/>
+          </a:xfrm>
+          <a:prstGeom prst="rect">
+            <a:avLst/>
+          </a:prstGeom>
+        </p:spPr>
+      </p:pic>
+      <p:pic>
+        <p:nvPicPr>
+          <p:cNvPr id="27" name="Graphic 26" descr="Thought bubble">
+            <a:extLst>
+              <a:ext uri="{FF2B5EF4-FFF2-40B4-BE49-F238E27FC236}">
+                <a16:creationId xmlns:a16="http://schemas.microsoft.com/office/drawing/2014/main" id="{E0DA8056-4881-5A47-8996-740D97F03891}"/>
+              </a:ext>
+            </a:extLst>
+          </p:cNvPr>
+          <p:cNvPicPr>
+            <a:picLocks noChangeAspect="1"/>
+          </p:cNvPicPr>
+          <p:nvPr/>
+        </p:nvPicPr>
+        <p:blipFill>
+          <a:blip r:embed="rId13">
+            <a:extLst>
+              <a:ext uri="{28A0092B-C50C-407E-A947-70E740481C1C}">
+                <a14:useLocalDpi xmlns:a14="http://schemas.microsoft.com/office/drawing/2010/main" val="0"/>
+              </a:ext>
+              <a:ext uri="{96DAC541-7B7A-43D3-8B79-37D633B846F1}">
+                <asvg:svgBlip xmlns:asvg="http://schemas.microsoft.com/office/drawing/2016/SVG/main" r:embed="rId14"/>
+              </a:ext>
+            </a:extLst>
+          </a:blip>
+          <a:stretch>
+            <a:fillRect/>
+          </a:stretch>
+        </p:blipFill>
+        <p:spPr>
+          <a:xfrm>
+            <a:off x="5590911" y="2179783"/>
+            <a:ext cx="461536" cy="461536"/>
+          </a:xfrm>
+          <a:prstGeom prst="rect">
+            <a:avLst/>
+          </a:prstGeom>
+        </p:spPr>
+      </p:pic>
+      <p:sp>
+        <p:nvSpPr>
+          <p:cNvPr id="28" name="TextBox 27">
+            <a:extLst>
+              <a:ext uri="{FF2B5EF4-FFF2-40B4-BE49-F238E27FC236}">
+                <a16:creationId xmlns:a16="http://schemas.microsoft.com/office/drawing/2014/main" id="{753BE709-1A89-0A4D-8494-C750B037E747}"/>
+              </a:ext>
+            </a:extLst>
+          </p:cNvPr>
+          <p:cNvSpPr txBox="1"/>
+          <p:nvPr/>
+        </p:nvSpPr>
+        <p:spPr>
+          <a:xfrm>
+            <a:off x="4937031" y="1855854"/>
+            <a:ext cx="1973425" cy="338554"/>
+          </a:xfrm>
+          <a:prstGeom prst="rect">
+            <a:avLst/>
+          </a:prstGeom>
+          <a:noFill/>
+        </p:spPr>
+        <p:txBody>
+          <a:bodyPr wrap="none" rtlCol="0">
+            <a:spAutoFit/>
+          </a:bodyPr>
+          <a:lstStyle/>
+          <a:p>
+            <a:r>
+              <a:rPr lang="fr-FR" sz="1600" b="1" dirty="0"/>
+              <a:t>I CAN SEE A PATTERN</a:t>
+            </a:r>
+          </a:p>
+        </p:txBody>
+      </p:sp>
+      <p:pic>
+        <p:nvPicPr>
+          <p:cNvPr id="31" name="Graphic 30" descr="Cat">
+            <a:extLst>
+              <a:ext uri="{FF2B5EF4-FFF2-40B4-BE49-F238E27FC236}">
+                <a16:creationId xmlns:a16="http://schemas.microsoft.com/office/drawing/2014/main" id="{BB0DA1FB-33D9-1947-9ECC-48083C9A7A72}"/>
+              </a:ext>
+            </a:extLst>
+          </p:cNvPr>
+          <p:cNvPicPr>
+            <a:picLocks noChangeAspect="1"/>
+          </p:cNvPicPr>
+          <p:nvPr/>
+        </p:nvPicPr>
+        <p:blipFill>
+          <a:blip r:embed="rId3">
+            <a:extLst>
+              <a:ext uri="{28A0092B-C50C-407E-A947-70E740481C1C}">
+                <a14:useLocalDpi xmlns:a14="http://schemas.microsoft.com/office/drawing/2010/main" val="0"/>
+              </a:ext>
+              <a:ext uri="{96DAC541-7B7A-43D3-8B79-37D633B846F1}">
+                <asvg:svgBlip xmlns:asvg="http://schemas.microsoft.com/office/drawing/2016/SVG/main" r:embed="rId4"/>
+              </a:ext>
+            </a:extLst>
+          </a:blip>
+          <a:stretch>
+            <a:fillRect/>
+          </a:stretch>
+        </p:blipFill>
+        <p:spPr>
+          <a:xfrm>
+            <a:off x="8211964" y="1902665"/>
+            <a:ext cx="643855" cy="643855"/>
+          </a:xfrm>
+          <a:prstGeom prst="rect">
+            <a:avLst/>
+          </a:prstGeom>
+        </p:spPr>
+      </p:pic>
+      <p:pic>
+        <p:nvPicPr>
+          <p:cNvPr id="35" name="Graphic 34" descr="Cat">
+            <a:extLst>
+              <a:ext uri="{FF2B5EF4-FFF2-40B4-BE49-F238E27FC236}">
+                <a16:creationId xmlns:a16="http://schemas.microsoft.com/office/drawing/2014/main" id="{2F032752-5F4D-8647-B2E1-C5B4874E2EC2}"/>
+              </a:ext>
+            </a:extLst>
+          </p:cNvPr>
+          <p:cNvPicPr>
+            <a:picLocks noChangeAspect="1"/>
+          </p:cNvPicPr>
+          <p:nvPr/>
+        </p:nvPicPr>
+        <p:blipFill>
+          <a:blip r:embed="rId3">
+            <a:extLst>
+              <a:ext uri="{28A0092B-C50C-407E-A947-70E740481C1C}">
+                <a14:useLocalDpi xmlns:a14="http://schemas.microsoft.com/office/drawing/2010/main" val="0"/>
+              </a:ext>
+              <a:ext uri="{96DAC541-7B7A-43D3-8B79-37D633B846F1}">
+                <asvg:svgBlip xmlns:asvg="http://schemas.microsoft.com/office/drawing/2016/SVG/main" r:embed="rId4"/>
+              </a:ext>
+            </a:extLst>
+          </a:blip>
+          <a:stretch>
+            <a:fillRect/>
+          </a:stretch>
+        </p:blipFill>
+        <p:spPr>
+          <a:xfrm>
+            <a:off x="9546033" y="1892138"/>
+            <a:ext cx="643855" cy="643855"/>
+          </a:xfrm>
+          <a:prstGeom prst="rect">
+            <a:avLst/>
+          </a:prstGeom>
+        </p:spPr>
+      </p:pic>
+      <p:pic>
+        <p:nvPicPr>
+          <p:cNvPr id="36" name="Graphic 35" descr="Cat">
+            <a:extLst>
+              <a:ext uri="{FF2B5EF4-FFF2-40B4-BE49-F238E27FC236}">
+                <a16:creationId xmlns:a16="http://schemas.microsoft.com/office/drawing/2014/main" id="{D320B67F-4D3D-004C-BCBF-41D38EE8E925}"/>
+              </a:ext>
+            </a:extLst>
+          </p:cNvPr>
+          <p:cNvPicPr>
+            <a:picLocks noChangeAspect="1"/>
+          </p:cNvPicPr>
+          <p:nvPr/>
+        </p:nvPicPr>
+        <p:blipFill>
+          <a:blip r:embed="rId3">
+            <a:extLst>
+              <a:ext uri="{28A0092B-C50C-407E-A947-70E740481C1C}">
+                <a14:useLocalDpi xmlns:a14="http://schemas.microsoft.com/office/drawing/2010/main" val="0"/>
+              </a:ext>
+              <a:ext uri="{96DAC541-7B7A-43D3-8B79-37D633B846F1}">
+                <asvg:svgBlip xmlns:asvg="http://schemas.microsoft.com/office/drawing/2016/SVG/main" r:embed="rId4"/>
+              </a:ext>
+            </a:extLst>
+          </a:blip>
+          <a:stretch>
+            <a:fillRect/>
+          </a:stretch>
+        </p:blipFill>
+        <p:spPr>
+          <a:xfrm>
+            <a:off x="8873901" y="1892139"/>
+            <a:ext cx="643855" cy="643855"/>
+          </a:xfrm>
+          <a:prstGeom prst="rect">
+            <a:avLst/>
+          </a:prstGeom>
+        </p:spPr>
+      </p:pic>
+      <p:pic>
+        <p:nvPicPr>
+          <p:cNvPr id="37" name="Graphic 36" descr="Dog">
+            <a:extLst>
+              <a:ext uri="{FF2B5EF4-FFF2-40B4-BE49-F238E27FC236}">
+                <a16:creationId xmlns:a16="http://schemas.microsoft.com/office/drawing/2014/main" id="{2985F125-DD32-A446-A1AA-3C8839E1CCF2}"/>
+              </a:ext>
+            </a:extLst>
+          </p:cNvPr>
+          <p:cNvPicPr>
+            <a:picLocks noChangeAspect="1"/>
+          </p:cNvPicPr>
+          <p:nvPr/>
+        </p:nvPicPr>
+        <p:blipFill>
+          <a:blip r:embed="rId5">
+            <a:extLst>
+              <a:ext uri="{28A0092B-C50C-407E-A947-70E740481C1C}">
+                <a14:useLocalDpi xmlns:a14="http://schemas.microsoft.com/office/drawing/2010/main" val="0"/>
+              </a:ext>
+              <a:ext uri="{96DAC541-7B7A-43D3-8B79-37D633B846F1}">
+                <asvg:svgBlip xmlns:asvg="http://schemas.microsoft.com/office/drawing/2016/SVG/main" r:embed="rId6"/>
+              </a:ext>
+            </a:extLst>
+          </a:blip>
+          <a:stretch>
+            <a:fillRect/>
+          </a:stretch>
+        </p:blipFill>
+        <p:spPr>
+          <a:xfrm>
+            <a:off x="8211964" y="2719768"/>
+            <a:ext cx="914400" cy="914400"/>
+          </a:xfrm>
+          <a:prstGeom prst="rect">
+            <a:avLst/>
+          </a:prstGeom>
+        </p:spPr>
+      </p:pic>
+      <p:pic>
+        <p:nvPicPr>
+          <p:cNvPr id="38" name="Graphic 37" descr="Dog">
+            <a:extLst>
+              <a:ext uri="{FF2B5EF4-FFF2-40B4-BE49-F238E27FC236}">
+                <a16:creationId xmlns:a16="http://schemas.microsoft.com/office/drawing/2014/main" id="{37D17743-25BA-C24E-8729-EB5A261C0A41}"/>
+              </a:ext>
+            </a:extLst>
+          </p:cNvPr>
+          <p:cNvPicPr>
+            <a:picLocks noChangeAspect="1"/>
+          </p:cNvPicPr>
+          <p:nvPr/>
+        </p:nvPicPr>
+        <p:blipFill>
+          <a:blip r:embed="rId5">
+            <a:extLst>
+              <a:ext uri="{28A0092B-C50C-407E-A947-70E740481C1C}">
+                <a14:useLocalDpi xmlns:a14="http://schemas.microsoft.com/office/drawing/2010/main" val="0"/>
+              </a:ext>
+              <a:ext uri="{96DAC541-7B7A-43D3-8B79-37D633B846F1}">
+                <asvg:svgBlip xmlns:asvg="http://schemas.microsoft.com/office/drawing/2016/SVG/main" r:embed="rId6"/>
+              </a:ext>
+            </a:extLst>
+          </a:blip>
+          <a:stretch>
+            <a:fillRect/>
+          </a:stretch>
+        </p:blipFill>
+        <p:spPr>
+          <a:xfrm>
+            <a:off x="9364375" y="2704189"/>
+            <a:ext cx="914400" cy="914400"/>
+          </a:xfrm>
+          <a:prstGeom prst="rect">
+            <a:avLst/>
+          </a:prstGeom>
+        </p:spPr>
+      </p:pic>
+      <p:cxnSp>
+        <p:nvCxnSpPr>
+          <p:cNvPr id="39" name="Straight Arrow Connector 38">
+            <a:extLst>
+              <a:ext uri="{FF2B5EF4-FFF2-40B4-BE49-F238E27FC236}">
+                <a16:creationId xmlns:a16="http://schemas.microsoft.com/office/drawing/2014/main" id="{71317DBC-B3B6-014F-B6D3-E1C6D8EF1747}"/>
+              </a:ext>
+            </a:extLst>
+          </p:cNvPr>
+          <p:cNvCxnSpPr>
+            <a:cxnSpLocks/>
+          </p:cNvCxnSpPr>
+          <p:nvPr/>
+        </p:nvCxnSpPr>
+        <p:spPr>
+          <a:xfrm flipV="1">
+            <a:off x="6910456" y="3182321"/>
+            <a:ext cx="1063497" cy="1"/>
+          </a:xfrm>
+          <a:prstGeom prst="straightConnector1">
+            <a:avLst/>
+          </a:prstGeom>
+          <a:ln w="41275">
+            <a:solidFill>
+              <a:schemeClr val="tx1">
+                <a:lumMod val="75000"/>
+                <a:lumOff val="25000"/>
+              </a:schemeClr>
+            </a:solidFill>
+            <a:tailEnd type="triangle"/>
+          </a:ln>
+        </p:spPr>
+        <p:style>
+          <a:lnRef idx="1">
+            <a:schemeClr val="accent1"/>
+          </a:lnRef>
+          <a:fillRef idx="0">
+            <a:schemeClr val="accent1"/>
+          </a:fillRef>
+          <a:effectRef idx="0">
+            <a:schemeClr val="accent1"/>
+          </a:effectRef>
+          <a:fontRef idx="minor">
+            <a:schemeClr val="tx1"/>
+          </a:fontRef>
+        </p:style>
+      </p:cxnSp>
+      <p:cxnSp>
+        <p:nvCxnSpPr>
+          <p:cNvPr id="40" name="Straight Arrow Connector 39">
+            <a:extLst>
+              <a:ext uri="{FF2B5EF4-FFF2-40B4-BE49-F238E27FC236}">
+                <a16:creationId xmlns:a16="http://schemas.microsoft.com/office/drawing/2014/main" id="{7E56E816-7602-234A-B1CF-4BC67B07AEE4}"/>
+              </a:ext>
+            </a:extLst>
+          </p:cNvPr>
+          <p:cNvCxnSpPr>
+            <a:cxnSpLocks/>
+          </p:cNvCxnSpPr>
+          <p:nvPr/>
+        </p:nvCxnSpPr>
+        <p:spPr>
+          <a:xfrm>
+            <a:off x="6953437" y="3556932"/>
+            <a:ext cx="1020516" cy="880249"/>
+          </a:xfrm>
+          <a:prstGeom prst="straightConnector1">
+            <a:avLst/>
+          </a:prstGeom>
+          <a:ln w="41275">
+            <a:solidFill>
+              <a:schemeClr val="tx1">
+                <a:lumMod val="75000"/>
+                <a:lumOff val="25000"/>
+              </a:schemeClr>
+            </a:solidFill>
+            <a:tailEnd type="triangle"/>
+          </a:ln>
+        </p:spPr>
+        <p:style>
+          <a:lnRef idx="1">
+            <a:schemeClr val="accent1"/>
+          </a:lnRef>
+          <a:fillRef idx="0">
+            <a:schemeClr val="accent1"/>
+          </a:fillRef>
+          <a:effectRef idx="0">
+            <a:schemeClr val="accent1"/>
+          </a:effectRef>
+          <a:fontRef idx="minor">
+            <a:schemeClr val="tx1"/>
+          </a:fontRef>
+        </p:style>
+      </p:cxnSp>
+      <p:pic>
+        <p:nvPicPr>
+          <p:cNvPr id="41" name="Graphic 40" descr="Turtle">
+            <a:extLst>
+              <a:ext uri="{FF2B5EF4-FFF2-40B4-BE49-F238E27FC236}">
+                <a16:creationId xmlns:a16="http://schemas.microsoft.com/office/drawing/2014/main" id="{6384093C-E8B6-B047-ACB1-0FE3D0CD7568}"/>
+              </a:ext>
+            </a:extLst>
+          </p:cNvPr>
+          <p:cNvPicPr>
+            <a:picLocks noChangeAspect="1"/>
+          </p:cNvPicPr>
+          <p:nvPr/>
+        </p:nvPicPr>
+        <p:blipFill>
+          <a:blip r:embed="rId11">
+            <a:extLst>
+              <a:ext uri="{28A0092B-C50C-407E-A947-70E740481C1C}">
+                <a14:useLocalDpi xmlns:a14="http://schemas.microsoft.com/office/drawing/2010/main" val="0"/>
+              </a:ext>
+              <a:ext uri="{96DAC541-7B7A-43D3-8B79-37D633B846F1}">
+                <asvg:svgBlip xmlns:asvg="http://schemas.microsoft.com/office/drawing/2016/SVG/main" r:embed="rId12"/>
+              </a:ext>
+            </a:extLst>
+          </a:blip>
+          <a:stretch>
+            <a:fillRect/>
+          </a:stretch>
+        </p:blipFill>
+        <p:spPr>
+          <a:xfrm>
+            <a:off x="8273923" y="3990960"/>
+            <a:ext cx="790482" cy="790482"/>
+          </a:xfrm>
+          <a:prstGeom prst="rect">
+            <a:avLst/>
+          </a:prstGeom>
+        </p:spPr>
+      </p:pic>
     </p:spTree>
     <p:extLst>
       <p:ext uri="{BB962C8B-B14F-4D97-AF65-F5344CB8AC3E}">
-        <p14:creationId xmlns:p14="http://schemas.microsoft.com/office/powerpoint/2010/main" val="1224068850"/>
+        <p14:creationId xmlns:p14="http://schemas.microsoft.com/office/powerpoint/2010/main" val="2305357394"/>
       </p:ext>
     </p:extLst>
   </p:cSld>
@@ -9059,17 +10897,17 @@
                 </a:solidFill>
                 <a:latin typeface="Cambria" panose="02040503050406030204" pitchFamily="18" charset="0"/>
               </a:rPr>
-              <a:t>AN IDEA OF THE RUSH …</a:t>
+              <a:t>REINFORCEMENT LEARNING</a:t>
             </a:r>
           </a:p>
         </p:txBody>
       </p:sp>
       <p:pic>
         <p:nvPicPr>
-          <p:cNvPr id="2" name="Picture 1">
+          <p:cNvPr id="10" name="Graphic 9" descr="Robot">
             <a:extLst>
               <a:ext uri="{FF2B5EF4-FFF2-40B4-BE49-F238E27FC236}">
-                <a16:creationId xmlns:a16="http://schemas.microsoft.com/office/drawing/2014/main" id="{195C09A1-72FB-A146-8EBE-91EABA0CE601}"/>
+                <a16:creationId xmlns:a16="http://schemas.microsoft.com/office/drawing/2014/main" id="{56BEF216-DCFB-C146-97E9-FF96446BF7CB}"/>
               </a:ext>
             </a:extLst>
           </p:cNvPr>
@@ -9079,27 +10917,75 @@
           <p:nvPr/>
         </p:nvPicPr>
         <p:blipFill>
-          <a:blip r:embed="rId3"/>
+          <a:blip r:embed="rId3">
+            <a:extLst>
+              <a:ext uri="{28A0092B-C50C-407E-A947-70E740481C1C}">
+                <a14:useLocalDpi xmlns:a14="http://schemas.microsoft.com/office/drawing/2010/main" val="0"/>
+              </a:ext>
+              <a:ext uri="{96DAC541-7B7A-43D3-8B79-37D633B846F1}">
+                <asvg:svgBlip xmlns:asvg="http://schemas.microsoft.com/office/drawing/2016/SVG/main" r:embed="rId4"/>
+              </a:ext>
+            </a:extLst>
+          </a:blip>
           <a:stretch>
             <a:fillRect/>
           </a:stretch>
         </p:blipFill>
         <p:spPr>
           <a:xfrm>
-            <a:off x="1271768" y="1872251"/>
-            <a:ext cx="9821105" cy="4031822"/>
+            <a:off x="6190758" y="4653397"/>
+            <a:ext cx="1233180" cy="1233180"/>
           </a:xfrm>
           <a:prstGeom prst="rect">
             <a:avLst/>
           </a:prstGeom>
         </p:spPr>
       </p:pic>
-      <p:sp>
-        <p:nvSpPr>
-          <p:cNvPr id="3" name="Rectangle 2">
+      <p:pic>
+        <p:nvPicPr>
+          <p:cNvPr id="13" name="Graphic 12" descr="Earth Globe Americas">
             <a:extLst>
               <a:ext uri="{FF2B5EF4-FFF2-40B4-BE49-F238E27FC236}">
-                <a16:creationId xmlns:a16="http://schemas.microsoft.com/office/drawing/2014/main" id="{26FEB433-FC07-574C-92FC-604103C5B326}"/>
+                <a16:creationId xmlns:a16="http://schemas.microsoft.com/office/drawing/2014/main" id="{88F602A1-233E-EF41-9BCB-8229DC9185EA}"/>
+              </a:ext>
+            </a:extLst>
+          </p:cNvPr>
+          <p:cNvPicPr>
+            <a:picLocks noChangeAspect="1"/>
+          </p:cNvPicPr>
+          <p:nvPr/>
+        </p:nvPicPr>
+        <p:blipFill>
+          <a:blip r:embed="rId5">
+            <a:extLst>
+              <a:ext uri="{28A0092B-C50C-407E-A947-70E740481C1C}">
+                <a14:useLocalDpi xmlns:a14="http://schemas.microsoft.com/office/drawing/2010/main" val="0"/>
+              </a:ext>
+              <a:ext uri="{96DAC541-7B7A-43D3-8B79-37D633B846F1}">
+                <asvg:svgBlip xmlns:asvg="http://schemas.microsoft.com/office/drawing/2016/SVG/main" r:embed="rId6"/>
+              </a:ext>
+            </a:extLst>
+          </a:blip>
+          <a:stretch>
+            <a:fillRect/>
+          </a:stretch>
+        </p:blipFill>
+        <p:spPr>
+          <a:xfrm>
+            <a:off x="6244760" y="1899727"/>
+            <a:ext cx="1160827" cy="1160827"/>
+          </a:xfrm>
+          <a:prstGeom prst="rect">
+            <a:avLst/>
+          </a:prstGeom>
+        </p:spPr>
+      </p:pic>
+      <p:sp>
+        <p:nvSpPr>
+          <p:cNvPr id="32" name="U-Turn Arrow 31">
+            <a:extLst>
+              <a:ext uri="{FF2B5EF4-FFF2-40B4-BE49-F238E27FC236}">
+                <a16:creationId xmlns:a16="http://schemas.microsoft.com/office/drawing/2014/main" id="{19F352C9-DB36-3140-9F3A-20B8B60E375C}"/>
               </a:ext>
             </a:extLst>
           </p:cNvPr>
@@ -9107,34 +10993,282 @@
           <p:nvPr/>
         </p:nvSpPr>
         <p:spPr>
-          <a:xfrm>
-            <a:off x="1408928" y="6107275"/>
-            <a:ext cx="7803652" cy="646331"/>
+          <a:xfrm rot="5400000" flipH="1">
+            <a:off x="6169259" y="3517222"/>
+            <a:ext cx="3227666" cy="637563"/>
+          </a:xfrm>
+          <a:prstGeom prst="uturnArrow">
+            <a:avLst/>
+          </a:prstGeom>
+          <a:solidFill>
+            <a:schemeClr val="tx1">
+              <a:lumMod val="65000"/>
+              <a:lumOff val="35000"/>
+            </a:schemeClr>
+          </a:solidFill>
+          <a:ln>
+            <a:noFill/>
+          </a:ln>
+        </p:spPr>
+        <p:style>
+          <a:lnRef idx="2">
+            <a:schemeClr val="accent1">
+              <a:shade val="50000"/>
+            </a:schemeClr>
+          </a:lnRef>
+          <a:fillRef idx="1">
+            <a:schemeClr val="accent1"/>
+          </a:fillRef>
+          <a:effectRef idx="0">
+            <a:schemeClr val="accent1"/>
+          </a:effectRef>
+          <a:fontRef idx="minor">
+            <a:schemeClr val="lt1"/>
+          </a:fontRef>
+        </p:style>
+        <p:txBody>
+          <a:bodyPr rtlCol="0" anchor="ctr"/>
+          <a:lstStyle/>
+          <a:p>
+            <a:pPr algn="ctr"/>
+            <a:endParaRPr lang="fr-FR">
+              <a:solidFill>
+                <a:schemeClr val="tx1"/>
+              </a:solidFill>
+            </a:endParaRPr>
+          </a:p>
+        </p:txBody>
+      </p:sp>
+      <p:sp>
+        <p:nvSpPr>
+          <p:cNvPr id="34" name="TextBox 33">
+            <a:extLst>
+              <a:ext uri="{FF2B5EF4-FFF2-40B4-BE49-F238E27FC236}">
+                <a16:creationId xmlns:a16="http://schemas.microsoft.com/office/drawing/2014/main" id="{42C8C119-0CD5-A647-BFFE-3919F4BE110C}"/>
+              </a:ext>
+            </a:extLst>
+          </p:cNvPr>
+          <p:cNvSpPr txBox="1"/>
+          <p:nvPr/>
+        </p:nvSpPr>
+        <p:spPr>
+          <a:xfrm>
+            <a:off x="8319987" y="3348667"/>
+            <a:ext cx="1794915" cy="492443"/>
           </a:xfrm>
           <a:prstGeom prst="rect">
             <a:avLst/>
           </a:prstGeom>
-        </p:spPr>
-        <p:txBody>
-          <a:bodyPr wrap="square">
+          <a:noFill/>
+        </p:spPr>
+        <p:txBody>
+          <a:bodyPr wrap="none" rtlCol="0">
             <a:spAutoFit/>
           </a:bodyPr>
           <a:lstStyle/>
           <a:p>
             <a:r>
-              <a:rPr lang="fr-FR" dirty="0">
-                <a:hlinkClick r:id="rId4"/>
-              </a:rPr>
-              <a:t>Source: https://medium.com/politics-ai/an-overview-of-national-ai-strategies-2a70ec6edfd</a:t>
-            </a:r>
-            <a:endParaRPr lang="fr-FR" dirty="0"/>
+              <a:rPr lang="fr-FR" sz="2600" b="1" dirty="0">
+                <a:solidFill>
+                  <a:schemeClr val="tx1">
+                    <a:lumMod val="65000"/>
+                    <a:lumOff val="35000"/>
+                  </a:schemeClr>
+                </a:solidFill>
+              </a:rPr>
+              <a:t>STEP 1: ACT</a:t>
+            </a:r>
+          </a:p>
+        </p:txBody>
+      </p:sp>
+      <p:sp>
+        <p:nvSpPr>
+          <p:cNvPr id="42" name="TextBox 41">
+            <a:extLst>
+              <a:ext uri="{FF2B5EF4-FFF2-40B4-BE49-F238E27FC236}">
+                <a16:creationId xmlns:a16="http://schemas.microsoft.com/office/drawing/2014/main" id="{C584A41E-4F80-2544-9A3D-85C5DE53CBBB}"/>
+              </a:ext>
+            </a:extLst>
+          </p:cNvPr>
+          <p:cNvSpPr txBox="1"/>
+          <p:nvPr/>
+        </p:nvSpPr>
+        <p:spPr>
+          <a:xfrm>
+            <a:off x="6244760" y="2945754"/>
+            <a:ext cx="1337097" cy="307777"/>
+          </a:xfrm>
+          <a:prstGeom prst="rect">
+            <a:avLst/>
+          </a:prstGeom>
+          <a:noFill/>
+        </p:spPr>
+        <p:txBody>
+          <a:bodyPr wrap="none" rtlCol="0">
+            <a:spAutoFit/>
+          </a:bodyPr>
+          <a:lstStyle/>
+          <a:p>
+            <a:r>
+              <a:rPr lang="fr-FR" sz="1400" b="1" dirty="0"/>
+              <a:t>ENVIRONMENT</a:t>
+            </a:r>
+          </a:p>
+        </p:txBody>
+      </p:sp>
+      <p:sp>
+        <p:nvSpPr>
+          <p:cNvPr id="43" name="TextBox 42">
+            <a:extLst>
+              <a:ext uri="{FF2B5EF4-FFF2-40B4-BE49-F238E27FC236}">
+                <a16:creationId xmlns:a16="http://schemas.microsoft.com/office/drawing/2014/main" id="{7C292F9F-2AAD-7347-994F-9578EB05F829}"/>
+              </a:ext>
+            </a:extLst>
+          </p:cNvPr>
+          <p:cNvSpPr txBox="1"/>
+          <p:nvPr/>
+        </p:nvSpPr>
+        <p:spPr>
+          <a:xfrm>
+            <a:off x="6457220" y="5823901"/>
+            <a:ext cx="700256" cy="307777"/>
+          </a:xfrm>
+          <a:prstGeom prst="rect">
+            <a:avLst/>
+          </a:prstGeom>
+          <a:noFill/>
+        </p:spPr>
+        <p:txBody>
+          <a:bodyPr wrap="none" rtlCol="0">
+            <a:spAutoFit/>
+          </a:bodyPr>
+          <a:lstStyle/>
+          <a:p>
+            <a:r>
+              <a:rPr lang="fr-FR" sz="1400" b="1" dirty="0"/>
+              <a:t>AGENT</a:t>
+            </a:r>
+          </a:p>
+        </p:txBody>
+      </p:sp>
+      <p:sp>
+        <p:nvSpPr>
+          <p:cNvPr id="44" name="U-Turn Arrow 43">
+            <a:extLst>
+              <a:ext uri="{FF2B5EF4-FFF2-40B4-BE49-F238E27FC236}">
+                <a16:creationId xmlns:a16="http://schemas.microsoft.com/office/drawing/2014/main" id="{6F6E0AF7-43C6-3441-991A-FF8457B9E3EB}"/>
+              </a:ext>
+            </a:extLst>
+          </p:cNvPr>
+          <p:cNvSpPr/>
+          <p:nvPr/>
+        </p:nvSpPr>
+        <p:spPr>
+          <a:xfrm rot="16200000" flipH="1">
+            <a:off x="4204900" y="3584335"/>
+            <a:ext cx="3227666" cy="637563"/>
+          </a:xfrm>
+          <a:prstGeom prst="uturnArrow">
+            <a:avLst/>
+          </a:prstGeom>
+          <a:solidFill>
+            <a:schemeClr val="tx1">
+              <a:lumMod val="65000"/>
+              <a:lumOff val="35000"/>
+            </a:schemeClr>
+          </a:solidFill>
+          <a:ln>
+            <a:noFill/>
+          </a:ln>
+        </p:spPr>
+        <p:style>
+          <a:lnRef idx="2">
+            <a:schemeClr val="accent1">
+              <a:shade val="50000"/>
+            </a:schemeClr>
+          </a:lnRef>
+          <a:fillRef idx="1">
+            <a:schemeClr val="accent1"/>
+          </a:fillRef>
+          <a:effectRef idx="0">
+            <a:schemeClr val="accent1"/>
+          </a:effectRef>
+          <a:fontRef idx="minor">
+            <a:schemeClr val="lt1"/>
+          </a:fontRef>
+        </p:style>
+        <p:txBody>
+          <a:bodyPr rtlCol="0" anchor="ctr"/>
+          <a:lstStyle/>
+          <a:p>
+            <a:pPr algn="ctr"/>
+            <a:endParaRPr lang="fr-FR">
+              <a:solidFill>
+                <a:schemeClr val="tx1"/>
+              </a:solidFill>
+            </a:endParaRPr>
+          </a:p>
+        </p:txBody>
+      </p:sp>
+      <p:sp>
+        <p:nvSpPr>
+          <p:cNvPr id="45" name="TextBox 44">
+            <a:extLst>
+              <a:ext uri="{FF2B5EF4-FFF2-40B4-BE49-F238E27FC236}">
+                <a16:creationId xmlns:a16="http://schemas.microsoft.com/office/drawing/2014/main" id="{566F0142-6365-BA40-8C46-EF0CFBAAE827}"/>
+              </a:ext>
+            </a:extLst>
+          </p:cNvPr>
+          <p:cNvSpPr txBox="1"/>
+          <p:nvPr/>
+        </p:nvSpPr>
+        <p:spPr>
+          <a:xfrm>
+            <a:off x="1271768" y="3253531"/>
+            <a:ext cx="4228183" cy="892552"/>
+          </a:xfrm>
+          <a:prstGeom prst="rect">
+            <a:avLst/>
+          </a:prstGeom>
+          <a:noFill/>
+        </p:spPr>
+        <p:txBody>
+          <a:bodyPr wrap="square" rtlCol="0">
+            <a:spAutoFit/>
+          </a:bodyPr>
+          <a:lstStyle/>
+          <a:p>
+            <a:r>
+              <a:rPr lang="fr-FR" sz="2600" b="1" dirty="0">
+                <a:solidFill>
+                  <a:schemeClr val="tx1">
+                    <a:lumMod val="65000"/>
+                    <a:lumOff val="35000"/>
+                  </a:schemeClr>
+                </a:solidFill>
+              </a:rPr>
+              <a:t>STEP 2: OBSERVE ITS STATE &amp;</a:t>
+            </a:r>
+          </a:p>
+          <a:p>
+            <a:r>
+              <a:rPr lang="fr-FR" sz="2600" b="1" dirty="0">
+                <a:solidFill>
+                  <a:schemeClr val="tx1">
+                    <a:lumMod val="65000"/>
+                    <a:lumOff val="35000"/>
+                  </a:schemeClr>
+                </a:solidFill>
+              </a:rPr>
+              <a:t>              GET REWARD</a:t>
+            </a:r>
           </a:p>
         </p:txBody>
       </p:sp>
     </p:spTree>
     <p:extLst>
       <p:ext uri="{BB962C8B-B14F-4D97-AF65-F5344CB8AC3E}">
-        <p14:creationId xmlns:p14="http://schemas.microsoft.com/office/powerpoint/2010/main" val="3083576533"/>
+        <p14:creationId xmlns:p14="http://schemas.microsoft.com/office/powerpoint/2010/main" val="4225891570"/>
       </p:ext>
     </p:extLst>
   </p:cSld>
@@ -9182,7 +11316,7 @@
         <p:spPr>
           <a:xfrm>
             <a:off x="1271768" y="1115051"/>
-            <a:ext cx="9196386" cy="553998"/>
+            <a:ext cx="9617212" cy="2400657"/>
           </a:xfrm>
           <a:prstGeom prst="rect">
             <a:avLst/>
@@ -9195,6 +11329,10 @@
           </a:bodyPr>
           <a:lstStyle/>
           <a:p>
+            <a:pPr marL="514350" indent="-514350">
+              <a:buFont typeface="+mj-lt"/>
+              <a:buAutoNum type="arabicPeriod"/>
+            </a:pPr>
             <a:r>
               <a:rPr lang="en-US" sz="3000" b="1" dirty="0">
                 <a:solidFill>
@@ -9202,7 +11340,128 @@
                 </a:solidFill>
                 <a:latin typeface="Cambria" panose="02040503050406030204" pitchFamily="18" charset="0"/>
               </a:rPr>
-              <a:t>MAIN DIMENSIONS OF PUBLIC POLICIES</a:t>
+              <a:t>WHAT ARE AI KEY ENABLERS?</a:t>
+            </a:r>
+            <a:br>
+              <a:rPr lang="en-US" sz="3000" b="1" dirty="0">
+                <a:solidFill>
+                  <a:schemeClr val="accent1"/>
+                </a:solidFill>
+                <a:latin typeface="Cambria" panose="02040503050406030204" pitchFamily="18" charset="0"/>
+              </a:rPr>
+            </a:br>
+            <a:br>
+              <a:rPr lang="en-US" sz="3000" b="1" dirty="0">
+                <a:solidFill>
+                  <a:schemeClr val="accent1"/>
+                </a:solidFill>
+                <a:latin typeface="Cambria" panose="02040503050406030204" pitchFamily="18" charset="0"/>
+              </a:rPr>
+            </a:br>
+            <a:endParaRPr lang="en-US" sz="3000" b="1" dirty="0">
+              <a:solidFill>
+                <a:schemeClr val="accent1"/>
+              </a:solidFill>
+              <a:latin typeface="Cambria" panose="02040503050406030204" pitchFamily="18" charset="0"/>
+            </a:endParaRPr>
+          </a:p>
+          <a:p>
+            <a:pPr marL="514350" indent="-514350">
+              <a:buFont typeface="+mj-lt"/>
+              <a:buAutoNum type="arabicPeriod"/>
+            </a:pPr>
+            <a:r>
+              <a:rPr lang="en-US" sz="3000" b="1" dirty="0">
+                <a:solidFill>
+                  <a:schemeClr val="accent1"/>
+                </a:solidFill>
+                <a:latin typeface="Cambria" panose="02040503050406030204" pitchFamily="18" charset="0"/>
+              </a:rPr>
+              <a:t>HOW DOES IOT FIT INTO THE OVERALL PICTURE?</a:t>
+            </a:r>
+          </a:p>
+          <a:p>
+            <a:endParaRPr lang="en-US" sz="3000" b="1" dirty="0">
+              <a:solidFill>
+                <a:schemeClr val="accent1"/>
+              </a:solidFill>
+              <a:latin typeface="Cambria" panose="02040503050406030204" pitchFamily="18" charset="0"/>
+            </a:endParaRPr>
+          </a:p>
+        </p:txBody>
+      </p:sp>
+    </p:spTree>
+    <p:extLst>
+      <p:ext uri="{BB962C8B-B14F-4D97-AF65-F5344CB8AC3E}">
+        <p14:creationId xmlns:p14="http://schemas.microsoft.com/office/powerpoint/2010/main" val="3427956302"/>
+      </p:ext>
+    </p:extLst>
+  </p:cSld>
+  <p:clrMapOvr>
+    <a:masterClrMapping/>
+  </p:clrMapOvr>
+  <mc:AlternateContent xmlns:mc="http://schemas.openxmlformats.org/markup-compatibility/2006" xmlns:p14="http://schemas.microsoft.com/office/powerpoint/2010/main">
+    <mc:Choice Requires="p14">
+      <p:transition spd="med" p14:dur="700">
+        <p:fade/>
+      </p:transition>
+    </mc:Choice>
+    <mc:Fallback xmlns="">
+      <p:transition spd="med">
+        <p:fade/>
+      </p:transition>
+    </mc:Fallback>
+  </mc:AlternateContent>
+</p:sld>
+</file>
+
+<file path=ppt/slides/slide27.xml><?xml version="1.0" encoding="utf-8"?>
+<p:sld xmlns:a="http://schemas.openxmlformats.org/drawingml/2006/main" xmlns:r="http://schemas.openxmlformats.org/officeDocument/2006/relationships" xmlns:p="http://schemas.openxmlformats.org/presentationml/2006/main">
+  <p:cSld>
+    <p:spTree>
+      <p:nvGrpSpPr>
+        <p:cNvPr id="1" name=""/>
+        <p:cNvGrpSpPr/>
+        <p:nvPr/>
+      </p:nvGrpSpPr>
+      <p:grpSpPr>
+        <a:xfrm>
+          <a:off x="0" y="0"/>
+          <a:ext cx="0" cy="0"/>
+          <a:chOff x="0" y="0"/>
+          <a:chExt cx="0" cy="0"/>
+        </a:xfrm>
+      </p:grpSpPr>
+      <p:sp>
+        <p:nvSpPr>
+          <p:cNvPr id="8" name="TextBox 7"/>
+          <p:cNvSpPr txBox="1"/>
+          <p:nvPr/>
+        </p:nvSpPr>
+        <p:spPr>
+          <a:xfrm>
+            <a:off x="1271768" y="1115051"/>
+            <a:ext cx="9196386" cy="553998"/>
+          </a:xfrm>
+          <a:prstGeom prst="rect">
+            <a:avLst/>
+          </a:prstGeom>
+          <a:noFill/>
+        </p:spPr>
+        <p:txBody>
+          <a:bodyPr wrap="square" rtlCol="0">
+            <a:spAutoFit/>
+          </a:bodyPr>
+          <a:lstStyle/>
+          <a:p>
+            <a:r>
+              <a:rPr lang="en-US" sz="3000" b="1" dirty="0">
+                <a:solidFill>
+                  <a:schemeClr val="accent1"/>
+                </a:solidFill>
+                <a:latin typeface="Cambria" panose="02040503050406030204" pitchFamily="18" charset="0"/>
+              </a:rPr>
+              <a:t>THE RACE FOR AI</a:t>
             </a:r>
           </a:p>
         </p:txBody>
@@ -9222,7 +11481,7 @@
         <p:spPr>
           <a:xfrm>
             <a:off x="1275701" y="2333156"/>
-            <a:ext cx="9909364" cy="1569660"/>
+            <a:ext cx="9909364" cy="3046988"/>
           </a:xfrm>
           <a:prstGeom prst="rect">
             <a:avLst/>
@@ -9246,7 +11505,65 @@
                 </a:solidFill>
                 <a:latin typeface="Cambria" panose="02040503050406030204" pitchFamily="18" charset="0"/>
               </a:rPr>
-              <a:t>TO BE CONTINUED</a:t>
+              <a:t>A WORLD TOUR OF RECENT PUBLIC AI STRATEGIES/POLICIES</a:t>
+            </a:r>
+            <a:br>
+              <a:rPr lang="en-US" sz="2400" b="1" dirty="0">
+                <a:solidFill>
+                  <a:schemeClr val="accent1"/>
+                </a:solidFill>
+                <a:latin typeface="Cambria" panose="02040503050406030204" pitchFamily="18" charset="0"/>
+              </a:rPr>
+            </a:br>
+            <a:endParaRPr lang="en-US" sz="2400" b="1" dirty="0">
+              <a:solidFill>
+                <a:schemeClr val="accent1"/>
+              </a:solidFill>
+              <a:latin typeface="Cambria" panose="02040503050406030204" pitchFamily="18" charset="0"/>
+            </a:endParaRPr>
+          </a:p>
+          <a:p>
+            <a:pPr marL="342900" indent="-342900">
+              <a:buFont typeface="Arial"/>
+              <a:buChar char="•"/>
+            </a:pPr>
+            <a:r>
+              <a:rPr lang="en-US" sz="2400" b="1" dirty="0">
+                <a:solidFill>
+                  <a:schemeClr val="accent1"/>
+                </a:solidFill>
+                <a:latin typeface="Cambria" panose="02040503050406030204" pitchFamily="18" charset="0"/>
+              </a:rPr>
+              <a:t>ON WHICH ASPECTS?</a:t>
+            </a:r>
+            <a:br>
+              <a:rPr lang="en-US" sz="2400" b="1" dirty="0">
+                <a:solidFill>
+                  <a:schemeClr val="accent1"/>
+                </a:solidFill>
+                <a:latin typeface="Cambria" panose="02040503050406030204" pitchFamily="18" charset="0"/>
+              </a:rPr>
+            </a:br>
+            <a:endParaRPr lang="en-US" sz="2400" b="1" dirty="0">
+              <a:solidFill>
+                <a:schemeClr val="accent1"/>
+              </a:solidFill>
+              <a:latin typeface="Cambria" panose="02040503050406030204" pitchFamily="18" charset="0"/>
+            </a:endParaRPr>
+          </a:p>
+          <a:p>
+            <a:pPr marL="342900" indent="-342900">
+              <a:buFont typeface="Arial"/>
+              <a:buChar char="•"/>
+            </a:pPr>
+            <a:r>
+              <a:rPr lang="en-US" sz="2400" b="1" dirty="0">
+                <a:solidFill>
+                  <a:schemeClr val="accent1"/>
+                </a:solidFill>
+                <a:latin typeface="Cambria" panose="02040503050406030204" pitchFamily="18" charset="0"/>
+              </a:rPr>
+              <a:t>US vs. CHINA vs. ALL</a:t>
             </a:r>
             <a:br>
               <a:rPr lang="en-US" sz="2400" b="1" dirty="0">
@@ -9286,6 +11603,443 @@
               </a:solidFill>
               <a:latin typeface="Cambria" panose="02040503050406030204" pitchFamily="18" charset="0"/>
             </a:endParaRPr>
+          </a:p>
+        </p:txBody>
+      </p:sp>
+    </p:spTree>
+    <p:extLst>
+      <p:ext uri="{BB962C8B-B14F-4D97-AF65-F5344CB8AC3E}">
+        <p14:creationId xmlns:p14="http://schemas.microsoft.com/office/powerpoint/2010/main" val="1224068850"/>
+      </p:ext>
+    </p:extLst>
+  </p:cSld>
+  <p:clrMapOvr>
+    <a:masterClrMapping/>
+  </p:clrMapOvr>
+  <mc:AlternateContent xmlns:mc="http://schemas.openxmlformats.org/markup-compatibility/2006" xmlns:p14="http://schemas.microsoft.com/office/powerpoint/2010/main">
+    <mc:Choice Requires="p14">
+      <p:transition spd="med" p14:dur="700">
+        <p:fade/>
+      </p:transition>
+    </mc:Choice>
+    <mc:Fallback xmlns="">
+      <p:transition spd="med">
+        <p:fade/>
+      </p:transition>
+    </mc:Fallback>
+  </mc:AlternateContent>
+</p:sld>
+</file>
+
+<file path=ppt/slides/slide28.xml><?xml version="1.0" encoding="utf-8"?>
+<p:sld xmlns:a="http://schemas.openxmlformats.org/drawingml/2006/main" xmlns:r="http://schemas.openxmlformats.org/officeDocument/2006/relationships" xmlns:p="http://schemas.openxmlformats.org/presentationml/2006/main">
+  <p:cSld>
+    <p:spTree>
+      <p:nvGrpSpPr>
+        <p:cNvPr id="1" name=""/>
+        <p:cNvGrpSpPr/>
+        <p:nvPr/>
+      </p:nvGrpSpPr>
+      <p:grpSpPr>
+        <a:xfrm>
+          <a:off x="0" y="0"/>
+          <a:ext cx="0" cy="0"/>
+          <a:chOff x="0" y="0"/>
+          <a:chExt cx="0" cy="0"/>
+        </a:xfrm>
+      </p:grpSpPr>
+      <p:sp>
+        <p:nvSpPr>
+          <p:cNvPr id="8" name="TextBox 7"/>
+          <p:cNvSpPr txBox="1"/>
+          <p:nvPr/>
+        </p:nvSpPr>
+        <p:spPr>
+          <a:xfrm>
+            <a:off x="1271768" y="1115051"/>
+            <a:ext cx="9196386" cy="553998"/>
+          </a:xfrm>
+          <a:prstGeom prst="rect">
+            <a:avLst/>
+          </a:prstGeom>
+          <a:noFill/>
+        </p:spPr>
+        <p:txBody>
+          <a:bodyPr wrap="square" rtlCol="0">
+            <a:spAutoFit/>
+          </a:bodyPr>
+          <a:lstStyle/>
+          <a:p>
+            <a:r>
+              <a:rPr lang="en-US" sz="3000" b="1" dirty="0">
+                <a:solidFill>
+                  <a:schemeClr val="accent1"/>
+                </a:solidFill>
+                <a:latin typeface="Cambria" panose="02040503050406030204" pitchFamily="18" charset="0"/>
+              </a:rPr>
+              <a:t>AN IDEA OF THE RUSH …</a:t>
+            </a:r>
+          </a:p>
+        </p:txBody>
+      </p:sp>
+      <p:pic>
+        <p:nvPicPr>
+          <p:cNvPr id="2" name="Picture 1">
+            <a:extLst>
+              <a:ext uri="{FF2B5EF4-FFF2-40B4-BE49-F238E27FC236}">
+                <a16:creationId xmlns:a16="http://schemas.microsoft.com/office/drawing/2014/main" id="{195C09A1-72FB-A146-8EBE-91EABA0CE601}"/>
+              </a:ext>
+            </a:extLst>
+          </p:cNvPr>
+          <p:cNvPicPr>
+            <a:picLocks noChangeAspect="1"/>
+          </p:cNvPicPr>
+          <p:nvPr/>
+        </p:nvPicPr>
+        <p:blipFill>
+          <a:blip r:embed="rId3"/>
+          <a:stretch>
+            <a:fillRect/>
+          </a:stretch>
+        </p:blipFill>
+        <p:spPr>
+          <a:xfrm>
+            <a:off x="1271768" y="1872251"/>
+            <a:ext cx="9821105" cy="4031822"/>
+          </a:xfrm>
+          <a:prstGeom prst="rect">
+            <a:avLst/>
+          </a:prstGeom>
+        </p:spPr>
+      </p:pic>
+      <p:sp>
+        <p:nvSpPr>
+          <p:cNvPr id="3" name="Rectangle 2">
+            <a:extLst>
+              <a:ext uri="{FF2B5EF4-FFF2-40B4-BE49-F238E27FC236}">
+                <a16:creationId xmlns:a16="http://schemas.microsoft.com/office/drawing/2014/main" id="{26FEB433-FC07-574C-92FC-604103C5B326}"/>
+              </a:ext>
+            </a:extLst>
+          </p:cNvPr>
+          <p:cNvSpPr/>
+          <p:nvPr/>
+        </p:nvSpPr>
+        <p:spPr>
+          <a:xfrm>
+            <a:off x="1408928" y="6107275"/>
+            <a:ext cx="7803652" cy="646331"/>
+          </a:xfrm>
+          <a:prstGeom prst="rect">
+            <a:avLst/>
+          </a:prstGeom>
+        </p:spPr>
+        <p:txBody>
+          <a:bodyPr wrap="square">
+            <a:spAutoFit/>
+          </a:bodyPr>
+          <a:lstStyle/>
+          <a:p>
+            <a:r>
+              <a:rPr lang="fr-FR" dirty="0">
+                <a:hlinkClick r:id="rId4"/>
+              </a:rPr>
+              <a:t>Source: https://medium.com/politics-ai/an-overview-of-national-ai-strategies-2a70ec6edfd</a:t>
+            </a:r>
+            <a:endParaRPr lang="fr-FR" dirty="0"/>
+          </a:p>
+        </p:txBody>
+      </p:sp>
+    </p:spTree>
+    <p:extLst>
+      <p:ext uri="{BB962C8B-B14F-4D97-AF65-F5344CB8AC3E}">
+        <p14:creationId xmlns:p14="http://schemas.microsoft.com/office/powerpoint/2010/main" val="3083576533"/>
+      </p:ext>
+    </p:extLst>
+  </p:cSld>
+  <p:clrMapOvr>
+    <a:masterClrMapping/>
+  </p:clrMapOvr>
+  <mc:AlternateContent xmlns:mc="http://schemas.openxmlformats.org/markup-compatibility/2006" xmlns:p14="http://schemas.microsoft.com/office/powerpoint/2010/main">
+    <mc:Choice Requires="p14">
+      <p:transition spd="med" p14:dur="700">
+        <p:fade/>
+      </p:transition>
+    </mc:Choice>
+    <mc:Fallback xmlns="">
+      <p:transition spd="med">
+        <p:fade/>
+      </p:transition>
+    </mc:Fallback>
+  </mc:AlternateContent>
+</p:sld>
+</file>
+
+<file path=ppt/slides/slide29.xml><?xml version="1.0" encoding="utf-8"?>
+<p:sld xmlns:a="http://schemas.openxmlformats.org/drawingml/2006/main" xmlns:r="http://schemas.openxmlformats.org/officeDocument/2006/relationships" xmlns:p="http://schemas.openxmlformats.org/presentationml/2006/main">
+  <p:cSld>
+    <p:spTree>
+      <p:nvGrpSpPr>
+        <p:cNvPr id="1" name=""/>
+        <p:cNvGrpSpPr/>
+        <p:nvPr/>
+      </p:nvGrpSpPr>
+      <p:grpSpPr>
+        <a:xfrm>
+          <a:off x="0" y="0"/>
+          <a:ext cx="0" cy="0"/>
+          <a:chOff x="0" y="0"/>
+          <a:chExt cx="0" cy="0"/>
+        </a:xfrm>
+      </p:grpSpPr>
+      <p:sp>
+        <p:nvSpPr>
+          <p:cNvPr id="8" name="TextBox 7"/>
+          <p:cNvSpPr txBox="1"/>
+          <p:nvPr/>
+        </p:nvSpPr>
+        <p:spPr>
+          <a:xfrm>
+            <a:off x="1271768" y="1115051"/>
+            <a:ext cx="9196386" cy="553998"/>
+          </a:xfrm>
+          <a:prstGeom prst="rect">
+            <a:avLst/>
+          </a:prstGeom>
+          <a:noFill/>
+        </p:spPr>
+        <p:txBody>
+          <a:bodyPr wrap="square" rtlCol="0">
+            <a:spAutoFit/>
+          </a:bodyPr>
+          <a:lstStyle/>
+          <a:p>
+            <a:r>
+              <a:rPr lang="en-US" sz="3000" b="1" dirty="0">
+                <a:solidFill>
+                  <a:schemeClr val="accent1"/>
+                </a:solidFill>
+                <a:latin typeface="Cambria" panose="02040503050406030204" pitchFamily="18" charset="0"/>
+              </a:rPr>
+              <a:t>THE STUFF OF AN AI SUPERPOWER</a:t>
+            </a:r>
+          </a:p>
+        </p:txBody>
+      </p:sp>
+      <p:sp>
+        <p:nvSpPr>
+          <p:cNvPr id="6" name="TextBox 5">
+            <a:extLst>
+              <a:ext uri="{FF2B5EF4-FFF2-40B4-BE49-F238E27FC236}">
+                <a16:creationId xmlns:a16="http://schemas.microsoft.com/office/drawing/2014/main" id="{80CDDE41-8C09-D54C-917C-9FB77CE4824D}"/>
+              </a:ext>
+            </a:extLst>
+          </p:cNvPr>
+          <p:cNvSpPr txBox="1"/>
+          <p:nvPr/>
+        </p:nvSpPr>
+        <p:spPr>
+          <a:xfrm>
+            <a:off x="1275701" y="2333156"/>
+            <a:ext cx="9909364" cy="3785652"/>
+          </a:xfrm>
+          <a:prstGeom prst="rect">
+            <a:avLst/>
+          </a:prstGeom>
+          <a:noFill/>
+        </p:spPr>
+        <p:txBody>
+          <a:bodyPr wrap="square" rtlCol="0">
+            <a:spAutoFit/>
+          </a:bodyPr>
+          <a:lstStyle/>
+          <a:p>
+            <a:pPr marL="457200" indent="-457200">
+              <a:buFont typeface="+mj-lt"/>
+              <a:buAutoNum type="arabicPeriod"/>
+            </a:pPr>
+            <a:r>
+              <a:rPr lang="en-US" sz="2400" b="1" dirty="0">
+                <a:solidFill>
+                  <a:schemeClr val="accent1"/>
+                </a:solidFill>
+                <a:latin typeface="Cambria" panose="02040503050406030204" pitchFamily="18" charset="0"/>
+              </a:rPr>
+              <a:t>ABUNDANT DATA</a:t>
+            </a:r>
+            <a:br>
+              <a:rPr lang="en-US" sz="2400" b="1" dirty="0">
+                <a:solidFill>
+                  <a:schemeClr val="accent1"/>
+                </a:solidFill>
+                <a:latin typeface="Cambria" panose="02040503050406030204" pitchFamily="18" charset="0"/>
+              </a:rPr>
+            </a:br>
+            <a:endParaRPr lang="en-US" sz="2400" b="1" dirty="0">
+              <a:solidFill>
+                <a:schemeClr val="accent1"/>
+              </a:solidFill>
+              <a:latin typeface="Cambria" panose="02040503050406030204" pitchFamily="18" charset="0"/>
+            </a:endParaRPr>
+          </a:p>
+          <a:p>
+            <a:pPr marL="457200" indent="-457200">
+              <a:buFont typeface="+mj-lt"/>
+              <a:buAutoNum type="arabicPeriod"/>
+            </a:pPr>
+            <a:r>
+              <a:rPr lang="en-US" sz="2400" b="1" dirty="0">
+                <a:solidFill>
+                  <a:schemeClr val="accent1"/>
+                </a:solidFill>
+                <a:latin typeface="Cambria" panose="02040503050406030204" pitchFamily="18" charset="0"/>
+              </a:rPr>
+              <a:t>TENACIOUS ENTREPRENEURS</a:t>
+            </a:r>
+            <a:br>
+              <a:rPr lang="en-US" sz="2400" b="1" dirty="0">
+                <a:solidFill>
+                  <a:schemeClr val="accent1"/>
+                </a:solidFill>
+                <a:latin typeface="Cambria" panose="02040503050406030204" pitchFamily="18" charset="0"/>
+              </a:rPr>
+            </a:br>
+            <a:endParaRPr lang="en-US" sz="2400" b="1" dirty="0">
+              <a:solidFill>
+                <a:schemeClr val="accent1"/>
+              </a:solidFill>
+              <a:latin typeface="Cambria" panose="02040503050406030204" pitchFamily="18" charset="0"/>
+            </a:endParaRPr>
+          </a:p>
+          <a:p>
+            <a:pPr marL="457200" indent="-457200">
+              <a:buFont typeface="+mj-lt"/>
+              <a:buAutoNum type="arabicPeriod"/>
+            </a:pPr>
+            <a:r>
+              <a:rPr lang="en-US" sz="2400" b="1" dirty="0">
+                <a:solidFill>
+                  <a:schemeClr val="accent1"/>
+                </a:solidFill>
+                <a:latin typeface="Cambria" panose="02040503050406030204" pitchFamily="18" charset="0"/>
+              </a:rPr>
+              <a:t>WELL-TRAINED AI SCIENTISTS</a:t>
+            </a:r>
+            <a:br>
+              <a:rPr lang="en-US" sz="2400" b="1" dirty="0">
+                <a:solidFill>
+                  <a:schemeClr val="accent1"/>
+                </a:solidFill>
+                <a:latin typeface="Cambria" panose="02040503050406030204" pitchFamily="18" charset="0"/>
+              </a:rPr>
+            </a:br>
+            <a:endParaRPr lang="en-US" sz="2400" b="1" dirty="0">
+              <a:solidFill>
+                <a:schemeClr val="accent1"/>
+              </a:solidFill>
+              <a:latin typeface="Cambria" panose="02040503050406030204" pitchFamily="18" charset="0"/>
+            </a:endParaRPr>
+          </a:p>
+          <a:p>
+            <a:pPr marL="457200" indent="-457200">
+              <a:buFont typeface="+mj-lt"/>
+              <a:buAutoNum type="arabicPeriod"/>
+            </a:pPr>
+            <a:r>
+              <a:rPr lang="en-US" sz="2400" b="1" dirty="0">
+                <a:solidFill>
+                  <a:schemeClr val="accent1"/>
+                </a:solidFill>
+                <a:latin typeface="Cambria" panose="02040503050406030204" pitchFamily="18" charset="0"/>
+              </a:rPr>
+              <a:t>SUPPORTIVE POLICY ENVIRONMENT</a:t>
+            </a:r>
+            <a:br>
+              <a:rPr lang="en-US" sz="2400" b="1" dirty="0">
+                <a:solidFill>
+                  <a:schemeClr val="accent1"/>
+                </a:solidFill>
+                <a:latin typeface="Cambria" panose="02040503050406030204" pitchFamily="18" charset="0"/>
+              </a:rPr>
+            </a:br>
+            <a:endParaRPr lang="en-US" sz="2400" b="1" dirty="0">
+              <a:solidFill>
+                <a:schemeClr val="accent1"/>
+              </a:solidFill>
+              <a:latin typeface="Cambria" panose="02040503050406030204" pitchFamily="18" charset="0"/>
+            </a:endParaRPr>
+          </a:p>
+          <a:p>
+            <a:pPr marL="342900" indent="-342900">
+              <a:buFont typeface="Arial"/>
+              <a:buChar char="•"/>
+            </a:pPr>
+            <a:endParaRPr lang="en-US" sz="2400" b="1" dirty="0">
+              <a:solidFill>
+                <a:schemeClr val="accent1"/>
+              </a:solidFill>
+              <a:latin typeface="Cambria" panose="02040503050406030204" pitchFamily="18" charset="0"/>
+            </a:endParaRPr>
+          </a:p>
+          <a:p>
+            <a:pPr marL="342900" indent="-342900">
+              <a:buFont typeface="Arial"/>
+              <a:buChar char="•"/>
+            </a:pPr>
+            <a:endParaRPr lang="en-US" sz="2400" b="1" dirty="0">
+              <a:solidFill>
+                <a:schemeClr val="accent1"/>
+              </a:solidFill>
+              <a:latin typeface="Cambria" panose="02040503050406030204" pitchFamily="18" charset="0"/>
+            </a:endParaRPr>
+          </a:p>
+        </p:txBody>
+      </p:sp>
+      <p:sp>
+        <p:nvSpPr>
+          <p:cNvPr id="2" name="Rectangle 1">
+            <a:extLst>
+              <a:ext uri="{FF2B5EF4-FFF2-40B4-BE49-F238E27FC236}">
+                <a16:creationId xmlns:a16="http://schemas.microsoft.com/office/drawing/2014/main" id="{EE9659FD-F966-1645-85BD-D12C829C7AD2}"/>
+              </a:ext>
+            </a:extLst>
+          </p:cNvPr>
+          <p:cNvSpPr/>
+          <p:nvPr/>
+        </p:nvSpPr>
+        <p:spPr>
+          <a:xfrm>
+            <a:off x="1271768" y="5696136"/>
+            <a:ext cx="2832507" cy="369332"/>
+          </a:xfrm>
+          <a:prstGeom prst="rect">
+            <a:avLst/>
+          </a:prstGeom>
+        </p:spPr>
+        <p:txBody>
+          <a:bodyPr wrap="none">
+            <a:spAutoFit/>
+          </a:bodyPr>
+          <a:lstStyle/>
+          <a:p>
+            <a:r>
+              <a:rPr lang="fr-FR" dirty="0">
+                <a:hlinkClick r:id="rId3"/>
+              </a:rPr>
+              <a:t>https://</a:t>
+            </a:r>
+            <a:r>
+              <a:rPr lang="fr-FR" dirty="0" err="1">
+                <a:hlinkClick r:id="rId3"/>
+              </a:rPr>
+              <a:t>aisuperpowers.com</a:t>
+            </a:r>
+            <a:r>
+              <a:rPr lang="fr-FR" dirty="0">
+                <a:hlinkClick r:id="rId3"/>
+              </a:rPr>
+              <a:t>/</a:t>
+            </a:r>
+            <a:endParaRPr lang="fr-FR" dirty="0"/>
           </a:p>
         </p:txBody>
       </p:sp>
@@ -9340,7 +12094,7 @@
         <p:spPr>
           <a:xfrm>
             <a:off x="1271768" y="1116000"/>
-            <a:ext cx="8126232" cy="630942"/>
+            <a:ext cx="8126232" cy="861774"/>
           </a:xfrm>
           <a:prstGeom prst="rect">
             <a:avLst/>
@@ -9354,7 +12108,7 @@
           <a:lstStyle/>
           <a:p>
             <a:r>
-              <a:rPr lang="en-US" sz="3500" b="1" dirty="0">
+              <a:rPr lang="en-US" sz="5000" b="1" dirty="0">
                 <a:solidFill>
                   <a:schemeClr val="accent1"/>
                 </a:solidFill>
@@ -9373,7 +12127,7 @@
         </p:nvSpPr>
         <p:spPr>
           <a:xfrm>
-            <a:off x="1321533" y="1671374"/>
+            <a:off x="1336773" y="1884734"/>
             <a:ext cx="7350609" cy="400110"/>
           </a:xfrm>
           <a:prstGeom prst="rect">
@@ -9828,7 +12582,7 @@
         <p:spPr>
           <a:xfrm>
             <a:off x="1271768" y="1116000"/>
-            <a:ext cx="9662932" cy="861774"/>
+            <a:ext cx="9662932" cy="1938992"/>
           </a:xfrm>
           <a:prstGeom prst="rect">
             <a:avLst/>
@@ -9842,7 +12596,7 @@
           <a:lstStyle/>
           <a:p>
             <a:r>
-              <a:rPr lang="en-US" sz="3000" b="1" dirty="0">
+              <a:rPr lang="en-US" sz="5000" b="1" dirty="0">
                 <a:solidFill>
                   <a:schemeClr val="accent1"/>
                 </a:solidFill>
@@ -9850,8 +12604,14 @@
               </a:rPr>
               <a:t>WHAT IS I[NTELLIGENCE]? REDUX</a:t>
             </a:r>
-          </a:p>
-          <a:p>
+            <a:br>
+              <a:rPr lang="en-US" sz="5000" b="1" dirty="0">
+                <a:solidFill>
+                  <a:schemeClr val="accent1"/>
+                </a:solidFill>
+                <a:latin typeface="Cambria" panose="02040503050406030204" pitchFamily="18" charset="0"/>
+              </a:rPr>
+            </a:br>
             <a:r>
               <a:rPr lang="en-US" sz="2000" b="1" dirty="0">
                 <a:solidFill>

</xml_diff>

<commit_message>
complementing AI applications and AI intro
</commit_message>
<xml_diff>
--- a/presentations/session-4-intro-to-ai.pptx
+++ b/presentations/session-4-intro-to-ai.pptx
@@ -5,7 +5,7 @@
     <p:sldMasterId id="2147483648" r:id="rId1"/>
   </p:sldMasterIdLst>
   <p:notesMasterIdLst>
-    <p:notesMasterId r:id="rId37"/>
+    <p:notesMasterId r:id="rId42"/>
   </p:notesMasterIdLst>
   <p:sldIdLst>
     <p:sldId id="263" r:id="rId2"/>
@@ -43,6 +43,11 @@
     <p:sldId id="567" r:id="rId34"/>
     <p:sldId id="583" r:id="rId35"/>
     <p:sldId id="577" r:id="rId36"/>
+    <p:sldId id="585" r:id="rId37"/>
+    <p:sldId id="586" r:id="rId38"/>
+    <p:sldId id="584" r:id="rId39"/>
+    <p:sldId id="587" r:id="rId40"/>
+    <p:sldId id="588" r:id="rId41"/>
   </p:sldIdLst>
   <p:sldSz cx="12192000" cy="6858000"/>
   <p:notesSz cx="6797675" cy="9874250"/>
@@ -2943,6 +2948,433 @@
 </p:notes>
 </file>
 
+<file path=ppt/notesSlides/notesSlide35.xml><?xml version="1.0" encoding="utf-8"?>
+<p:notes xmlns:a="http://schemas.openxmlformats.org/drawingml/2006/main" xmlns:r="http://schemas.openxmlformats.org/officeDocument/2006/relationships" xmlns:p="http://schemas.openxmlformats.org/presentationml/2006/main">
+  <p:cSld>
+    <p:spTree>
+      <p:nvGrpSpPr>
+        <p:cNvPr id="1" name=""/>
+        <p:cNvGrpSpPr/>
+        <p:nvPr/>
+      </p:nvGrpSpPr>
+      <p:grpSpPr>
+        <a:xfrm>
+          <a:off x="0" y="0"/>
+          <a:ext cx="0" cy="0"/>
+          <a:chOff x="0" y="0"/>
+          <a:chExt cx="0" cy="0"/>
+        </a:xfrm>
+      </p:grpSpPr>
+      <p:sp>
+        <p:nvSpPr>
+          <p:cNvPr id="2" name="Slide Image Placeholder 1"/>
+          <p:cNvSpPr>
+            <a:spLocks noGrp="1" noRot="1" noChangeAspect="1"/>
+          </p:cNvSpPr>
+          <p:nvPr>
+            <p:ph type="sldImg"/>
+          </p:nvPr>
+        </p:nvSpPr>
+        <p:spPr/>
+      </p:sp>
+      <p:sp>
+        <p:nvSpPr>
+          <p:cNvPr id="3" name="Notes Placeholder 2"/>
+          <p:cNvSpPr>
+            <a:spLocks noGrp="1"/>
+          </p:cNvSpPr>
+          <p:nvPr>
+            <p:ph type="body" idx="1"/>
+          </p:nvPr>
+        </p:nvSpPr>
+        <p:spPr/>
+        <p:txBody>
+          <a:bodyPr/>
+          <a:lstStyle/>
+          <a:p>
+            <a:endParaRPr lang="en-US" dirty="0"/>
+          </a:p>
+        </p:txBody>
+      </p:sp>
+      <p:sp>
+        <p:nvSpPr>
+          <p:cNvPr id="4" name="Slide Number Placeholder 3"/>
+          <p:cNvSpPr>
+            <a:spLocks noGrp="1"/>
+          </p:cNvSpPr>
+          <p:nvPr>
+            <p:ph type="sldNum" sz="quarter" idx="10"/>
+          </p:nvPr>
+        </p:nvSpPr>
+        <p:spPr/>
+        <p:txBody>
+          <a:bodyPr/>
+          <a:lstStyle/>
+          <a:p>
+            <a:fld id="{2F6F93F9-6E01-423B-ABB3-8FB3B0651941}" type="slidenum">
+              <a:rPr lang="en-US" smtClean="0"/>
+              <a:t>36</a:t>
+            </a:fld>
+            <a:endParaRPr lang="en-US"/>
+          </a:p>
+        </p:txBody>
+      </p:sp>
+    </p:spTree>
+    <p:extLst>
+      <p:ext uri="{BB962C8B-B14F-4D97-AF65-F5344CB8AC3E}">
+        <p14:creationId xmlns:p14="http://schemas.microsoft.com/office/powerpoint/2010/main" val="767521271"/>
+      </p:ext>
+    </p:extLst>
+  </p:cSld>
+  <p:clrMapOvr>
+    <a:masterClrMapping/>
+  </p:clrMapOvr>
+</p:notes>
+</file>
+
+<file path=ppt/notesSlides/notesSlide36.xml><?xml version="1.0" encoding="utf-8"?>
+<p:notes xmlns:a="http://schemas.openxmlformats.org/drawingml/2006/main" xmlns:r="http://schemas.openxmlformats.org/officeDocument/2006/relationships" xmlns:p="http://schemas.openxmlformats.org/presentationml/2006/main">
+  <p:cSld>
+    <p:spTree>
+      <p:nvGrpSpPr>
+        <p:cNvPr id="1" name=""/>
+        <p:cNvGrpSpPr/>
+        <p:nvPr/>
+      </p:nvGrpSpPr>
+      <p:grpSpPr>
+        <a:xfrm>
+          <a:off x="0" y="0"/>
+          <a:ext cx="0" cy="0"/>
+          <a:chOff x="0" y="0"/>
+          <a:chExt cx="0" cy="0"/>
+        </a:xfrm>
+      </p:grpSpPr>
+      <p:sp>
+        <p:nvSpPr>
+          <p:cNvPr id="2" name="Slide Image Placeholder 1"/>
+          <p:cNvSpPr>
+            <a:spLocks noGrp="1" noRot="1" noChangeAspect="1"/>
+          </p:cNvSpPr>
+          <p:nvPr>
+            <p:ph type="sldImg"/>
+          </p:nvPr>
+        </p:nvSpPr>
+        <p:spPr/>
+      </p:sp>
+      <p:sp>
+        <p:nvSpPr>
+          <p:cNvPr id="3" name="Notes Placeholder 2"/>
+          <p:cNvSpPr>
+            <a:spLocks noGrp="1"/>
+          </p:cNvSpPr>
+          <p:nvPr>
+            <p:ph type="body" idx="1"/>
+          </p:nvPr>
+        </p:nvSpPr>
+        <p:spPr/>
+        <p:txBody>
+          <a:bodyPr/>
+          <a:lstStyle/>
+          <a:p>
+            <a:r>
+              <a:rPr lang="en-US" dirty="0"/>
+              <a:t>Policy on data, entrepreneurship, delegation, multidisciplinary research, education, public awareness, ethical committees, …</a:t>
+            </a:r>
+          </a:p>
+        </p:txBody>
+      </p:sp>
+      <p:sp>
+        <p:nvSpPr>
+          <p:cNvPr id="4" name="Slide Number Placeholder 3"/>
+          <p:cNvSpPr>
+            <a:spLocks noGrp="1"/>
+          </p:cNvSpPr>
+          <p:nvPr>
+            <p:ph type="sldNum" sz="quarter" idx="10"/>
+          </p:nvPr>
+        </p:nvSpPr>
+        <p:spPr/>
+        <p:txBody>
+          <a:bodyPr/>
+          <a:lstStyle/>
+          <a:p>
+            <a:fld id="{2F6F93F9-6E01-423B-ABB3-8FB3B0651941}" type="slidenum">
+              <a:rPr lang="en-US" smtClean="0"/>
+              <a:t>37</a:t>
+            </a:fld>
+            <a:endParaRPr lang="en-US"/>
+          </a:p>
+        </p:txBody>
+      </p:sp>
+    </p:spTree>
+    <p:extLst>
+      <p:ext uri="{BB962C8B-B14F-4D97-AF65-F5344CB8AC3E}">
+        <p14:creationId xmlns:p14="http://schemas.microsoft.com/office/powerpoint/2010/main" val="754293996"/>
+      </p:ext>
+    </p:extLst>
+  </p:cSld>
+  <p:clrMapOvr>
+    <a:masterClrMapping/>
+  </p:clrMapOvr>
+</p:notes>
+</file>
+
+<file path=ppt/notesSlides/notesSlide37.xml><?xml version="1.0" encoding="utf-8"?>
+<p:notes xmlns:a="http://schemas.openxmlformats.org/drawingml/2006/main" xmlns:r="http://schemas.openxmlformats.org/officeDocument/2006/relationships" xmlns:p="http://schemas.openxmlformats.org/presentationml/2006/main">
+  <p:cSld>
+    <p:spTree>
+      <p:nvGrpSpPr>
+        <p:cNvPr id="1" name=""/>
+        <p:cNvGrpSpPr/>
+        <p:nvPr/>
+      </p:nvGrpSpPr>
+      <p:grpSpPr>
+        <a:xfrm>
+          <a:off x="0" y="0"/>
+          <a:ext cx="0" cy="0"/>
+          <a:chOff x="0" y="0"/>
+          <a:chExt cx="0" cy="0"/>
+        </a:xfrm>
+      </p:grpSpPr>
+      <p:sp>
+        <p:nvSpPr>
+          <p:cNvPr id="2" name="Slide Image Placeholder 1"/>
+          <p:cNvSpPr>
+            <a:spLocks noGrp="1" noRot="1" noChangeAspect="1"/>
+          </p:cNvSpPr>
+          <p:nvPr>
+            <p:ph type="sldImg"/>
+          </p:nvPr>
+        </p:nvSpPr>
+        <p:spPr/>
+      </p:sp>
+      <p:sp>
+        <p:nvSpPr>
+          <p:cNvPr id="3" name="Notes Placeholder 2"/>
+          <p:cNvSpPr>
+            <a:spLocks noGrp="1"/>
+          </p:cNvSpPr>
+          <p:nvPr>
+            <p:ph type="body" idx="1"/>
+          </p:nvPr>
+        </p:nvSpPr>
+        <p:spPr/>
+        <p:txBody>
+          <a:bodyPr/>
+          <a:lstStyle/>
+          <a:p>
+            <a:endParaRPr lang="en-US" dirty="0"/>
+          </a:p>
+        </p:txBody>
+      </p:sp>
+      <p:sp>
+        <p:nvSpPr>
+          <p:cNvPr id="4" name="Slide Number Placeholder 3"/>
+          <p:cNvSpPr>
+            <a:spLocks noGrp="1"/>
+          </p:cNvSpPr>
+          <p:nvPr>
+            <p:ph type="sldNum" sz="quarter" idx="10"/>
+          </p:nvPr>
+        </p:nvSpPr>
+        <p:spPr/>
+        <p:txBody>
+          <a:bodyPr/>
+          <a:lstStyle/>
+          <a:p>
+            <a:fld id="{2F6F93F9-6E01-423B-ABB3-8FB3B0651941}" type="slidenum">
+              <a:rPr lang="en-US" smtClean="0"/>
+              <a:t>38</a:t>
+            </a:fld>
+            <a:endParaRPr lang="en-US"/>
+          </a:p>
+        </p:txBody>
+      </p:sp>
+    </p:spTree>
+    <p:extLst>
+      <p:ext uri="{BB962C8B-B14F-4D97-AF65-F5344CB8AC3E}">
+        <p14:creationId xmlns:p14="http://schemas.microsoft.com/office/powerpoint/2010/main" val="2734290854"/>
+      </p:ext>
+    </p:extLst>
+  </p:cSld>
+  <p:clrMapOvr>
+    <a:masterClrMapping/>
+  </p:clrMapOvr>
+</p:notes>
+</file>
+
+<file path=ppt/notesSlides/notesSlide38.xml><?xml version="1.0" encoding="utf-8"?>
+<p:notes xmlns:a="http://schemas.openxmlformats.org/drawingml/2006/main" xmlns:r="http://schemas.openxmlformats.org/officeDocument/2006/relationships" xmlns:p="http://schemas.openxmlformats.org/presentationml/2006/main">
+  <p:cSld>
+    <p:spTree>
+      <p:nvGrpSpPr>
+        <p:cNvPr id="1" name=""/>
+        <p:cNvGrpSpPr/>
+        <p:nvPr/>
+      </p:nvGrpSpPr>
+      <p:grpSpPr>
+        <a:xfrm>
+          <a:off x="0" y="0"/>
+          <a:ext cx="0" cy="0"/>
+          <a:chOff x="0" y="0"/>
+          <a:chExt cx="0" cy="0"/>
+        </a:xfrm>
+      </p:grpSpPr>
+      <p:sp>
+        <p:nvSpPr>
+          <p:cNvPr id="2" name="Slide Image Placeholder 1"/>
+          <p:cNvSpPr>
+            <a:spLocks noGrp="1" noRot="1" noChangeAspect="1"/>
+          </p:cNvSpPr>
+          <p:nvPr>
+            <p:ph type="sldImg"/>
+          </p:nvPr>
+        </p:nvSpPr>
+        <p:spPr/>
+      </p:sp>
+      <p:sp>
+        <p:nvSpPr>
+          <p:cNvPr id="3" name="Notes Placeholder 2"/>
+          <p:cNvSpPr>
+            <a:spLocks noGrp="1"/>
+          </p:cNvSpPr>
+          <p:nvPr>
+            <p:ph type="body" idx="1"/>
+          </p:nvPr>
+        </p:nvSpPr>
+        <p:spPr/>
+        <p:txBody>
+          <a:bodyPr/>
+          <a:lstStyle/>
+          <a:p>
+            <a:pPr marL="171450" indent="-171450">
+              <a:buFont typeface="Arial" panose="020B0604020202020204" pitchFamily="34" charset="0"/>
+              <a:buChar char="•"/>
+            </a:pPr>
+            <a:endParaRPr lang="en-US" dirty="0"/>
+          </a:p>
+        </p:txBody>
+      </p:sp>
+      <p:sp>
+        <p:nvSpPr>
+          <p:cNvPr id="4" name="Slide Number Placeholder 3"/>
+          <p:cNvSpPr>
+            <a:spLocks noGrp="1"/>
+          </p:cNvSpPr>
+          <p:nvPr>
+            <p:ph type="sldNum" sz="quarter" idx="10"/>
+          </p:nvPr>
+        </p:nvSpPr>
+        <p:spPr/>
+        <p:txBody>
+          <a:bodyPr/>
+          <a:lstStyle/>
+          <a:p>
+            <a:fld id="{2F6F93F9-6E01-423B-ABB3-8FB3B0651941}" type="slidenum">
+              <a:rPr lang="en-US" smtClean="0"/>
+              <a:t>39</a:t>
+            </a:fld>
+            <a:endParaRPr lang="en-US"/>
+          </a:p>
+        </p:txBody>
+      </p:sp>
+    </p:spTree>
+    <p:extLst>
+      <p:ext uri="{BB962C8B-B14F-4D97-AF65-F5344CB8AC3E}">
+        <p14:creationId xmlns:p14="http://schemas.microsoft.com/office/powerpoint/2010/main" val="2151544308"/>
+      </p:ext>
+    </p:extLst>
+  </p:cSld>
+  <p:clrMapOvr>
+    <a:masterClrMapping/>
+  </p:clrMapOvr>
+</p:notes>
+</file>
+
+<file path=ppt/notesSlides/notesSlide39.xml><?xml version="1.0" encoding="utf-8"?>
+<p:notes xmlns:a="http://schemas.openxmlformats.org/drawingml/2006/main" xmlns:r="http://schemas.openxmlformats.org/officeDocument/2006/relationships" xmlns:p="http://schemas.openxmlformats.org/presentationml/2006/main">
+  <p:cSld>
+    <p:spTree>
+      <p:nvGrpSpPr>
+        <p:cNvPr id="1" name=""/>
+        <p:cNvGrpSpPr/>
+        <p:nvPr/>
+      </p:nvGrpSpPr>
+      <p:grpSpPr>
+        <a:xfrm>
+          <a:off x="0" y="0"/>
+          <a:ext cx="0" cy="0"/>
+          <a:chOff x="0" y="0"/>
+          <a:chExt cx="0" cy="0"/>
+        </a:xfrm>
+      </p:grpSpPr>
+      <p:sp>
+        <p:nvSpPr>
+          <p:cNvPr id="2" name="Slide Image Placeholder 1"/>
+          <p:cNvSpPr>
+            <a:spLocks noGrp="1" noRot="1" noChangeAspect="1"/>
+          </p:cNvSpPr>
+          <p:nvPr>
+            <p:ph type="sldImg"/>
+          </p:nvPr>
+        </p:nvSpPr>
+        <p:spPr/>
+      </p:sp>
+      <p:sp>
+        <p:nvSpPr>
+          <p:cNvPr id="3" name="Notes Placeholder 2"/>
+          <p:cNvSpPr>
+            <a:spLocks noGrp="1"/>
+          </p:cNvSpPr>
+          <p:nvPr>
+            <p:ph type="body" idx="1"/>
+          </p:nvPr>
+        </p:nvSpPr>
+        <p:spPr/>
+        <p:txBody>
+          <a:bodyPr/>
+          <a:lstStyle/>
+          <a:p>
+            <a:endParaRPr lang="en-US" dirty="0"/>
+          </a:p>
+        </p:txBody>
+      </p:sp>
+      <p:sp>
+        <p:nvSpPr>
+          <p:cNvPr id="4" name="Slide Number Placeholder 3"/>
+          <p:cNvSpPr>
+            <a:spLocks noGrp="1"/>
+          </p:cNvSpPr>
+          <p:nvPr>
+            <p:ph type="sldNum" sz="quarter" idx="10"/>
+          </p:nvPr>
+        </p:nvSpPr>
+        <p:spPr/>
+        <p:txBody>
+          <a:bodyPr/>
+          <a:lstStyle/>
+          <a:p>
+            <a:fld id="{2F6F93F9-6E01-423B-ABB3-8FB3B0651941}" type="slidenum">
+              <a:rPr lang="en-US" smtClean="0"/>
+              <a:t>40</a:t>
+            </a:fld>
+            <a:endParaRPr lang="en-US"/>
+          </a:p>
+        </p:txBody>
+      </p:sp>
+    </p:spTree>
+    <p:extLst>
+      <p:ext uri="{BB962C8B-B14F-4D97-AF65-F5344CB8AC3E}">
+        <p14:creationId xmlns:p14="http://schemas.microsoft.com/office/powerpoint/2010/main" val="635390149"/>
+      </p:ext>
+    </p:extLst>
+  </p:cSld>
+  <p:clrMapOvr>
+    <a:masterClrMapping/>
+  </p:clrMapOvr>
+</p:notes>
+</file>
+
 <file path=ppt/notesSlides/notesSlide4.xml><?xml version="1.0" encoding="utf-8"?>
 <p:notes xmlns:a="http://schemas.openxmlformats.org/drawingml/2006/main" xmlns:r="http://schemas.openxmlformats.org/officeDocument/2006/relationships" xmlns:p="http://schemas.openxmlformats.org/presentationml/2006/main">
   <p:cSld>
@@ -3159,7 +3591,16 @@
           <a:bodyPr/>
           <a:lstStyle/>
           <a:p>
-            <a:endParaRPr lang="en-US" dirty="0"/>
+            <a:r>
+              <a:rPr lang="en-US" dirty="0"/>
+              <a:t>Faulty reasoning, objective, state prediction, long/short horizon, assumptions, question of perspective</a:t>
+            </a:r>
+          </a:p>
+          <a:p>
+            <a:r>
+              <a:rPr lang="en-US" dirty="0"/>
+              <a:t>Lizard</a:t>
+            </a:r>
           </a:p>
         </p:txBody>
       </p:sp>
@@ -14905,7 +15346,7 @@
                 </a:solidFill>
                 <a:latin typeface="Cambria" panose="02040503050406030204" pitchFamily="18" charset="0"/>
               </a:rPr>
-              <a:t>TECHNOLOGY SIDE</a:t>
+              <a:t>TECHNOLOGICAL/SCIENTIFIC SIDES</a:t>
             </a:r>
           </a:p>
         </p:txBody>
@@ -14925,7 +15366,7 @@
         <p:spPr>
           <a:xfrm>
             <a:off x="1275701" y="2333156"/>
-            <a:ext cx="9909364" cy="1200329"/>
+            <a:ext cx="9909364" cy="3785652"/>
           </a:xfrm>
           <a:prstGeom prst="rect">
             <a:avLst/>
@@ -14949,8 +15390,92 @@
                 </a:solidFill>
                 <a:latin typeface="Cambria" panose="02040503050406030204" pitchFamily="18" charset="0"/>
               </a:rPr>
-              <a:t>…</a:t>
-            </a:r>
+              <a:t>UNDERSTAND WHY DOES IT WORK SO WELL !!</a:t>
+            </a:r>
+            <a:br>
+              <a:rPr lang="en-US" sz="2400" b="1" dirty="0">
+                <a:solidFill>
+                  <a:schemeClr val="accent1"/>
+                </a:solidFill>
+                <a:latin typeface="Cambria" panose="02040503050406030204" pitchFamily="18" charset="0"/>
+              </a:rPr>
+            </a:br>
+            <a:endParaRPr lang="en-US" sz="2400" b="1" dirty="0">
+              <a:solidFill>
+                <a:schemeClr val="accent1"/>
+              </a:solidFill>
+              <a:latin typeface="Cambria" panose="02040503050406030204" pitchFamily="18" charset="0"/>
+            </a:endParaRPr>
+          </a:p>
+          <a:p>
+            <a:pPr marL="457200" indent="-457200">
+              <a:buFont typeface="+mj-lt"/>
+              <a:buAutoNum type="arabicPeriod"/>
+            </a:pPr>
+            <a:r>
+              <a:rPr lang="en-US" sz="2400" b="1" dirty="0">
+                <a:solidFill>
+                  <a:schemeClr val="accent1"/>
+                </a:solidFill>
+                <a:latin typeface="Cambria" panose="02040503050406030204" pitchFamily="18" charset="0"/>
+              </a:rPr>
+              <a:t>PREDICTION ON LONG TERM HORIZON</a:t>
+            </a:r>
+            <a:br>
+              <a:rPr lang="en-US" sz="2400" b="1" dirty="0">
+                <a:solidFill>
+                  <a:schemeClr val="accent1"/>
+                </a:solidFill>
+                <a:latin typeface="Cambria" panose="02040503050406030204" pitchFamily="18" charset="0"/>
+              </a:rPr>
+            </a:br>
+            <a:endParaRPr lang="en-US" sz="2400" b="1" dirty="0">
+              <a:solidFill>
+                <a:schemeClr val="accent1"/>
+              </a:solidFill>
+              <a:latin typeface="Cambria" panose="02040503050406030204" pitchFamily="18" charset="0"/>
+            </a:endParaRPr>
+          </a:p>
+          <a:p>
+            <a:pPr marL="457200" indent="-457200">
+              <a:buFont typeface="+mj-lt"/>
+              <a:buAutoNum type="arabicPeriod"/>
+            </a:pPr>
+            <a:r>
+              <a:rPr lang="en-US" sz="2400" b="1" dirty="0">
+                <a:solidFill>
+                  <a:schemeClr val="accent1"/>
+                </a:solidFill>
+                <a:latin typeface="Cambria" panose="02040503050406030204" pitchFamily="18" charset="0"/>
+              </a:rPr>
+              <a:t>UNSUPERVISED LEARNING -&gt; BUILD A MODEL OF THE WORLD FROM SCRATCH</a:t>
+            </a:r>
+            <a:br>
+              <a:rPr lang="en-US" sz="2400" b="1" dirty="0">
+                <a:solidFill>
+                  <a:schemeClr val="accent1"/>
+                </a:solidFill>
+                <a:latin typeface="Cambria" panose="02040503050406030204" pitchFamily="18" charset="0"/>
+              </a:rPr>
+            </a:br>
+            <a:endParaRPr lang="en-US" sz="2400" b="1" dirty="0">
+              <a:solidFill>
+                <a:schemeClr val="accent1"/>
+              </a:solidFill>
+              <a:latin typeface="Cambria" panose="02040503050406030204" pitchFamily="18" charset="0"/>
+            </a:endParaRPr>
+          </a:p>
+          <a:p>
+            <a:pPr marL="457200" indent="-457200">
+              <a:buFont typeface="+mj-lt"/>
+              <a:buAutoNum type="arabicPeriod"/>
+            </a:pPr>
+            <a:endParaRPr lang="en-US" sz="2400" b="1" dirty="0">
+              <a:solidFill>
+                <a:schemeClr val="accent1"/>
+              </a:solidFill>
+              <a:latin typeface="Cambria" panose="02040503050406030204" pitchFamily="18" charset="0"/>
+            </a:endParaRPr>
           </a:p>
           <a:p>
             <a:pPr marL="342900" indent="-342900">
@@ -14995,7 +15520,7 @@
         <p:spPr>
           <a:xfrm>
             <a:off x="1378101" y="1719743"/>
-            <a:ext cx="6088101" cy="0"/>
+            <a:ext cx="6859888" cy="0"/>
           </a:xfrm>
           <a:prstGeom prst="line">
             <a:avLst/>
@@ -15042,6 +15567,803 @@
 </p:sld>
 </file>
 
+<file path=ppt/slides/slide36.xml><?xml version="1.0" encoding="utf-8"?>
+<p:sld xmlns:a="http://schemas.openxmlformats.org/drawingml/2006/main" xmlns:r="http://schemas.openxmlformats.org/officeDocument/2006/relationships" xmlns:p="http://schemas.openxmlformats.org/presentationml/2006/main">
+  <p:cSld>
+    <p:spTree>
+      <p:nvGrpSpPr>
+        <p:cNvPr id="1" name=""/>
+        <p:cNvGrpSpPr/>
+        <p:nvPr/>
+      </p:nvGrpSpPr>
+      <p:grpSpPr>
+        <a:xfrm>
+          <a:off x="0" y="0"/>
+          <a:ext cx="0" cy="0"/>
+          <a:chOff x="0" y="0"/>
+          <a:chExt cx="0" cy="0"/>
+        </a:xfrm>
+      </p:grpSpPr>
+      <p:sp>
+        <p:nvSpPr>
+          <p:cNvPr id="8" name="TextBox 7"/>
+          <p:cNvSpPr txBox="1"/>
+          <p:nvPr/>
+        </p:nvSpPr>
+        <p:spPr>
+          <a:xfrm>
+            <a:off x="1271768" y="1115051"/>
+            <a:ext cx="9196386" cy="553998"/>
+          </a:xfrm>
+          <a:prstGeom prst="rect">
+            <a:avLst/>
+          </a:prstGeom>
+          <a:noFill/>
+        </p:spPr>
+        <p:txBody>
+          <a:bodyPr wrap="square" rtlCol="0">
+            <a:spAutoFit/>
+          </a:bodyPr>
+          <a:lstStyle/>
+          <a:p>
+            <a:r>
+              <a:rPr lang="en-US" sz="3000" b="1" dirty="0">
+                <a:solidFill>
+                  <a:schemeClr val="accent1"/>
+                </a:solidFill>
+                <a:latin typeface="Cambria" panose="02040503050406030204" pitchFamily="18" charset="0"/>
+              </a:rPr>
+              <a:t>ON BUSINESS SIDE</a:t>
+            </a:r>
+          </a:p>
+        </p:txBody>
+      </p:sp>
+      <p:sp>
+        <p:nvSpPr>
+          <p:cNvPr id="6" name="TextBox 5">
+            <a:extLst>
+              <a:ext uri="{FF2B5EF4-FFF2-40B4-BE49-F238E27FC236}">
+                <a16:creationId xmlns:a16="http://schemas.microsoft.com/office/drawing/2014/main" id="{80CDDE41-8C09-D54C-917C-9FB77CE4824D}"/>
+              </a:ext>
+            </a:extLst>
+          </p:cNvPr>
+          <p:cNvSpPr txBox="1"/>
+          <p:nvPr/>
+        </p:nvSpPr>
+        <p:spPr>
+          <a:xfrm>
+            <a:off x="1275701" y="2333156"/>
+            <a:ext cx="10619888" cy="1938992"/>
+          </a:xfrm>
+          <a:prstGeom prst="rect">
+            <a:avLst/>
+          </a:prstGeom>
+          <a:noFill/>
+        </p:spPr>
+        <p:txBody>
+          <a:bodyPr wrap="square" rtlCol="0">
+            <a:spAutoFit/>
+          </a:bodyPr>
+          <a:lstStyle/>
+          <a:p>
+            <a:pPr marL="342900" indent="-342900">
+              <a:buFont typeface="Arial"/>
+              <a:buChar char="•"/>
+            </a:pPr>
+            <a:r>
+              <a:rPr lang="en-US" sz="2400" b="1" dirty="0">
+                <a:solidFill>
+                  <a:schemeClr val="accent1"/>
+                </a:solidFill>
+                <a:latin typeface="Cambria" panose="02040503050406030204" pitchFamily="18" charset="0"/>
+              </a:rPr>
+              <a:t>TRANSITION TO INDUSTRIALIZATION</a:t>
+            </a:r>
+            <a:br>
+              <a:rPr lang="en-US" sz="2400" b="1" dirty="0">
+                <a:solidFill>
+                  <a:schemeClr val="accent1"/>
+                </a:solidFill>
+                <a:latin typeface="Cambria" panose="02040503050406030204" pitchFamily="18" charset="0"/>
+              </a:rPr>
+            </a:br>
+            <a:endParaRPr lang="en-US" sz="2400" b="1" dirty="0">
+              <a:solidFill>
+                <a:schemeClr val="accent1"/>
+              </a:solidFill>
+              <a:latin typeface="Cambria" panose="02040503050406030204" pitchFamily="18" charset="0"/>
+            </a:endParaRPr>
+          </a:p>
+          <a:p>
+            <a:pPr marL="342900" indent="-342900">
+              <a:buFont typeface="Arial"/>
+              <a:buChar char="•"/>
+            </a:pPr>
+            <a:r>
+              <a:rPr lang="en-US" sz="2400" b="1" dirty="0">
+                <a:solidFill>
+                  <a:schemeClr val="accent1"/>
+                </a:solidFill>
+                <a:latin typeface="Cambria" panose="02040503050406030204" pitchFamily="18" charset="0"/>
+              </a:rPr>
+              <a:t>EAGER ENTREPRENEURS</a:t>
+            </a:r>
+          </a:p>
+          <a:p>
+            <a:pPr marL="342900" indent="-342900">
+              <a:buFont typeface="Arial"/>
+              <a:buChar char="•"/>
+            </a:pPr>
+            <a:endParaRPr lang="en-US" sz="2400" b="1" dirty="0">
+              <a:solidFill>
+                <a:schemeClr val="accent1"/>
+              </a:solidFill>
+              <a:latin typeface="Cambria" panose="02040503050406030204" pitchFamily="18" charset="0"/>
+            </a:endParaRPr>
+          </a:p>
+          <a:p>
+            <a:pPr marL="342900" indent="-342900">
+              <a:buFont typeface="Arial"/>
+              <a:buChar char="•"/>
+            </a:pPr>
+            <a:endParaRPr lang="en-US" sz="2400" b="1" dirty="0">
+              <a:solidFill>
+                <a:schemeClr val="accent1"/>
+              </a:solidFill>
+              <a:latin typeface="Cambria" panose="02040503050406030204" pitchFamily="18" charset="0"/>
+            </a:endParaRPr>
+          </a:p>
+        </p:txBody>
+      </p:sp>
+      <p:cxnSp>
+        <p:nvCxnSpPr>
+          <p:cNvPr id="4" name="Straight Connector 3">
+            <a:extLst>
+              <a:ext uri="{FF2B5EF4-FFF2-40B4-BE49-F238E27FC236}">
+                <a16:creationId xmlns:a16="http://schemas.microsoft.com/office/drawing/2014/main" id="{F458DAFA-A6D7-FD44-88D7-148D2FA54298}"/>
+              </a:ext>
+            </a:extLst>
+          </p:cNvPr>
+          <p:cNvCxnSpPr>
+            <a:cxnSpLocks/>
+          </p:cNvCxnSpPr>
+          <p:nvPr/>
+        </p:nvCxnSpPr>
+        <p:spPr>
+          <a:xfrm>
+            <a:off x="1378101" y="1719743"/>
+            <a:ext cx="6994112" cy="0"/>
+          </a:xfrm>
+          <a:prstGeom prst="line">
+            <a:avLst/>
+          </a:prstGeom>
+          <a:ln w="12700"/>
+        </p:spPr>
+        <p:style>
+          <a:lnRef idx="1">
+            <a:schemeClr val="accent1"/>
+          </a:lnRef>
+          <a:fillRef idx="0">
+            <a:schemeClr val="accent1"/>
+          </a:fillRef>
+          <a:effectRef idx="0">
+            <a:schemeClr val="accent1"/>
+          </a:effectRef>
+          <a:fontRef idx="minor">
+            <a:schemeClr val="tx1"/>
+          </a:fontRef>
+        </p:style>
+      </p:cxnSp>
+    </p:spTree>
+    <p:extLst>
+      <p:ext uri="{BB962C8B-B14F-4D97-AF65-F5344CB8AC3E}">
+        <p14:creationId xmlns:p14="http://schemas.microsoft.com/office/powerpoint/2010/main" val="22728486"/>
+      </p:ext>
+    </p:extLst>
+  </p:cSld>
+  <p:clrMapOvr>
+    <a:masterClrMapping/>
+  </p:clrMapOvr>
+  <mc:AlternateContent xmlns:mc="http://schemas.openxmlformats.org/markup-compatibility/2006" xmlns:p14="http://schemas.microsoft.com/office/powerpoint/2010/main">
+    <mc:Choice Requires="p14">
+      <p:transition spd="med" p14:dur="700">
+        <p:fade/>
+      </p:transition>
+    </mc:Choice>
+    <mc:Fallback xmlns="">
+      <p:transition spd="med">
+        <p:fade/>
+      </p:transition>
+    </mc:Fallback>
+  </mc:AlternateContent>
+</p:sld>
+</file>
+
+<file path=ppt/slides/slide37.xml><?xml version="1.0" encoding="utf-8"?>
+<p:sld xmlns:a="http://schemas.openxmlformats.org/drawingml/2006/main" xmlns:r="http://schemas.openxmlformats.org/officeDocument/2006/relationships" xmlns:p="http://schemas.openxmlformats.org/presentationml/2006/main">
+  <p:cSld>
+    <p:spTree>
+      <p:nvGrpSpPr>
+        <p:cNvPr id="1" name=""/>
+        <p:cNvGrpSpPr/>
+        <p:nvPr/>
+      </p:nvGrpSpPr>
+      <p:grpSpPr>
+        <a:xfrm>
+          <a:off x="0" y="0"/>
+          <a:ext cx="0" cy="0"/>
+          <a:chOff x="0" y="0"/>
+          <a:chExt cx="0" cy="0"/>
+        </a:xfrm>
+      </p:grpSpPr>
+      <p:sp>
+        <p:nvSpPr>
+          <p:cNvPr id="8" name="TextBox 7"/>
+          <p:cNvSpPr txBox="1"/>
+          <p:nvPr/>
+        </p:nvSpPr>
+        <p:spPr>
+          <a:xfrm>
+            <a:off x="1271768" y="1115051"/>
+            <a:ext cx="9196386" cy="553998"/>
+          </a:xfrm>
+          <a:prstGeom prst="rect">
+            <a:avLst/>
+          </a:prstGeom>
+          <a:noFill/>
+        </p:spPr>
+        <p:txBody>
+          <a:bodyPr wrap="square" rtlCol="0">
+            <a:spAutoFit/>
+          </a:bodyPr>
+          <a:lstStyle/>
+          <a:p>
+            <a:r>
+              <a:rPr lang="en-US" sz="3000" b="1" dirty="0">
+                <a:solidFill>
+                  <a:schemeClr val="accent1"/>
+                </a:solidFill>
+                <a:latin typeface="Cambria" panose="02040503050406030204" pitchFamily="18" charset="0"/>
+              </a:rPr>
+              <a:t>ON SOCIETAL &amp; POLICY SIDES</a:t>
+            </a:r>
+          </a:p>
+        </p:txBody>
+      </p:sp>
+      <p:sp>
+        <p:nvSpPr>
+          <p:cNvPr id="6" name="TextBox 5">
+            <a:extLst>
+              <a:ext uri="{FF2B5EF4-FFF2-40B4-BE49-F238E27FC236}">
+                <a16:creationId xmlns:a16="http://schemas.microsoft.com/office/drawing/2014/main" id="{80CDDE41-8C09-D54C-917C-9FB77CE4824D}"/>
+              </a:ext>
+            </a:extLst>
+          </p:cNvPr>
+          <p:cNvSpPr txBox="1"/>
+          <p:nvPr/>
+        </p:nvSpPr>
+        <p:spPr>
+          <a:xfrm>
+            <a:off x="1275701" y="2333156"/>
+            <a:ext cx="10619888" cy="3046988"/>
+          </a:xfrm>
+          <a:prstGeom prst="rect">
+            <a:avLst/>
+          </a:prstGeom>
+          <a:noFill/>
+        </p:spPr>
+        <p:txBody>
+          <a:bodyPr wrap="square" rtlCol="0">
+            <a:spAutoFit/>
+          </a:bodyPr>
+          <a:lstStyle/>
+          <a:p>
+            <a:pPr marL="342900" indent="-342900">
+              <a:buFont typeface="Arial"/>
+              <a:buChar char="•"/>
+            </a:pPr>
+            <a:r>
+              <a:rPr lang="en-US" sz="2400" b="1" dirty="0">
+                <a:solidFill>
+                  <a:schemeClr val="accent1"/>
+                </a:solidFill>
+                <a:latin typeface="Cambria" panose="02040503050406030204" pitchFamily="18" charset="0"/>
+              </a:rPr>
+              <a:t>MANY ETHICAL CONSIDERATIONS</a:t>
+            </a:r>
+            <a:br>
+              <a:rPr lang="en-US" sz="2400" b="1" dirty="0">
+                <a:solidFill>
+                  <a:schemeClr val="accent1"/>
+                </a:solidFill>
+                <a:latin typeface="Cambria" panose="02040503050406030204" pitchFamily="18" charset="0"/>
+              </a:rPr>
+            </a:br>
+            <a:endParaRPr lang="en-US" sz="2400" b="1" dirty="0">
+              <a:solidFill>
+                <a:schemeClr val="accent1"/>
+              </a:solidFill>
+              <a:latin typeface="Cambria" panose="02040503050406030204" pitchFamily="18" charset="0"/>
+            </a:endParaRPr>
+          </a:p>
+          <a:p>
+            <a:pPr marL="342900" indent="-342900">
+              <a:buFont typeface="Arial"/>
+              <a:buChar char="•"/>
+            </a:pPr>
+            <a:r>
+              <a:rPr lang="en-US" sz="2400" b="1" dirty="0">
+                <a:solidFill>
+                  <a:schemeClr val="accent1"/>
+                </a:solidFill>
+                <a:latin typeface="Cambria" panose="02040503050406030204" pitchFamily="18" charset="0"/>
+              </a:rPr>
+              <a:t>INFORMED AND AMBITIOUS POLICIES</a:t>
+            </a:r>
+            <a:br>
+              <a:rPr lang="en-US" sz="2400" b="1" dirty="0">
+                <a:solidFill>
+                  <a:schemeClr val="accent1"/>
+                </a:solidFill>
+                <a:latin typeface="Cambria" panose="02040503050406030204" pitchFamily="18" charset="0"/>
+              </a:rPr>
+            </a:br>
+            <a:endParaRPr lang="en-US" sz="2400" b="1" dirty="0">
+              <a:solidFill>
+                <a:schemeClr val="accent1"/>
+              </a:solidFill>
+              <a:latin typeface="Cambria" panose="02040503050406030204" pitchFamily="18" charset="0"/>
+            </a:endParaRPr>
+          </a:p>
+          <a:p>
+            <a:pPr marL="342900" indent="-342900">
+              <a:buFont typeface="Arial"/>
+              <a:buChar char="•"/>
+            </a:pPr>
+            <a:r>
+              <a:rPr lang="en-US" sz="2400" b="1" dirty="0">
+                <a:solidFill>
+                  <a:schemeClr val="accent1"/>
+                </a:solidFill>
+                <a:latin typeface="Cambria" panose="02040503050406030204" pitchFamily="18" charset="0"/>
+              </a:rPr>
+              <a:t>HUGE SOCIAL IMPACT TO ANTICIPATE</a:t>
+            </a:r>
+            <a:br>
+              <a:rPr lang="en-US" sz="2400" b="1" dirty="0">
+                <a:solidFill>
+                  <a:schemeClr val="accent1"/>
+                </a:solidFill>
+                <a:latin typeface="Cambria" panose="02040503050406030204" pitchFamily="18" charset="0"/>
+              </a:rPr>
+            </a:br>
+            <a:endParaRPr lang="en-US" sz="2400" b="1" dirty="0">
+              <a:solidFill>
+                <a:schemeClr val="accent1"/>
+              </a:solidFill>
+              <a:latin typeface="Cambria" panose="02040503050406030204" pitchFamily="18" charset="0"/>
+            </a:endParaRPr>
+          </a:p>
+          <a:p>
+            <a:pPr marL="342900" indent="-342900">
+              <a:buFont typeface="Arial"/>
+              <a:buChar char="•"/>
+            </a:pPr>
+            <a:endParaRPr lang="en-US" sz="2400" b="1" dirty="0">
+              <a:solidFill>
+                <a:schemeClr val="accent1"/>
+              </a:solidFill>
+              <a:latin typeface="Cambria" panose="02040503050406030204" pitchFamily="18" charset="0"/>
+            </a:endParaRPr>
+          </a:p>
+          <a:p>
+            <a:pPr marL="342900" indent="-342900">
+              <a:buFont typeface="Arial"/>
+              <a:buChar char="•"/>
+            </a:pPr>
+            <a:endParaRPr lang="en-US" sz="2400" b="1" dirty="0">
+              <a:solidFill>
+                <a:schemeClr val="accent1"/>
+              </a:solidFill>
+              <a:latin typeface="Cambria" panose="02040503050406030204" pitchFamily="18" charset="0"/>
+            </a:endParaRPr>
+          </a:p>
+        </p:txBody>
+      </p:sp>
+      <p:cxnSp>
+        <p:nvCxnSpPr>
+          <p:cNvPr id="4" name="Straight Connector 3">
+            <a:extLst>
+              <a:ext uri="{FF2B5EF4-FFF2-40B4-BE49-F238E27FC236}">
+                <a16:creationId xmlns:a16="http://schemas.microsoft.com/office/drawing/2014/main" id="{C91BFCF2-D14B-4A4F-8009-EA3160CDD49B}"/>
+              </a:ext>
+            </a:extLst>
+          </p:cNvPr>
+          <p:cNvCxnSpPr>
+            <a:cxnSpLocks/>
+          </p:cNvCxnSpPr>
+          <p:nvPr/>
+        </p:nvCxnSpPr>
+        <p:spPr>
+          <a:xfrm>
+            <a:off x="1378101" y="1719743"/>
+            <a:ext cx="9175249" cy="0"/>
+          </a:xfrm>
+          <a:prstGeom prst="line">
+            <a:avLst/>
+          </a:prstGeom>
+          <a:ln w="12700"/>
+        </p:spPr>
+        <p:style>
+          <a:lnRef idx="1">
+            <a:schemeClr val="accent1"/>
+          </a:lnRef>
+          <a:fillRef idx="0">
+            <a:schemeClr val="accent1"/>
+          </a:fillRef>
+          <a:effectRef idx="0">
+            <a:schemeClr val="accent1"/>
+          </a:effectRef>
+          <a:fontRef idx="minor">
+            <a:schemeClr val="tx1"/>
+          </a:fontRef>
+        </p:style>
+      </p:cxnSp>
+    </p:spTree>
+    <p:extLst>
+      <p:ext uri="{BB962C8B-B14F-4D97-AF65-F5344CB8AC3E}">
+        <p14:creationId xmlns:p14="http://schemas.microsoft.com/office/powerpoint/2010/main" val="1228424229"/>
+      </p:ext>
+    </p:extLst>
+  </p:cSld>
+  <p:clrMapOvr>
+    <a:masterClrMapping/>
+  </p:clrMapOvr>
+  <mc:AlternateContent xmlns:mc="http://schemas.openxmlformats.org/markup-compatibility/2006" xmlns:p14="http://schemas.microsoft.com/office/powerpoint/2010/main">
+    <mc:Choice Requires="p14">
+      <p:transition spd="med" p14:dur="700">
+        <p:fade/>
+      </p:transition>
+    </mc:Choice>
+    <mc:Fallback xmlns="">
+      <p:transition spd="med">
+        <p:fade/>
+      </p:transition>
+    </mc:Fallback>
+  </mc:AlternateContent>
+</p:sld>
+</file>
+
+<file path=ppt/slides/slide38.xml><?xml version="1.0" encoding="utf-8"?>
+<p:sld xmlns:a="http://schemas.openxmlformats.org/drawingml/2006/main" xmlns:r="http://schemas.openxmlformats.org/officeDocument/2006/relationships" xmlns:p="http://schemas.openxmlformats.org/presentationml/2006/main">
+  <p:cSld>
+    <p:spTree>
+      <p:nvGrpSpPr>
+        <p:cNvPr id="1" name=""/>
+        <p:cNvGrpSpPr/>
+        <p:nvPr/>
+      </p:nvGrpSpPr>
+      <p:grpSpPr>
+        <a:xfrm>
+          <a:off x="0" y="0"/>
+          <a:ext cx="0" cy="0"/>
+          <a:chOff x="0" y="0"/>
+          <a:chExt cx="0" cy="0"/>
+        </a:xfrm>
+      </p:grpSpPr>
+      <p:sp>
+        <p:nvSpPr>
+          <p:cNvPr id="8" name="TextBox 7"/>
+          <p:cNvSpPr txBox="1"/>
+          <p:nvPr/>
+        </p:nvSpPr>
+        <p:spPr>
+          <a:xfrm>
+            <a:off x="1271768" y="1115051"/>
+            <a:ext cx="9196386" cy="553998"/>
+          </a:xfrm>
+          <a:prstGeom prst="rect">
+            <a:avLst/>
+          </a:prstGeom>
+          <a:noFill/>
+        </p:spPr>
+        <p:txBody>
+          <a:bodyPr wrap="square" rtlCol="0">
+            <a:spAutoFit/>
+          </a:bodyPr>
+          <a:lstStyle/>
+          <a:p>
+            <a:r>
+              <a:rPr lang="en-US" sz="3000" b="1" dirty="0">
+                <a:solidFill>
+                  <a:schemeClr val="accent1"/>
+                </a:solidFill>
+                <a:latin typeface="Cambria" panose="02040503050406030204" pitchFamily="18" charset="0"/>
+              </a:rPr>
+              <a:t>AI IS A MATTER OF TRADEOFFS</a:t>
+            </a:r>
+          </a:p>
+        </p:txBody>
+      </p:sp>
+      <p:sp>
+        <p:nvSpPr>
+          <p:cNvPr id="3" name="TextBox 2">
+            <a:extLst>
+              <a:ext uri="{FF2B5EF4-FFF2-40B4-BE49-F238E27FC236}">
+                <a16:creationId xmlns:a16="http://schemas.microsoft.com/office/drawing/2014/main" id="{C52FDFE8-C131-F145-8143-EFCAD8E53816}"/>
+              </a:ext>
+            </a:extLst>
+          </p:cNvPr>
+          <p:cNvSpPr txBox="1"/>
+          <p:nvPr/>
+        </p:nvSpPr>
+        <p:spPr>
+          <a:xfrm>
+            <a:off x="1275701" y="2366108"/>
+            <a:ext cx="9909364" cy="1938992"/>
+          </a:xfrm>
+          <a:prstGeom prst="rect">
+            <a:avLst/>
+          </a:prstGeom>
+          <a:noFill/>
+        </p:spPr>
+        <p:txBody>
+          <a:bodyPr wrap="square" rtlCol="0">
+            <a:spAutoFit/>
+          </a:bodyPr>
+          <a:lstStyle/>
+          <a:p>
+            <a:pPr marL="342900" indent="-342900">
+              <a:buFont typeface="Arial"/>
+              <a:buChar char="•"/>
+            </a:pPr>
+            <a:r>
+              <a:rPr lang="en-US" sz="2400" b="1" dirty="0">
+                <a:solidFill>
+                  <a:schemeClr val="accent1"/>
+                </a:solidFill>
+                <a:latin typeface="Cambria" panose="02040503050406030204" pitchFamily="18" charset="0"/>
+              </a:rPr>
+              <a:t>MORE DATA =&gt; LESS PRIVACY</a:t>
+            </a:r>
+          </a:p>
+          <a:p>
+            <a:pPr marL="342900" indent="-342900">
+              <a:buFont typeface="Arial"/>
+              <a:buChar char="•"/>
+            </a:pPr>
+            <a:endParaRPr lang="en-US" sz="2400" b="1" dirty="0">
+              <a:solidFill>
+                <a:schemeClr val="accent1"/>
+              </a:solidFill>
+              <a:latin typeface="Cambria" panose="02040503050406030204" pitchFamily="18" charset="0"/>
+            </a:endParaRPr>
+          </a:p>
+          <a:p>
+            <a:pPr marL="342900" indent="-342900">
+              <a:buFont typeface="Arial"/>
+              <a:buChar char="•"/>
+            </a:pPr>
+            <a:r>
+              <a:rPr lang="en-US" sz="2400" b="1" dirty="0">
+                <a:solidFill>
+                  <a:schemeClr val="accent1"/>
+                </a:solidFill>
+                <a:latin typeface="Cambria" panose="02040503050406030204" pitchFamily="18" charset="0"/>
+              </a:rPr>
+              <a:t>MORE AUTONOMY =&gt; LESS CONTROL</a:t>
+            </a:r>
+            <a:br>
+              <a:rPr lang="en-US" sz="2400" b="1" dirty="0">
+                <a:solidFill>
+                  <a:schemeClr val="accent1"/>
+                </a:solidFill>
+                <a:latin typeface="Cambria" panose="02040503050406030204" pitchFamily="18" charset="0"/>
+              </a:rPr>
+            </a:br>
+            <a:endParaRPr lang="en-US" sz="2400" b="1" dirty="0">
+              <a:solidFill>
+                <a:schemeClr val="accent1"/>
+              </a:solidFill>
+              <a:latin typeface="Cambria" panose="02040503050406030204" pitchFamily="18" charset="0"/>
+            </a:endParaRPr>
+          </a:p>
+          <a:p>
+            <a:pPr marL="342900" indent="-342900">
+              <a:buFont typeface="Arial"/>
+              <a:buChar char="•"/>
+            </a:pPr>
+            <a:r>
+              <a:rPr lang="en-US" sz="2400" b="1" dirty="0">
+                <a:solidFill>
+                  <a:schemeClr val="accent1"/>
+                </a:solidFill>
+                <a:latin typeface="Cambria" panose="02040503050406030204" pitchFamily="18" charset="0"/>
+              </a:rPr>
+              <a:t>MORE SPEED =&gt; LESS ACCURACY</a:t>
+            </a:r>
+          </a:p>
+        </p:txBody>
+      </p:sp>
+      <p:cxnSp>
+        <p:nvCxnSpPr>
+          <p:cNvPr id="4" name="Straight Connector 3">
+            <a:extLst>
+              <a:ext uri="{FF2B5EF4-FFF2-40B4-BE49-F238E27FC236}">
+                <a16:creationId xmlns:a16="http://schemas.microsoft.com/office/drawing/2014/main" id="{577EA418-0B85-504F-855C-C078902D4017}"/>
+              </a:ext>
+            </a:extLst>
+          </p:cNvPr>
+          <p:cNvCxnSpPr>
+            <a:cxnSpLocks/>
+          </p:cNvCxnSpPr>
+          <p:nvPr/>
+        </p:nvCxnSpPr>
+        <p:spPr>
+          <a:xfrm>
+            <a:off x="1378101" y="1753299"/>
+            <a:ext cx="5426353" cy="0"/>
+          </a:xfrm>
+          <a:prstGeom prst="line">
+            <a:avLst/>
+          </a:prstGeom>
+          <a:ln w="12700"/>
+        </p:spPr>
+        <p:style>
+          <a:lnRef idx="1">
+            <a:schemeClr val="accent1"/>
+          </a:lnRef>
+          <a:fillRef idx="0">
+            <a:schemeClr val="accent1"/>
+          </a:fillRef>
+          <a:effectRef idx="0">
+            <a:schemeClr val="accent1"/>
+          </a:effectRef>
+          <a:fontRef idx="minor">
+            <a:schemeClr val="tx1"/>
+          </a:fontRef>
+        </p:style>
+      </p:cxnSp>
+    </p:spTree>
+    <p:extLst>
+      <p:ext uri="{BB962C8B-B14F-4D97-AF65-F5344CB8AC3E}">
+        <p14:creationId xmlns:p14="http://schemas.microsoft.com/office/powerpoint/2010/main" val="3969142395"/>
+      </p:ext>
+    </p:extLst>
+  </p:cSld>
+  <p:clrMapOvr>
+    <a:masterClrMapping/>
+  </p:clrMapOvr>
+  <mc:AlternateContent xmlns:mc="http://schemas.openxmlformats.org/markup-compatibility/2006" xmlns:p14="http://schemas.microsoft.com/office/powerpoint/2010/main">
+    <mc:Choice Requires="p14">
+      <p:transition spd="med" p14:dur="700">
+        <p:fade/>
+      </p:transition>
+    </mc:Choice>
+    <mc:Fallback xmlns="">
+      <p:transition spd="med">
+        <p:fade/>
+      </p:transition>
+    </mc:Fallback>
+  </mc:AlternateContent>
+</p:sld>
+</file>
+
+<file path=ppt/slides/slide39.xml><?xml version="1.0" encoding="utf-8"?>
+<p:sld xmlns:a="http://schemas.openxmlformats.org/drawingml/2006/main" xmlns:r="http://schemas.openxmlformats.org/officeDocument/2006/relationships" xmlns:p="http://schemas.openxmlformats.org/presentationml/2006/main">
+  <p:cSld>
+    <p:spTree>
+      <p:nvGrpSpPr>
+        <p:cNvPr id="1" name=""/>
+        <p:cNvGrpSpPr/>
+        <p:nvPr/>
+      </p:nvGrpSpPr>
+      <p:grpSpPr>
+        <a:xfrm>
+          <a:off x="0" y="0"/>
+          <a:ext cx="0" cy="0"/>
+          <a:chOff x="0" y="0"/>
+          <a:chExt cx="0" cy="0"/>
+        </a:xfrm>
+      </p:grpSpPr>
+      <p:sp>
+        <p:nvSpPr>
+          <p:cNvPr id="3" name="TextBox 2"/>
+          <p:cNvSpPr txBox="1"/>
+          <p:nvPr/>
+        </p:nvSpPr>
+        <p:spPr>
+          <a:xfrm>
+            <a:off x="2530115" y="1746432"/>
+            <a:ext cx="9097025" cy="861774"/>
+          </a:xfrm>
+          <a:prstGeom prst="rect">
+            <a:avLst/>
+          </a:prstGeom>
+          <a:noFill/>
+        </p:spPr>
+        <p:txBody>
+          <a:bodyPr wrap="square" rtlCol="0">
+            <a:spAutoFit/>
+          </a:bodyPr>
+          <a:lstStyle/>
+          <a:p>
+            <a:r>
+              <a:rPr lang="en-US" sz="5000" b="1" dirty="0">
+                <a:solidFill>
+                  <a:schemeClr val="accent1"/>
+                </a:solidFill>
+                <a:latin typeface="Cambria" panose="02040503050406030204" pitchFamily="18" charset="0"/>
+              </a:rPr>
+              <a:t>FORTHCOMING SESSIONS</a:t>
+            </a:r>
+          </a:p>
+        </p:txBody>
+      </p:sp>
+      <p:cxnSp>
+        <p:nvCxnSpPr>
+          <p:cNvPr id="5" name="Straight Connector 4">
+            <a:extLst>
+              <a:ext uri="{FF2B5EF4-FFF2-40B4-BE49-F238E27FC236}">
+                <a16:creationId xmlns:a16="http://schemas.microsoft.com/office/drawing/2014/main" id="{2571E43F-CCA3-BB47-A7AF-81B47EA888E0}"/>
+              </a:ext>
+            </a:extLst>
+          </p:cNvPr>
+          <p:cNvCxnSpPr>
+            <a:cxnSpLocks/>
+          </p:cNvCxnSpPr>
+          <p:nvPr/>
+        </p:nvCxnSpPr>
+        <p:spPr>
+          <a:xfrm>
+            <a:off x="2317528" y="1887522"/>
+            <a:ext cx="0" cy="595619"/>
+          </a:xfrm>
+          <a:prstGeom prst="line">
+            <a:avLst/>
+          </a:prstGeom>
+          <a:ln w="38100"/>
+        </p:spPr>
+        <p:style>
+          <a:lnRef idx="1">
+            <a:schemeClr val="accent1"/>
+          </a:lnRef>
+          <a:fillRef idx="0">
+            <a:schemeClr val="accent1"/>
+          </a:fillRef>
+          <a:effectRef idx="0">
+            <a:schemeClr val="accent1"/>
+          </a:effectRef>
+          <a:fontRef idx="minor">
+            <a:schemeClr val="tx1"/>
+          </a:fontRef>
+        </p:style>
+      </p:cxnSp>
+    </p:spTree>
+    <p:extLst>
+      <p:ext uri="{BB962C8B-B14F-4D97-AF65-F5344CB8AC3E}">
+        <p14:creationId xmlns:p14="http://schemas.microsoft.com/office/powerpoint/2010/main" val="2224615283"/>
+      </p:ext>
+    </p:extLst>
+  </p:cSld>
+  <p:clrMapOvr>
+    <a:masterClrMapping/>
+  </p:clrMapOvr>
+  <mc:AlternateContent xmlns:mc="http://schemas.openxmlformats.org/markup-compatibility/2006" xmlns:p14="http://schemas.microsoft.com/office/powerpoint/2010/main">
+    <mc:Choice Requires="p14">
+      <p:transition spd="med" p14:dur="700">
+        <p:fade/>
+      </p:transition>
+    </mc:Choice>
+    <mc:Fallback xmlns="">
+      <p:transition spd="med">
+        <p:fade/>
+      </p:transition>
+    </mc:Fallback>
+  </mc:AlternateContent>
+</p:sld>
+</file>
+
 <file path=ppt/slides/slide4.xml><?xml version="1.0" encoding="utf-8"?>
 <p:sld xmlns:a="http://schemas.openxmlformats.org/drawingml/2006/main" xmlns:r="http://schemas.openxmlformats.org/officeDocument/2006/relationships" xmlns:p="http://schemas.openxmlformats.org/presentationml/2006/main">
   <p:cSld>
@@ -15331,6 +16653,237 @@
     <p:extLst>
       <p:ext uri="{BB962C8B-B14F-4D97-AF65-F5344CB8AC3E}">
         <p14:creationId xmlns:p14="http://schemas.microsoft.com/office/powerpoint/2010/main" val="4243481658"/>
+      </p:ext>
+    </p:extLst>
+  </p:cSld>
+  <p:clrMapOvr>
+    <a:masterClrMapping/>
+  </p:clrMapOvr>
+  <mc:AlternateContent xmlns:mc="http://schemas.openxmlformats.org/markup-compatibility/2006" xmlns:p14="http://schemas.microsoft.com/office/powerpoint/2010/main">
+    <mc:Choice Requires="p14">
+      <p:transition spd="med" p14:dur="700">
+        <p:fade/>
+      </p:transition>
+    </mc:Choice>
+    <mc:Fallback xmlns="">
+      <p:transition spd="med">
+        <p:fade/>
+      </p:transition>
+    </mc:Fallback>
+  </mc:AlternateContent>
+</p:sld>
+</file>
+
+<file path=ppt/slides/slide40.xml><?xml version="1.0" encoding="utf-8"?>
+<p:sld xmlns:a="http://schemas.openxmlformats.org/drawingml/2006/main" xmlns:r="http://schemas.openxmlformats.org/officeDocument/2006/relationships" xmlns:p="http://schemas.openxmlformats.org/presentationml/2006/main">
+  <p:cSld>
+    <p:spTree>
+      <p:nvGrpSpPr>
+        <p:cNvPr id="1" name=""/>
+        <p:cNvGrpSpPr/>
+        <p:nvPr/>
+      </p:nvGrpSpPr>
+      <p:grpSpPr>
+        <a:xfrm>
+          <a:off x="0" y="0"/>
+          <a:ext cx="0" cy="0"/>
+          <a:chOff x="0" y="0"/>
+          <a:chExt cx="0" cy="0"/>
+        </a:xfrm>
+      </p:grpSpPr>
+      <p:sp>
+        <p:nvSpPr>
+          <p:cNvPr id="8" name="TextBox 7"/>
+          <p:cNvSpPr txBox="1"/>
+          <p:nvPr/>
+        </p:nvSpPr>
+        <p:spPr>
+          <a:xfrm>
+            <a:off x="1372436" y="1098273"/>
+            <a:ext cx="5380702" cy="4401205"/>
+          </a:xfrm>
+          <a:prstGeom prst="rect">
+            <a:avLst/>
+          </a:prstGeom>
+          <a:noFill/>
+        </p:spPr>
+        <p:txBody>
+          <a:bodyPr wrap="square" rtlCol="0">
+            <a:spAutoFit/>
+          </a:bodyPr>
+          <a:lstStyle/>
+          <a:p>
+            <a:r>
+              <a:rPr lang="en-US" sz="4000" b="1" dirty="0">
+                <a:solidFill>
+                  <a:schemeClr val="accent1"/>
+                </a:solidFill>
+                <a:latin typeface="Cambria" panose="02040503050406030204" pitchFamily="18" charset="0"/>
+              </a:rPr>
+              <a:t>AI APPLICATIONS</a:t>
+            </a:r>
+            <a:br>
+              <a:rPr lang="en-US" sz="4000" b="1" dirty="0">
+                <a:solidFill>
+                  <a:schemeClr val="accent1"/>
+                </a:solidFill>
+                <a:latin typeface="Cambria" panose="02040503050406030204" pitchFamily="18" charset="0"/>
+              </a:rPr>
+            </a:br>
+            <a:br>
+              <a:rPr lang="en-US" sz="4000" b="1" dirty="0">
+                <a:solidFill>
+                  <a:schemeClr val="accent1"/>
+                </a:solidFill>
+                <a:latin typeface="Cambria" panose="02040503050406030204" pitchFamily="18" charset="0"/>
+              </a:rPr>
+            </a:br>
+            <a:r>
+              <a:rPr lang="en-US" sz="4000" b="1" dirty="0">
+                <a:solidFill>
+                  <a:schemeClr val="accent1"/>
+                </a:solidFill>
+                <a:latin typeface="Cambria" panose="02040503050406030204" pitchFamily="18" charset="0"/>
+              </a:rPr>
+              <a:t>ETHICS OF AI</a:t>
+            </a:r>
+            <a:br>
+              <a:rPr lang="en-US" sz="4000" b="1" dirty="0">
+                <a:solidFill>
+                  <a:schemeClr val="accent1"/>
+                </a:solidFill>
+                <a:latin typeface="Cambria" panose="02040503050406030204" pitchFamily="18" charset="0"/>
+              </a:rPr>
+            </a:br>
+            <a:endParaRPr lang="en-US" sz="4000" b="1" dirty="0">
+              <a:solidFill>
+                <a:schemeClr val="accent1"/>
+              </a:solidFill>
+              <a:latin typeface="Cambria" panose="02040503050406030204" pitchFamily="18" charset="0"/>
+            </a:endParaRPr>
+          </a:p>
+          <a:p>
+            <a:r>
+              <a:rPr lang="en-US" sz="4000" b="1" dirty="0">
+                <a:solidFill>
+                  <a:schemeClr val="accent1"/>
+                </a:solidFill>
+                <a:latin typeface="Cambria" panose="02040503050406030204" pitchFamily="18" charset="0"/>
+              </a:rPr>
+              <a:t>OPEN ISSUES</a:t>
+            </a:r>
+            <a:br>
+              <a:rPr lang="en-US" sz="4000" b="1" dirty="0">
+                <a:solidFill>
+                  <a:schemeClr val="accent1"/>
+                </a:solidFill>
+                <a:latin typeface="Cambria" panose="02040503050406030204" pitchFamily="18" charset="0"/>
+              </a:rPr>
+            </a:br>
+            <a:endParaRPr lang="en-US" sz="4000" b="1" dirty="0">
+              <a:solidFill>
+                <a:schemeClr val="accent1"/>
+              </a:solidFill>
+              <a:latin typeface="Cambria" panose="02040503050406030204" pitchFamily="18" charset="0"/>
+            </a:endParaRPr>
+          </a:p>
+          <a:p>
+            <a:r>
+              <a:rPr lang="en-US" sz="4000" b="1" dirty="0">
+                <a:solidFill>
+                  <a:schemeClr val="accent1"/>
+                </a:solidFill>
+                <a:latin typeface="Cambria" panose="02040503050406030204" pitchFamily="18" charset="0"/>
+              </a:rPr>
+              <a:t>BUSINESS MODEL</a:t>
+            </a:r>
+          </a:p>
+        </p:txBody>
+      </p:sp>
+      <p:sp>
+        <p:nvSpPr>
+          <p:cNvPr id="3" name="TextBox 2">
+            <a:extLst>
+              <a:ext uri="{FF2B5EF4-FFF2-40B4-BE49-F238E27FC236}">
+                <a16:creationId xmlns:a16="http://schemas.microsoft.com/office/drawing/2014/main" id="{9DEE68F0-334B-734C-B779-7B6D77A6FF4C}"/>
+              </a:ext>
+            </a:extLst>
+          </p:cNvPr>
+          <p:cNvSpPr txBox="1"/>
+          <p:nvPr/>
+        </p:nvSpPr>
+        <p:spPr>
+          <a:xfrm>
+            <a:off x="5444456" y="2364107"/>
+            <a:ext cx="1319032" cy="1631216"/>
+          </a:xfrm>
+          <a:prstGeom prst="rect">
+            <a:avLst/>
+          </a:prstGeom>
+          <a:noFill/>
+        </p:spPr>
+        <p:txBody>
+          <a:bodyPr wrap="square" rtlCol="0">
+            <a:spAutoFit/>
+          </a:bodyPr>
+          <a:lstStyle/>
+          <a:p>
+            <a:r>
+              <a:rPr lang="en-US" sz="10000" b="1" dirty="0">
+                <a:solidFill>
+                  <a:schemeClr val="accent1"/>
+                </a:solidFill>
+                <a:latin typeface="Cambria" panose="02040503050406030204" pitchFamily="18" charset="0"/>
+              </a:rPr>
+              <a:t>&amp;</a:t>
+            </a:r>
+          </a:p>
+        </p:txBody>
+      </p:sp>
+      <p:sp>
+        <p:nvSpPr>
+          <p:cNvPr id="5" name="TextBox 4">
+            <a:extLst>
+              <a:ext uri="{FF2B5EF4-FFF2-40B4-BE49-F238E27FC236}">
+                <a16:creationId xmlns:a16="http://schemas.microsoft.com/office/drawing/2014/main" id="{31BF8419-E8E0-2349-913F-44A3E2BB6B55}"/>
+              </a:ext>
+            </a:extLst>
+          </p:cNvPr>
+          <p:cNvSpPr txBox="1"/>
+          <p:nvPr/>
+        </p:nvSpPr>
+        <p:spPr>
+          <a:xfrm>
+            <a:off x="7145460" y="2492828"/>
+            <a:ext cx="5380702" cy="1323439"/>
+          </a:xfrm>
+          <a:prstGeom prst="rect">
+            <a:avLst/>
+          </a:prstGeom>
+          <a:noFill/>
+        </p:spPr>
+        <p:txBody>
+          <a:bodyPr wrap="square" rtlCol="0">
+            <a:spAutoFit/>
+          </a:bodyPr>
+          <a:lstStyle/>
+          <a:p>
+            <a:r>
+              <a:rPr lang="en-US" sz="4000" b="1" dirty="0">
+                <a:solidFill>
+                  <a:schemeClr val="accent1"/>
+                </a:solidFill>
+                <a:latin typeface="Cambria" panose="02040503050406030204" pitchFamily="18" charset="0"/>
+              </a:rPr>
+              <a:t>WORKING GROUP SESSIONS</a:t>
+            </a:r>
+          </a:p>
+        </p:txBody>
+      </p:sp>
+    </p:spTree>
+    <p:extLst>
+      <p:ext uri="{BB962C8B-B14F-4D97-AF65-F5344CB8AC3E}">
+        <p14:creationId xmlns:p14="http://schemas.microsoft.com/office/powerpoint/2010/main" val="3979061123"/>
       </p:ext>
     </p:extLst>
   </p:cSld>
@@ -15633,8 +17186,8 @@
         </p:nvSpPr>
         <p:spPr>
           <a:xfrm>
-            <a:off x="3075401" y="2818016"/>
-            <a:ext cx="9196386" cy="553998"/>
+            <a:off x="2572062" y="1761002"/>
+            <a:ext cx="9196386" cy="707886"/>
           </a:xfrm>
           <a:prstGeom prst="rect">
             <a:avLst/>
@@ -15648,13 +17201,200 @@
           <a:lstStyle/>
           <a:p>
             <a:r>
-              <a:rPr lang="en-US" sz="3000" b="1" dirty="0">
+              <a:rPr lang="en-US" sz="4000" b="1" dirty="0">
                 <a:solidFill>
                   <a:schemeClr val="accent1"/>
                 </a:solidFill>
                 <a:latin typeface="Cambria" panose="02040503050406030204" pitchFamily="18" charset="0"/>
               </a:rPr>
               <a:t>A STORY OF A BUTTERFLY AND …</a:t>
+            </a:r>
+          </a:p>
+        </p:txBody>
+      </p:sp>
+      <p:pic>
+        <p:nvPicPr>
+          <p:cNvPr id="6" name="Graphic 5" descr="Thought bubble">
+            <a:extLst>
+              <a:ext uri="{FF2B5EF4-FFF2-40B4-BE49-F238E27FC236}">
+                <a16:creationId xmlns:a16="http://schemas.microsoft.com/office/drawing/2014/main" id="{30DB4608-980D-1D4C-A540-EA728E2F761D}"/>
+              </a:ext>
+            </a:extLst>
+          </p:cNvPr>
+          <p:cNvPicPr>
+            <a:picLocks noChangeAspect="1"/>
+          </p:cNvPicPr>
+          <p:nvPr/>
+        </p:nvPicPr>
+        <p:blipFill>
+          <a:blip r:embed="rId3">
+            <a:extLst>
+              <a:ext uri="{28A0092B-C50C-407E-A947-70E740481C1C}">
+                <a14:useLocalDpi xmlns:a14="http://schemas.microsoft.com/office/drawing/2010/main" val="0"/>
+              </a:ext>
+              <a:ext uri="{96DAC541-7B7A-43D3-8B79-37D633B846F1}">
+                <asvg:svgBlip xmlns:asvg="http://schemas.microsoft.com/office/drawing/2016/SVG/main" r:embed="rId4"/>
+              </a:ext>
+            </a:extLst>
+          </a:blip>
+          <a:stretch>
+            <a:fillRect/>
+          </a:stretch>
+        </p:blipFill>
+        <p:spPr>
+          <a:xfrm>
+            <a:off x="10234569" y="0"/>
+            <a:ext cx="1686187" cy="1686187"/>
+          </a:xfrm>
+          <a:prstGeom prst="rect">
+            <a:avLst/>
+          </a:prstGeom>
+        </p:spPr>
+      </p:pic>
+      <p:pic>
+        <p:nvPicPr>
+          <p:cNvPr id="3" name="Picture 2">
+            <a:extLst>
+              <a:ext uri="{FF2B5EF4-FFF2-40B4-BE49-F238E27FC236}">
+                <a16:creationId xmlns:a16="http://schemas.microsoft.com/office/drawing/2014/main" id="{0FB8D045-D8AD-F943-9A03-85964833190C}"/>
+              </a:ext>
+            </a:extLst>
+          </p:cNvPr>
+          <p:cNvPicPr>
+            <a:picLocks noChangeAspect="1"/>
+          </p:cNvPicPr>
+          <p:nvPr/>
+        </p:nvPicPr>
+        <p:blipFill>
+          <a:blip r:embed="rId5"/>
+          <a:stretch>
+            <a:fillRect/>
+          </a:stretch>
+        </p:blipFill>
+        <p:spPr>
+          <a:xfrm>
+            <a:off x="7427370" y="2906863"/>
+            <a:ext cx="2873435" cy="1898417"/>
+          </a:xfrm>
+          <a:prstGeom prst="rect">
+            <a:avLst/>
+          </a:prstGeom>
+        </p:spPr>
+      </p:pic>
+      <p:sp>
+        <p:nvSpPr>
+          <p:cNvPr id="7" name="Rectangle 6">
+            <a:extLst>
+              <a:ext uri="{FF2B5EF4-FFF2-40B4-BE49-F238E27FC236}">
+                <a16:creationId xmlns:a16="http://schemas.microsoft.com/office/drawing/2014/main" id="{09BF03DB-4A4F-0844-A17C-3EFB12C6EDDB}"/>
+              </a:ext>
+            </a:extLst>
+          </p:cNvPr>
+          <p:cNvSpPr/>
+          <p:nvPr/>
+        </p:nvSpPr>
+        <p:spPr>
+          <a:xfrm>
+            <a:off x="7317996" y="4865271"/>
+            <a:ext cx="4946708" cy="261610"/>
+          </a:xfrm>
+          <a:prstGeom prst="rect">
+            <a:avLst/>
+          </a:prstGeom>
+        </p:spPr>
+        <p:txBody>
+          <a:bodyPr wrap="square">
+            <a:spAutoFit/>
+          </a:bodyPr>
+          <a:lstStyle/>
+          <a:p>
+            <a:r>
+              <a:rPr lang="fr-FR" sz="1100" dirty="0"/>
+              <a:t>Source: http://reptile-</a:t>
+            </a:r>
+            <a:r>
+              <a:rPr lang="fr-FR" sz="1100" dirty="0" err="1"/>
+              <a:t>database.reptarium.cz</a:t>
+            </a:r>
+            <a:endParaRPr lang="fr-FR" sz="1100" dirty="0"/>
+          </a:p>
+        </p:txBody>
+      </p:sp>
+      <p:pic>
+        <p:nvPicPr>
+          <p:cNvPr id="9" name="Picture 8">
+            <a:extLst>
+              <a:ext uri="{FF2B5EF4-FFF2-40B4-BE49-F238E27FC236}">
+                <a16:creationId xmlns:a16="http://schemas.microsoft.com/office/drawing/2014/main" id="{61AD7779-9DE0-ED43-9021-F4C072A39996}"/>
+              </a:ext>
+            </a:extLst>
+          </p:cNvPr>
+          <p:cNvPicPr>
+            <a:picLocks noChangeAspect="1"/>
+          </p:cNvPicPr>
+          <p:nvPr/>
+        </p:nvPicPr>
+        <p:blipFill>
+          <a:blip r:embed="rId6"/>
+          <a:stretch>
+            <a:fillRect/>
+          </a:stretch>
+        </p:blipFill>
+        <p:spPr>
+          <a:xfrm>
+            <a:off x="2678324" y="2948648"/>
+            <a:ext cx="2479705" cy="1856632"/>
+          </a:xfrm>
+          <a:prstGeom prst="rect">
+            <a:avLst/>
+          </a:prstGeom>
+        </p:spPr>
+      </p:pic>
+      <p:sp>
+        <p:nvSpPr>
+          <p:cNvPr id="11" name="Rectangle 10">
+            <a:extLst>
+              <a:ext uri="{FF2B5EF4-FFF2-40B4-BE49-F238E27FC236}">
+                <a16:creationId xmlns:a16="http://schemas.microsoft.com/office/drawing/2014/main" id="{45E84548-5BB4-3247-B66B-B2DA96A4ADDC}"/>
+              </a:ext>
+            </a:extLst>
+          </p:cNvPr>
+          <p:cNvSpPr/>
+          <p:nvPr/>
+        </p:nvSpPr>
+        <p:spPr>
+          <a:xfrm>
+            <a:off x="2572062" y="4900438"/>
+            <a:ext cx="4189465" cy="430887"/>
+          </a:xfrm>
+          <a:prstGeom prst="rect">
+            <a:avLst/>
+          </a:prstGeom>
+        </p:spPr>
+        <p:txBody>
+          <a:bodyPr wrap="square">
+            <a:spAutoFit/>
+          </a:bodyPr>
+          <a:lstStyle/>
+          <a:p>
+            <a:r>
+              <a:rPr lang="fr-FR" sz="1100" dirty="0"/>
+              <a:t>Source: https://</a:t>
+            </a:r>
+            <a:r>
+              <a:rPr lang="fr-FR" sz="1100" dirty="0" err="1"/>
+              <a:t>www.smithsonianmag.com</a:t>
+            </a:r>
+            <a:r>
+              <a:rPr lang="fr-FR" sz="1100" dirty="0"/>
+              <a:t>/smart-news/</a:t>
+            </a:r>
+            <a:br>
+              <a:rPr lang="fr-FR" sz="1100" dirty="0"/>
+            </a:br>
+            <a:r>
+              <a:rPr lang="fr-FR" sz="1100" dirty="0"/>
+              <a:t>butterfly-recently-returned-scotland-now-its-laying-eggs-180968195/</a:t>
             </a:r>
           </a:p>
         </p:txBody>
@@ -16003,7 +17743,7 @@
         <p:spPr>
           <a:xfrm>
             <a:off x="2655952" y="2197231"/>
-            <a:ext cx="9196386" cy="1938992"/>
+            <a:ext cx="9196386" cy="2092881"/>
           </a:xfrm>
           <a:prstGeom prst="rect">
             <a:avLst/>
@@ -16023,7 +17763,25 @@
                 </a:solidFill>
                 <a:latin typeface="Cambria" panose="02040503050406030204" pitchFamily="18" charset="0"/>
               </a:rPr>
-              <a:t>IDENTIFY 5 AI APPLICATIONS</a:t>
+              <a:t>IDENTIFY </a:t>
+            </a:r>
+            <a:r>
+              <a:rPr lang="en-US" sz="5000" b="1" dirty="0">
+                <a:solidFill>
+                  <a:schemeClr val="accent1"/>
+                </a:solidFill>
+                <a:latin typeface="Cambria" panose="02040503050406030204" pitchFamily="18" charset="0"/>
+              </a:rPr>
+              <a:t>5</a:t>
+            </a:r>
+            <a:r>
+              <a:rPr lang="en-US" sz="4000" b="1" dirty="0">
+                <a:solidFill>
+                  <a:schemeClr val="accent1"/>
+                </a:solidFill>
+                <a:latin typeface="Cambria" panose="02040503050406030204" pitchFamily="18" charset="0"/>
+              </a:rPr>
+              <a:t> AI APPLICATIONS</a:t>
             </a:r>
             <a:br>
               <a:rPr lang="en-US" sz="4000" b="1" dirty="0">
@@ -16053,6 +17811,45 @@
           </a:p>
         </p:txBody>
       </p:sp>
+      <p:pic>
+        <p:nvPicPr>
+          <p:cNvPr id="3" name="Graphic 2" descr="Thought bubble">
+            <a:extLst>
+              <a:ext uri="{FF2B5EF4-FFF2-40B4-BE49-F238E27FC236}">
+                <a16:creationId xmlns:a16="http://schemas.microsoft.com/office/drawing/2014/main" id="{C2A6FE80-28AC-AE4A-9305-04C959471DA5}"/>
+              </a:ext>
+            </a:extLst>
+          </p:cNvPr>
+          <p:cNvPicPr>
+            <a:picLocks noChangeAspect="1"/>
+          </p:cNvPicPr>
+          <p:nvPr/>
+        </p:nvPicPr>
+        <p:blipFill>
+          <a:blip r:embed="rId3">
+            <a:extLst>
+              <a:ext uri="{28A0092B-C50C-407E-A947-70E740481C1C}">
+                <a14:useLocalDpi xmlns:a14="http://schemas.microsoft.com/office/drawing/2010/main" val="0"/>
+              </a:ext>
+              <a:ext uri="{96DAC541-7B7A-43D3-8B79-37D633B846F1}">
+                <asvg:svgBlip xmlns:asvg="http://schemas.microsoft.com/office/drawing/2016/SVG/main" r:embed="rId4"/>
+              </a:ext>
+            </a:extLst>
+          </a:blip>
+          <a:stretch>
+            <a:fillRect/>
+          </a:stretch>
+        </p:blipFill>
+        <p:spPr>
+          <a:xfrm>
+            <a:off x="10234569" y="0"/>
+            <a:ext cx="1686187" cy="1686187"/>
+          </a:xfrm>
+          <a:prstGeom prst="rect">
+            <a:avLst/>
+          </a:prstGeom>
+        </p:spPr>
+      </p:pic>
     </p:spTree>
     <p:extLst>
       <p:ext uri="{BB962C8B-B14F-4D97-AF65-F5344CB8AC3E}">

</xml_diff>

<commit_message>
ai applications in Africa
</commit_message>
<xml_diff>
--- a/presentations/session-4-intro-to-ai.pptx
+++ b/presentations/session-4-intro-to-ai.pptx
@@ -17431,15 +17431,12 @@
                 <a:latin typeface="Cambria" panose="02040503050406030204" pitchFamily="18" charset="0"/>
               </a:rPr>
             </a:br>
-            <a:r>
-              <a:rPr lang="en-US" sz="2400" b="1" dirty="0">
-                <a:solidFill>
-                  <a:schemeClr val="accent1"/>
-                </a:solidFill>
-                <a:latin typeface="Cambria" panose="02040503050406030204" pitchFamily="18" charset="0"/>
-              </a:rPr>
-              <a:t> </a:t>
-            </a:r>
+            <a:endParaRPr lang="en-US" sz="2400" b="1" dirty="0">
+              <a:solidFill>
+                <a:schemeClr val="accent1"/>
+              </a:solidFill>
+              <a:latin typeface="Cambria" panose="02040503050406030204" pitchFamily="18" charset="0"/>
+            </a:endParaRPr>
           </a:p>
           <a:p>
             <a:pPr marL="342900" indent="-342900">
@@ -17453,7 +17450,7 @@
                 </a:solidFill>
                 <a:latin typeface="Cambria" panose="02040503050406030204" pitchFamily="18" charset="0"/>
               </a:rPr>
-              <a:t>…</a:t>
+              <a:t>ZINDI (KAGGLE FOR AFRICA)</a:t>
             </a:r>
           </a:p>
         </p:txBody>
@@ -17511,7 +17508,7 @@
         </p:nvSpPr>
         <p:spPr>
           <a:xfrm>
-            <a:off x="1378101" y="6016156"/>
+            <a:off x="1632934" y="5709752"/>
             <a:ext cx="3787191" cy="369332"/>
           </a:xfrm>
           <a:prstGeom prst="rect">
@@ -17560,7 +17557,7 @@
         </p:nvSpPr>
         <p:spPr>
           <a:xfrm>
-            <a:off x="1378101" y="5719500"/>
+            <a:off x="1632934" y="5413096"/>
             <a:ext cx="2493183" cy="369332"/>
           </a:xfrm>
           <a:prstGeom prst="rect">
@@ -17592,6 +17589,72 @@
               <a:t>/</a:t>
             </a:r>
             <a:endParaRPr lang="fr-FR" dirty="0"/>
+          </a:p>
+        </p:txBody>
+      </p:sp>
+      <p:sp>
+        <p:nvSpPr>
+          <p:cNvPr id="10" name="Rectangle 9">
+            <a:extLst>
+              <a:ext uri="{FF2B5EF4-FFF2-40B4-BE49-F238E27FC236}">
+                <a16:creationId xmlns:a16="http://schemas.microsoft.com/office/drawing/2014/main" id="{FD1E295C-630D-1D46-A791-0E0F880FC459}"/>
+              </a:ext>
+            </a:extLst>
+          </p:cNvPr>
+          <p:cNvSpPr/>
+          <p:nvPr/>
+        </p:nvSpPr>
+        <p:spPr>
+          <a:xfrm>
+            <a:off x="1632934" y="6016156"/>
+            <a:ext cx="3482043" cy="369332"/>
+          </a:xfrm>
+          <a:prstGeom prst="rect">
+            <a:avLst/>
+          </a:prstGeom>
+        </p:spPr>
+        <p:txBody>
+          <a:bodyPr wrap="none">
+            <a:spAutoFit/>
+          </a:bodyPr>
+          <a:lstStyle/>
+          <a:p>
+            <a:r>
+              <a:rPr lang="en-US" dirty="0">
+                <a:solidFill>
+                  <a:schemeClr val="accent1"/>
+                </a:solidFill>
+                <a:latin typeface="Cambria" panose="02040503050406030204" pitchFamily="18" charset="0"/>
+                <a:hlinkClick r:id="rId5"/>
+              </a:rPr>
+              <a:t>https://</a:t>
+            </a:r>
+            <a:r>
+              <a:rPr lang="en-US" dirty="0" err="1">
+                <a:solidFill>
+                  <a:schemeClr val="accent1"/>
+                </a:solidFill>
+                <a:latin typeface="Cambria" panose="02040503050406030204" pitchFamily="18" charset="0"/>
+                <a:hlinkClick r:id="rId5"/>
+              </a:rPr>
+              <a:t>zindi.africa</a:t>
+            </a:r>
+            <a:r>
+              <a:rPr lang="en-US" dirty="0">
+                <a:solidFill>
+                  <a:schemeClr val="accent1"/>
+                </a:solidFill>
+                <a:latin typeface="Cambria" panose="02040503050406030204" pitchFamily="18" charset="0"/>
+                <a:hlinkClick r:id="rId5"/>
+              </a:rPr>
+              <a:t>/competitions</a:t>
+            </a:r>
+            <a:endParaRPr lang="en-US" dirty="0">
+              <a:solidFill>
+                <a:schemeClr val="accent1"/>
+              </a:solidFill>
+              <a:latin typeface="Cambria" panose="02040503050406030204" pitchFamily="18" charset="0"/>
+            </a:endParaRPr>
           </a:p>
         </p:txBody>
       </p:sp>

</xml_diff>